<commit_message>
updated README and changed zoom speed for Edge
</commit_message>
<xml_diff>
--- a/doc-images/screenshot-initial.pptx
+++ b/doc-images/screenshot-initial.pptx
@@ -2,12 +2,12 @@
 <file path=ppt/presentation.xml><?xml version="1.0" encoding="utf-8"?>
 <p:presentation xmlns:a="http://schemas.openxmlformats.org/drawingml/2006/main" xmlns:r="http://schemas.openxmlformats.org/officeDocument/2006/relationships" xmlns:p="http://schemas.openxmlformats.org/presentationml/2006/main" saveSubsetFonts="1">
   <p:sldMasterIdLst>
-    <p:sldMasterId id="2147483660" r:id="rId1"/>
+    <p:sldMasterId id="2147483672" r:id="rId1"/>
   </p:sldMasterIdLst>
   <p:sldIdLst>
     <p:sldId id="256" r:id="rId2"/>
   </p:sldIdLst>
-  <p:sldSz cx="12192000" cy="6318250"/>
+  <p:sldSz cx="11293475" cy="6318250"/>
   <p:notesSz cx="6858000" cy="9144000"/>
   <p:defaultTextStyle>
     <a:defPPr>
@@ -104,6 +104,11 @@
       </a:defRPr>
     </a:lvl9pPr>
   </p:defaultTextStyle>
+  <p:extLst>
+    <p:ext uri="{EFAFB233-063F-42B5-8137-9DF3F51BA10A}">
+      <p15:sldGuideLst xmlns:p15="http://schemas.microsoft.com/office/powerpoint/2012/main"/>
+    </p:ext>
+  </p:extLst>
 </p:presentation>
 </file>
 
@@ -136,8 +141,8 @@
         </p:nvSpPr>
         <p:spPr>
           <a:xfrm>
-            <a:off x="1524000" y="1034029"/>
-            <a:ext cx="9144000" cy="2199687"/>
+            <a:off x="1411685" y="1034029"/>
+            <a:ext cx="8470106" cy="2199687"/>
           </a:xfrm>
         </p:spPr>
         <p:txBody>
@@ -168,8 +173,8 @@
         </p:nvSpPr>
         <p:spPr>
           <a:xfrm>
-            <a:off x="1524000" y="3318544"/>
-            <a:ext cx="9144000" cy="1525447"/>
+            <a:off x="1411685" y="3318544"/>
+            <a:ext cx="8470106" cy="1525447"/>
           </a:xfrm>
         </p:spPr>
         <p:txBody>
@@ -238,7 +243,7 @@
           <a:p>
             <a:fld id="{93DF655C-B5A4-4D87-897F-CE3EA9D19754}" type="datetimeFigureOut">
               <a:rPr lang="en-US" smtClean="0"/>
-              <a:t>1/1/2020</a:t>
+              <a:t>1/10/2020</a:t>
             </a:fld>
             <a:endParaRPr lang="en-US"/>
           </a:p>
@@ -289,7 +294,7 @@
     </p:spTree>
     <p:extLst>
       <p:ext uri="{BB962C8B-B14F-4D97-AF65-F5344CB8AC3E}">
-        <p14:creationId xmlns:p14="http://schemas.microsoft.com/office/powerpoint/2010/main" val="873266046"/>
+        <p14:creationId xmlns:p14="http://schemas.microsoft.com/office/powerpoint/2010/main" val="3333276551"/>
       </p:ext>
     </p:extLst>
   </p:cSld>
@@ -408,7 +413,7 @@
           <a:p>
             <a:fld id="{93DF655C-B5A4-4D87-897F-CE3EA9D19754}" type="datetimeFigureOut">
               <a:rPr lang="en-US" smtClean="0"/>
-              <a:t>1/1/2020</a:t>
+              <a:t>1/10/2020</a:t>
             </a:fld>
             <a:endParaRPr lang="en-US"/>
           </a:p>
@@ -459,7 +464,7 @@
     </p:spTree>
     <p:extLst>
       <p:ext uri="{BB962C8B-B14F-4D97-AF65-F5344CB8AC3E}">
-        <p14:creationId xmlns:p14="http://schemas.microsoft.com/office/powerpoint/2010/main" val="3541718925"/>
+        <p14:creationId xmlns:p14="http://schemas.microsoft.com/office/powerpoint/2010/main" val="3659710671"/>
       </p:ext>
     </p:extLst>
   </p:cSld>
@@ -498,8 +503,8 @@
         </p:nvSpPr>
         <p:spPr>
           <a:xfrm>
-            <a:off x="8724900" y="336388"/>
-            <a:ext cx="2628900" cy="5354425"/>
+            <a:off x="8081893" y="336388"/>
+            <a:ext cx="2435156" cy="5354425"/>
           </a:xfrm>
         </p:spPr>
         <p:txBody>
@@ -526,8 +531,8 @@
         </p:nvSpPr>
         <p:spPr>
           <a:xfrm>
-            <a:off x="838200" y="336388"/>
-            <a:ext cx="7734300" cy="5354425"/>
+            <a:off x="776427" y="336388"/>
+            <a:ext cx="7164298" cy="5354425"/>
           </a:xfrm>
         </p:spPr>
         <p:txBody>
@@ -588,7 +593,7 @@
           <a:p>
             <a:fld id="{93DF655C-B5A4-4D87-897F-CE3EA9D19754}" type="datetimeFigureOut">
               <a:rPr lang="en-US" smtClean="0"/>
-              <a:t>1/1/2020</a:t>
+              <a:t>1/10/2020</a:t>
             </a:fld>
             <a:endParaRPr lang="en-US"/>
           </a:p>
@@ -639,7 +644,7 @@
     </p:spTree>
     <p:extLst>
       <p:ext uri="{BB962C8B-B14F-4D97-AF65-F5344CB8AC3E}">
-        <p14:creationId xmlns:p14="http://schemas.microsoft.com/office/powerpoint/2010/main" val="968581167"/>
+        <p14:creationId xmlns:p14="http://schemas.microsoft.com/office/powerpoint/2010/main" val="3580776902"/>
       </p:ext>
     </p:extLst>
   </p:cSld>
@@ -758,7 +763,7 @@
           <a:p>
             <a:fld id="{93DF655C-B5A4-4D87-897F-CE3EA9D19754}" type="datetimeFigureOut">
               <a:rPr lang="en-US" smtClean="0"/>
-              <a:t>1/1/2020</a:t>
+              <a:t>1/10/2020</a:t>
             </a:fld>
             <a:endParaRPr lang="en-US"/>
           </a:p>
@@ -809,7 +814,7 @@
     </p:spTree>
     <p:extLst>
       <p:ext uri="{BB962C8B-B14F-4D97-AF65-F5344CB8AC3E}">
-        <p14:creationId xmlns:p14="http://schemas.microsoft.com/office/powerpoint/2010/main" val="4008709878"/>
+        <p14:creationId xmlns:p14="http://schemas.microsoft.com/office/powerpoint/2010/main" val="453940521"/>
       </p:ext>
     </p:extLst>
   </p:cSld>
@@ -848,8 +853,8 @@
         </p:nvSpPr>
         <p:spPr>
           <a:xfrm>
-            <a:off x="831850" y="1575176"/>
-            <a:ext cx="10515600" cy="2628216"/>
+            <a:off x="770544" y="1575176"/>
+            <a:ext cx="9740622" cy="2628216"/>
           </a:xfrm>
         </p:spPr>
         <p:txBody>
@@ -880,8 +885,8 @@
         </p:nvSpPr>
         <p:spPr>
           <a:xfrm>
-            <a:off x="831850" y="4228256"/>
-            <a:ext cx="10515600" cy="1382117"/>
+            <a:off x="770544" y="4228256"/>
+            <a:ext cx="9740622" cy="1382117"/>
           </a:xfrm>
         </p:spPr>
         <p:txBody>
@@ -1004,7 +1009,7 @@
           <a:p>
             <a:fld id="{93DF655C-B5A4-4D87-897F-CE3EA9D19754}" type="datetimeFigureOut">
               <a:rPr lang="en-US" smtClean="0"/>
-              <a:t>1/1/2020</a:t>
+              <a:t>1/10/2020</a:t>
             </a:fld>
             <a:endParaRPr lang="en-US"/>
           </a:p>
@@ -1055,7 +1060,7 @@
     </p:spTree>
     <p:extLst>
       <p:ext uri="{BB962C8B-B14F-4D97-AF65-F5344CB8AC3E}">
-        <p14:creationId xmlns:p14="http://schemas.microsoft.com/office/powerpoint/2010/main" val="1127918342"/>
+        <p14:creationId xmlns:p14="http://schemas.microsoft.com/office/powerpoint/2010/main" val="3439082163"/>
       </p:ext>
     </p:extLst>
   </p:cSld>
@@ -1117,8 +1122,8 @@
         </p:nvSpPr>
         <p:spPr>
           <a:xfrm>
-            <a:off x="838200" y="1681941"/>
-            <a:ext cx="5181600" cy="4008872"/>
+            <a:off x="776426" y="1681941"/>
+            <a:ext cx="4799727" cy="4008872"/>
           </a:xfrm>
         </p:spPr>
         <p:txBody>
@@ -1174,8 +1179,8 @@
         </p:nvSpPr>
         <p:spPr>
           <a:xfrm>
-            <a:off x="6172200" y="1681941"/>
-            <a:ext cx="5181600" cy="4008872"/>
+            <a:off x="5717322" y="1681941"/>
+            <a:ext cx="4799727" cy="4008872"/>
           </a:xfrm>
         </p:spPr>
         <p:txBody>
@@ -1236,7 +1241,7 @@
           <a:p>
             <a:fld id="{93DF655C-B5A4-4D87-897F-CE3EA9D19754}" type="datetimeFigureOut">
               <a:rPr lang="en-US" smtClean="0"/>
-              <a:t>1/1/2020</a:t>
+              <a:t>1/10/2020</a:t>
             </a:fld>
             <a:endParaRPr lang="en-US"/>
           </a:p>
@@ -1287,7 +1292,7 @@
     </p:spTree>
     <p:extLst>
       <p:ext uri="{BB962C8B-B14F-4D97-AF65-F5344CB8AC3E}">
-        <p14:creationId xmlns:p14="http://schemas.microsoft.com/office/powerpoint/2010/main" val="3324953905"/>
+        <p14:creationId xmlns:p14="http://schemas.microsoft.com/office/powerpoint/2010/main" val="110329012"/>
       </p:ext>
     </p:extLst>
   </p:cSld>
@@ -1326,8 +1331,8 @@
         </p:nvSpPr>
         <p:spPr>
           <a:xfrm>
-            <a:off x="839788" y="336389"/>
-            <a:ext cx="10515600" cy="1221236"/>
+            <a:off x="777897" y="336389"/>
+            <a:ext cx="9740622" cy="1221236"/>
           </a:xfrm>
         </p:spPr>
         <p:txBody>
@@ -1354,8 +1359,8 @@
         </p:nvSpPr>
         <p:spPr>
           <a:xfrm>
-            <a:off x="839789" y="1548849"/>
-            <a:ext cx="5157787" cy="759067"/>
+            <a:off x="777898" y="1548849"/>
+            <a:ext cx="4777669" cy="759067"/>
           </a:xfrm>
         </p:spPr>
         <p:txBody>
@@ -1419,8 +1424,8 @@
         </p:nvSpPr>
         <p:spPr>
           <a:xfrm>
-            <a:off x="839789" y="2307916"/>
-            <a:ext cx="5157787" cy="3394597"/>
+            <a:off x="777898" y="2307916"/>
+            <a:ext cx="4777669" cy="3394597"/>
           </a:xfrm>
         </p:spPr>
         <p:txBody>
@@ -1476,8 +1481,8 @@
         </p:nvSpPr>
         <p:spPr>
           <a:xfrm>
-            <a:off x="6172200" y="1548849"/>
-            <a:ext cx="5183188" cy="759067"/>
+            <a:off x="5717322" y="1548849"/>
+            <a:ext cx="4801198" cy="759067"/>
           </a:xfrm>
         </p:spPr>
         <p:txBody>
@@ -1541,8 +1546,8 @@
         </p:nvSpPr>
         <p:spPr>
           <a:xfrm>
-            <a:off x="6172200" y="2307916"/>
-            <a:ext cx="5183188" cy="3394597"/>
+            <a:off x="5717322" y="2307916"/>
+            <a:ext cx="4801198" cy="3394597"/>
           </a:xfrm>
         </p:spPr>
         <p:txBody>
@@ -1603,7 +1608,7 @@
           <a:p>
             <a:fld id="{93DF655C-B5A4-4D87-897F-CE3EA9D19754}" type="datetimeFigureOut">
               <a:rPr lang="en-US" smtClean="0"/>
-              <a:t>1/1/2020</a:t>
+              <a:t>1/10/2020</a:t>
             </a:fld>
             <a:endParaRPr lang="en-US"/>
           </a:p>
@@ -1654,7 +1659,7 @@
     </p:spTree>
     <p:extLst>
       <p:ext uri="{BB962C8B-B14F-4D97-AF65-F5344CB8AC3E}">
-        <p14:creationId xmlns:p14="http://schemas.microsoft.com/office/powerpoint/2010/main" val="1949459584"/>
+        <p14:creationId xmlns:p14="http://schemas.microsoft.com/office/powerpoint/2010/main" val="2255395317"/>
       </p:ext>
     </p:extLst>
   </p:cSld>
@@ -1721,7 +1726,7 @@
           <a:p>
             <a:fld id="{93DF655C-B5A4-4D87-897F-CE3EA9D19754}" type="datetimeFigureOut">
               <a:rPr lang="en-US" smtClean="0"/>
-              <a:t>1/1/2020</a:t>
+              <a:t>1/10/2020</a:t>
             </a:fld>
             <a:endParaRPr lang="en-US"/>
           </a:p>
@@ -1772,7 +1777,7 @@
     </p:spTree>
     <p:extLst>
       <p:ext uri="{BB962C8B-B14F-4D97-AF65-F5344CB8AC3E}">
-        <p14:creationId xmlns:p14="http://schemas.microsoft.com/office/powerpoint/2010/main" val="2809696292"/>
+        <p14:creationId xmlns:p14="http://schemas.microsoft.com/office/powerpoint/2010/main" val="3460412991"/>
       </p:ext>
     </p:extLst>
   </p:cSld>
@@ -1816,7 +1821,7 @@
           <a:p>
             <a:fld id="{93DF655C-B5A4-4D87-897F-CE3EA9D19754}" type="datetimeFigureOut">
               <a:rPr lang="en-US" smtClean="0"/>
-              <a:t>1/1/2020</a:t>
+              <a:t>1/10/2020</a:t>
             </a:fld>
             <a:endParaRPr lang="en-US"/>
           </a:p>
@@ -1867,7 +1872,7 @@
     </p:spTree>
     <p:extLst>
       <p:ext uri="{BB962C8B-B14F-4D97-AF65-F5344CB8AC3E}">
-        <p14:creationId xmlns:p14="http://schemas.microsoft.com/office/powerpoint/2010/main" val="3827873831"/>
+        <p14:creationId xmlns:p14="http://schemas.microsoft.com/office/powerpoint/2010/main" val="2785225562"/>
       </p:ext>
     </p:extLst>
   </p:cSld>
@@ -1906,8 +1911,8 @@
         </p:nvSpPr>
         <p:spPr>
           <a:xfrm>
-            <a:off x="839789" y="421217"/>
-            <a:ext cx="3932237" cy="1474258"/>
+            <a:off x="777898" y="421217"/>
+            <a:ext cx="3642439" cy="1474258"/>
           </a:xfrm>
         </p:spPr>
         <p:txBody>
@@ -1938,8 +1943,8 @@
         </p:nvSpPr>
         <p:spPr>
           <a:xfrm>
-            <a:off x="5183188" y="909711"/>
-            <a:ext cx="6172200" cy="4490053"/>
+            <a:off x="4801198" y="909711"/>
+            <a:ext cx="5717322" cy="4490053"/>
           </a:xfrm>
         </p:spPr>
         <p:txBody>
@@ -2023,8 +2028,8 @@
         </p:nvSpPr>
         <p:spPr>
           <a:xfrm>
-            <a:off x="839789" y="1895475"/>
-            <a:ext cx="3932237" cy="3511602"/>
+            <a:off x="777898" y="1895475"/>
+            <a:ext cx="3642439" cy="3511602"/>
           </a:xfrm>
         </p:spPr>
         <p:txBody>
@@ -2093,7 +2098,7 @@
           <a:p>
             <a:fld id="{93DF655C-B5A4-4D87-897F-CE3EA9D19754}" type="datetimeFigureOut">
               <a:rPr lang="en-US" smtClean="0"/>
-              <a:t>1/1/2020</a:t>
+              <a:t>1/10/2020</a:t>
             </a:fld>
             <a:endParaRPr lang="en-US"/>
           </a:p>
@@ -2144,7 +2149,7 @@
     </p:spTree>
     <p:extLst>
       <p:ext uri="{BB962C8B-B14F-4D97-AF65-F5344CB8AC3E}">
-        <p14:creationId xmlns:p14="http://schemas.microsoft.com/office/powerpoint/2010/main" val="3039600214"/>
+        <p14:creationId xmlns:p14="http://schemas.microsoft.com/office/powerpoint/2010/main" val="517608717"/>
       </p:ext>
     </p:extLst>
   </p:cSld>
@@ -2183,8 +2188,8 @@
         </p:nvSpPr>
         <p:spPr>
           <a:xfrm>
-            <a:off x="839789" y="421217"/>
-            <a:ext cx="3932237" cy="1474258"/>
+            <a:off x="777898" y="421217"/>
+            <a:ext cx="3642439" cy="1474258"/>
           </a:xfrm>
         </p:spPr>
         <p:txBody>
@@ -2215,8 +2220,8 @@
         </p:nvSpPr>
         <p:spPr>
           <a:xfrm>
-            <a:off x="5183188" y="909711"/>
-            <a:ext cx="6172200" cy="4490053"/>
+            <a:off x="4801198" y="909711"/>
+            <a:ext cx="5717322" cy="4490053"/>
           </a:xfrm>
         </p:spPr>
         <p:txBody>
@@ -2280,8 +2285,8 @@
         </p:nvSpPr>
         <p:spPr>
           <a:xfrm>
-            <a:off x="839789" y="1895475"/>
-            <a:ext cx="3932237" cy="3511602"/>
+            <a:off x="777898" y="1895475"/>
+            <a:ext cx="3642439" cy="3511602"/>
           </a:xfrm>
         </p:spPr>
         <p:txBody>
@@ -2350,7 +2355,7 @@
           <a:p>
             <a:fld id="{93DF655C-B5A4-4D87-897F-CE3EA9D19754}" type="datetimeFigureOut">
               <a:rPr lang="en-US" smtClean="0"/>
-              <a:t>1/1/2020</a:t>
+              <a:t>1/10/2020</a:t>
             </a:fld>
             <a:endParaRPr lang="en-US"/>
           </a:p>
@@ -2401,7 +2406,7 @@
     </p:spTree>
     <p:extLst>
       <p:ext uri="{BB962C8B-B14F-4D97-AF65-F5344CB8AC3E}">
-        <p14:creationId xmlns:p14="http://schemas.microsoft.com/office/powerpoint/2010/main" val="2515479204"/>
+        <p14:creationId xmlns:p14="http://schemas.microsoft.com/office/powerpoint/2010/main" val="1610541603"/>
       </p:ext>
     </p:extLst>
   </p:cSld>
@@ -2445,8 +2450,8 @@
         </p:nvSpPr>
         <p:spPr>
           <a:xfrm>
-            <a:off x="838200" y="336389"/>
-            <a:ext cx="10515600" cy="1221236"/>
+            <a:off x="776427" y="336389"/>
+            <a:ext cx="9740622" cy="1221236"/>
           </a:xfrm>
           <a:prstGeom prst="rect">
             <a:avLst/>
@@ -2478,8 +2483,8 @@
         </p:nvSpPr>
         <p:spPr>
           <a:xfrm>
-            <a:off x="838200" y="1681941"/>
-            <a:ext cx="10515600" cy="4008872"/>
+            <a:off x="776427" y="1681941"/>
+            <a:ext cx="9740622" cy="4008872"/>
           </a:xfrm>
           <a:prstGeom prst="rect">
             <a:avLst/>
@@ -2540,8 +2545,8 @@
         </p:nvSpPr>
         <p:spPr>
           <a:xfrm>
-            <a:off x="838200" y="5856082"/>
-            <a:ext cx="2743200" cy="336388"/>
+            <a:off x="776426" y="5856082"/>
+            <a:ext cx="2541032" cy="336388"/>
           </a:xfrm>
           <a:prstGeom prst="rect">
             <a:avLst/>
@@ -2563,7 +2568,7 @@
           <a:p>
             <a:fld id="{93DF655C-B5A4-4D87-897F-CE3EA9D19754}" type="datetimeFigureOut">
               <a:rPr lang="en-US" smtClean="0"/>
-              <a:t>1/1/2020</a:t>
+              <a:t>1/10/2020</a:t>
             </a:fld>
             <a:endParaRPr lang="en-US"/>
           </a:p>
@@ -2581,8 +2586,8 @@
         </p:nvSpPr>
         <p:spPr>
           <a:xfrm>
-            <a:off x="4038600" y="5856082"/>
-            <a:ext cx="4114800" cy="336388"/>
+            <a:off x="3740964" y="5856082"/>
+            <a:ext cx="3811548" cy="336388"/>
           </a:xfrm>
           <a:prstGeom prst="rect">
             <a:avLst/>
@@ -2618,8 +2623,8 @@
         </p:nvSpPr>
         <p:spPr>
           <a:xfrm>
-            <a:off x="8610600" y="5856082"/>
-            <a:ext cx="2743200" cy="336388"/>
+            <a:off x="7976017" y="5856082"/>
+            <a:ext cx="2541032" cy="336388"/>
           </a:xfrm>
           <a:prstGeom prst="rect">
             <a:avLst/>
@@ -2650,23 +2655,23 @@
     </p:spTree>
     <p:extLst>
       <p:ext uri="{BB962C8B-B14F-4D97-AF65-F5344CB8AC3E}">
-        <p14:creationId xmlns:p14="http://schemas.microsoft.com/office/powerpoint/2010/main" val="980283579"/>
+        <p14:creationId xmlns:p14="http://schemas.microsoft.com/office/powerpoint/2010/main" val="1622406701"/>
       </p:ext>
     </p:extLst>
   </p:cSld>
   <p:clrMap bg1="lt1" tx1="dk1" bg2="lt2" tx2="dk2" accent1="accent1" accent2="accent2" accent3="accent3" accent4="accent4" accent5="accent5" accent6="accent6" hlink="hlink" folHlink="folHlink"/>
   <p:sldLayoutIdLst>
-    <p:sldLayoutId id="2147483661" r:id="rId1"/>
-    <p:sldLayoutId id="2147483662" r:id="rId2"/>
-    <p:sldLayoutId id="2147483663" r:id="rId3"/>
-    <p:sldLayoutId id="2147483664" r:id="rId4"/>
-    <p:sldLayoutId id="2147483665" r:id="rId5"/>
-    <p:sldLayoutId id="2147483666" r:id="rId6"/>
-    <p:sldLayoutId id="2147483667" r:id="rId7"/>
-    <p:sldLayoutId id="2147483668" r:id="rId8"/>
-    <p:sldLayoutId id="2147483669" r:id="rId9"/>
-    <p:sldLayoutId id="2147483670" r:id="rId10"/>
-    <p:sldLayoutId id="2147483671" r:id="rId11"/>
+    <p:sldLayoutId id="2147483673" r:id="rId1"/>
+    <p:sldLayoutId id="2147483674" r:id="rId2"/>
+    <p:sldLayoutId id="2147483675" r:id="rId3"/>
+    <p:sldLayoutId id="2147483676" r:id="rId4"/>
+    <p:sldLayoutId id="2147483677" r:id="rId5"/>
+    <p:sldLayoutId id="2147483678" r:id="rId6"/>
+    <p:sldLayoutId id="2147483679" r:id="rId7"/>
+    <p:sldLayoutId id="2147483680" r:id="rId8"/>
+    <p:sldLayoutId id="2147483681" r:id="rId9"/>
+    <p:sldLayoutId id="2147483682" r:id="rId10"/>
+    <p:sldLayoutId id="2147483683" r:id="rId11"/>
   </p:sldLayoutIdLst>
   <p:txStyles>
     <p:titleStyle>
@@ -2970,10 +2975,10 @@
       </p:grpSpPr>
       <p:pic>
         <p:nvPicPr>
-          <p:cNvPr id="5" name="Picture 4" descr="A screenshot of a video game&#10;&#10;Description automatically generated">
+          <p:cNvPr id="28" name="Picture 27">
             <a:extLst>
               <a:ext uri="{FF2B5EF4-FFF2-40B4-BE49-F238E27FC236}">
-                <a16:creationId xmlns:a16="http://schemas.microsoft.com/office/drawing/2014/main" id="{50029C8D-749A-4687-8EB9-45765FBBA20D}"/>
+                <a16:creationId xmlns:a16="http://schemas.microsoft.com/office/drawing/2014/main" id="{75A81EDE-773D-4B7F-966A-C714CFEA180E}"/>
               </a:ext>
             </a:extLst>
           </p:cNvPr>
@@ -2983,13 +2988,7 @@
           <p:nvPr/>
         </p:nvPicPr>
         <p:blipFill>
-          <a:blip r:embed="rId2">
-            <a:extLst>
-              <a:ext uri="{28A0092B-C50C-407E-A947-70E740481C1C}">
-                <a14:useLocalDpi xmlns:a14="http://schemas.microsoft.com/office/drawing/2010/main" val="0"/>
-              </a:ext>
-            </a:extLst>
-          </a:blip>
+          <a:blip r:embed="rId2"/>
           <a:stretch>
             <a:fillRect/>
           </a:stretch>
@@ -2997,7 +2996,7 @@
         <p:spPr>
           <a:xfrm>
             <a:off x="0" y="0"/>
-            <a:ext cx="12192000" cy="6321778"/>
+            <a:ext cx="11295758" cy="6318250"/>
           </a:xfrm>
           <a:prstGeom prst="rect">
             <a:avLst/>
@@ -3006,10 +3005,10 @@
       </p:pic>
       <p:sp>
         <p:nvSpPr>
-          <p:cNvPr id="6" name="TextBox 5">
+          <p:cNvPr id="29" name="TextBox 28">
             <a:extLst>
               <a:ext uri="{FF2B5EF4-FFF2-40B4-BE49-F238E27FC236}">
-                <a16:creationId xmlns:a16="http://schemas.microsoft.com/office/drawing/2014/main" id="{A6E82426-2363-4D8E-9988-C0A5169D1408}"/>
+                <a16:creationId xmlns:a16="http://schemas.microsoft.com/office/drawing/2014/main" id="{CB30FE2A-95E5-48CC-806D-A036364C3F4C}"/>
               </a:ext>
             </a:extLst>
           </p:cNvPr>
@@ -3018,8 +3017,8 @@
         </p:nvSpPr>
         <p:spPr>
           <a:xfrm>
-            <a:off x="111967" y="5083237"/>
-            <a:ext cx="1129004" cy="369332"/>
+            <a:off x="65314" y="5271610"/>
+            <a:ext cx="778329" cy="646331"/>
           </a:xfrm>
           <a:prstGeom prst="rect">
             <a:avLst/>
@@ -3081,10 +3080,10 @@
       </p:sp>
       <p:sp>
         <p:nvSpPr>
-          <p:cNvPr id="7" name="TextBox 6">
+          <p:cNvPr id="30" name="TextBox 29">
             <a:extLst>
               <a:ext uri="{FF2B5EF4-FFF2-40B4-BE49-F238E27FC236}">
-                <a16:creationId xmlns:a16="http://schemas.microsoft.com/office/drawing/2014/main" id="{ECD9B4C1-4A18-49AD-A342-8CF621F395F5}"/>
+                <a16:creationId xmlns:a16="http://schemas.microsoft.com/office/drawing/2014/main" id="{834BFE88-1277-4AFB-8CC6-4D2D3E97CBEB}"/>
               </a:ext>
             </a:extLst>
           </p:cNvPr>
@@ -3093,7 +3092,7 @@
         </p:nvSpPr>
         <p:spPr>
           <a:xfrm>
-            <a:off x="5480957" y="5114720"/>
+            <a:off x="5099910" y="5531825"/>
             <a:ext cx="1230086" cy="369332"/>
           </a:xfrm>
           <a:prstGeom prst="rect">
@@ -3156,10 +3155,10 @@
       </p:sp>
       <p:sp>
         <p:nvSpPr>
-          <p:cNvPr id="8" name="TextBox 7">
+          <p:cNvPr id="31" name="TextBox 30">
             <a:extLst>
               <a:ext uri="{FF2B5EF4-FFF2-40B4-BE49-F238E27FC236}">
-                <a16:creationId xmlns:a16="http://schemas.microsoft.com/office/drawing/2014/main" id="{6CB56203-9266-4ACC-AAA7-8D048215ADB6}"/>
+                <a16:creationId xmlns:a16="http://schemas.microsoft.com/office/drawing/2014/main" id="{2AA3C42C-B276-4E51-B1D8-5FC1D2BC5745}"/>
               </a:ext>
             </a:extLst>
           </p:cNvPr>
@@ -3168,7 +3167,7 @@
         </p:nvSpPr>
         <p:spPr>
           <a:xfrm>
-            <a:off x="6095222" y="951701"/>
+            <a:off x="3934409" y="609580"/>
             <a:ext cx="615821" cy="307777"/>
           </a:xfrm>
           <a:prstGeom prst="rect">
@@ -3231,10 +3230,10 @@
       </p:sp>
       <p:sp>
         <p:nvSpPr>
-          <p:cNvPr id="9" name="TextBox 8">
+          <p:cNvPr id="32" name="TextBox 31">
             <a:extLst>
               <a:ext uri="{FF2B5EF4-FFF2-40B4-BE49-F238E27FC236}">
-                <a16:creationId xmlns:a16="http://schemas.microsoft.com/office/drawing/2014/main" id="{EB52E3E6-6CCD-4178-84C4-024C577D460A}"/>
+                <a16:creationId xmlns:a16="http://schemas.microsoft.com/office/drawing/2014/main" id="{63CBA88A-F69F-47E2-AFB4-C5BA616F7532}"/>
               </a:ext>
             </a:extLst>
           </p:cNvPr>
@@ -3243,8 +3242,8 @@
         </p:nvSpPr>
         <p:spPr>
           <a:xfrm>
-            <a:off x="2015024" y="1862364"/>
-            <a:ext cx="559643" cy="307777"/>
+            <a:off x="1010252" y="2156966"/>
+            <a:ext cx="559642" cy="307777"/>
           </a:xfrm>
           <a:prstGeom prst="rect">
             <a:avLst/>
@@ -3307,23 +3306,23 @@
       </p:sp>
       <p:cxnSp>
         <p:nvCxnSpPr>
-          <p:cNvPr id="11" name="Straight Arrow Connector 10">
+          <p:cNvPr id="36" name="Straight Arrow Connector 35">
             <a:extLst>
               <a:ext uri="{FF2B5EF4-FFF2-40B4-BE49-F238E27FC236}">
-                <a16:creationId xmlns:a16="http://schemas.microsoft.com/office/drawing/2014/main" id="{E4575254-FAE9-4B3D-A79E-3C004F0818F6}"/>
+                <a16:creationId xmlns:a16="http://schemas.microsoft.com/office/drawing/2014/main" id="{2F865C1D-780A-47F4-9864-01ED1FA1FFCE}"/>
               </a:ext>
             </a:extLst>
           </p:cNvPr>
           <p:cNvCxnSpPr>
             <a:cxnSpLocks/>
-            <a:stCxn id="9" idx="3"/>
+            <a:stCxn id="32" idx="3"/>
           </p:cNvCxnSpPr>
           <p:nvPr/>
         </p:nvCxnSpPr>
         <p:spPr>
           <a:xfrm>
-            <a:off x="2574667" y="2016253"/>
-            <a:ext cx="844808" cy="574547"/>
+            <a:off x="1569894" y="2310855"/>
+            <a:ext cx="274941" cy="278636"/>
           </a:xfrm>
           <a:prstGeom prst="straightConnector1">
             <a:avLst/>
@@ -3352,23 +3351,23 @@
       </p:cxnSp>
       <p:cxnSp>
         <p:nvCxnSpPr>
-          <p:cNvPr id="12" name="Straight Arrow Connector 11">
+          <p:cNvPr id="37" name="Straight Arrow Connector 36">
             <a:extLst>
               <a:ext uri="{FF2B5EF4-FFF2-40B4-BE49-F238E27FC236}">
-                <a16:creationId xmlns:a16="http://schemas.microsoft.com/office/drawing/2014/main" id="{340A9C9B-3084-4744-AB28-23689BE0D1DE}"/>
+                <a16:creationId xmlns:a16="http://schemas.microsoft.com/office/drawing/2014/main" id="{54D9868B-417E-413A-8FF0-2BC60A70F022}"/>
               </a:ext>
             </a:extLst>
           </p:cNvPr>
           <p:cNvCxnSpPr>
             <a:cxnSpLocks/>
-            <a:stCxn id="9" idx="1"/>
+            <a:stCxn id="32" idx="1"/>
           </p:cNvCxnSpPr>
           <p:nvPr/>
         </p:nvCxnSpPr>
         <p:spPr>
           <a:xfrm flipH="1">
-            <a:off x="914400" y="2016253"/>
-            <a:ext cx="1100624" cy="817435"/>
+            <a:off x="684944" y="2310855"/>
+            <a:ext cx="325308" cy="633731"/>
           </a:xfrm>
           <a:prstGeom prst="straightConnector1">
             <a:avLst/>
@@ -3397,10 +3396,10 @@
       </p:cxnSp>
       <p:sp>
         <p:nvSpPr>
-          <p:cNvPr id="19" name="TextBox 18">
+          <p:cNvPr id="38" name="TextBox 37">
             <a:extLst>
               <a:ext uri="{FF2B5EF4-FFF2-40B4-BE49-F238E27FC236}">
-                <a16:creationId xmlns:a16="http://schemas.microsoft.com/office/drawing/2014/main" id="{DA59602F-2AFA-4B06-86AA-E0206F65C852}"/>
+                <a16:creationId xmlns:a16="http://schemas.microsoft.com/office/drawing/2014/main" id="{EA7BAFB4-ABC0-4AFD-9C4F-CEF28ADC826E}"/>
               </a:ext>
             </a:extLst>
           </p:cNvPr>
@@ -3409,8 +3408,8 @@
         </p:nvSpPr>
         <p:spPr>
           <a:xfrm>
-            <a:off x="5153027" y="1877753"/>
-            <a:ext cx="757236" cy="276999"/>
+            <a:off x="5561512" y="1932948"/>
+            <a:ext cx="884950" cy="277127"/>
           </a:xfrm>
           <a:prstGeom prst="rect">
             <a:avLst/>
@@ -3464,31 +3463,31 @@
           <a:p>
             <a:pPr algn="ctr"/>
             <a:r>
-              <a:rPr lang="en-US" sz="1200" dirty="0"/>
-              <a:t>insertion</a:t>
+              <a:rPr lang="en-US" sz="1201" dirty="0"/>
+              <a:t>insertions</a:t>
             </a:r>
           </a:p>
         </p:txBody>
       </p:sp>
       <p:cxnSp>
         <p:nvCxnSpPr>
-          <p:cNvPr id="20" name="Straight Arrow Connector 19">
+          <p:cNvPr id="39" name="Straight Arrow Connector 38">
             <a:extLst>
               <a:ext uri="{FF2B5EF4-FFF2-40B4-BE49-F238E27FC236}">
-                <a16:creationId xmlns:a16="http://schemas.microsoft.com/office/drawing/2014/main" id="{D2D021A1-A28A-4D8B-B0C4-0D64D5FF18E3}"/>
+                <a16:creationId xmlns:a16="http://schemas.microsoft.com/office/drawing/2014/main" id="{670B0890-518C-4A5C-ACE5-1F22EC0084A6}"/>
               </a:ext>
             </a:extLst>
           </p:cNvPr>
           <p:cNvCxnSpPr>
             <a:cxnSpLocks/>
-            <a:stCxn id="19" idx="2"/>
+            <a:stCxn id="38" idx="3"/>
           </p:cNvCxnSpPr>
           <p:nvPr/>
         </p:nvCxnSpPr>
         <p:spPr>
           <a:xfrm>
-            <a:off x="5531645" y="2154752"/>
-            <a:ext cx="506330" cy="378898"/>
+            <a:off x="6446462" y="2071512"/>
+            <a:ext cx="247669" cy="365295"/>
           </a:xfrm>
           <a:prstGeom prst="straightConnector1">
             <a:avLst/>
@@ -3517,23 +3516,23 @@
       </p:cxnSp>
       <p:cxnSp>
         <p:nvCxnSpPr>
-          <p:cNvPr id="21" name="Straight Arrow Connector 20">
+          <p:cNvPr id="42" name="Straight Arrow Connector 41">
             <a:extLst>
               <a:ext uri="{FF2B5EF4-FFF2-40B4-BE49-F238E27FC236}">
-                <a16:creationId xmlns:a16="http://schemas.microsoft.com/office/drawing/2014/main" id="{1F968394-DC51-4AF0-A332-4AEC6E99CE82}"/>
+                <a16:creationId xmlns:a16="http://schemas.microsoft.com/office/drawing/2014/main" id="{5784492A-BC77-42C9-834F-DEBE86F819E6}"/>
               </a:ext>
             </a:extLst>
           </p:cNvPr>
           <p:cNvCxnSpPr>
             <a:cxnSpLocks/>
-            <a:stCxn id="19" idx="1"/>
+            <a:stCxn id="38" idx="1"/>
           </p:cNvCxnSpPr>
           <p:nvPr/>
         </p:nvCxnSpPr>
         <p:spPr>
           <a:xfrm flipH="1">
-            <a:off x="4900613" y="2016253"/>
-            <a:ext cx="252414" cy="517397"/>
+            <a:off x="5192486" y="2071512"/>
+            <a:ext cx="369026" cy="393231"/>
           </a:xfrm>
           <a:prstGeom prst="straightConnector1">
             <a:avLst/>
@@ -3562,10 +3561,10 @@
       </p:cxnSp>
       <p:sp>
         <p:nvSpPr>
-          <p:cNvPr id="33" name="TextBox 32">
+          <p:cNvPr id="43" name="TextBox 42">
             <a:extLst>
               <a:ext uri="{FF2B5EF4-FFF2-40B4-BE49-F238E27FC236}">
-                <a16:creationId xmlns:a16="http://schemas.microsoft.com/office/drawing/2014/main" id="{26A4A56D-5B8B-4F61-BC82-FF552FC95ACD}"/>
+                <a16:creationId xmlns:a16="http://schemas.microsoft.com/office/drawing/2014/main" id="{D8ACECEE-31D6-48E0-88FC-70B2AAE5B739}"/>
               </a:ext>
             </a:extLst>
           </p:cNvPr>
@@ -3574,8 +3573,8 @@
         </p:nvSpPr>
         <p:spPr>
           <a:xfrm>
-            <a:off x="6137407" y="1870717"/>
-            <a:ext cx="757236" cy="276999"/>
+            <a:off x="5541365" y="4620068"/>
+            <a:ext cx="757236" cy="277127"/>
           </a:xfrm>
           <a:prstGeom prst="rect">
             <a:avLst/>
@@ -3629,7 +3628,7 @@
           <a:p>
             <a:pPr algn="ctr"/>
             <a:r>
-              <a:rPr lang="en-US" sz="1200" dirty="0"/>
+              <a:rPr lang="en-US" sz="1201" dirty="0"/>
               <a:t>deletion</a:t>
             </a:r>
           </a:p>
@@ -3637,23 +3636,23 @@
       </p:sp>
       <p:cxnSp>
         <p:nvCxnSpPr>
-          <p:cNvPr id="34" name="Straight Arrow Connector 33">
+          <p:cNvPr id="46" name="Straight Arrow Connector 45">
             <a:extLst>
               <a:ext uri="{FF2B5EF4-FFF2-40B4-BE49-F238E27FC236}">
-                <a16:creationId xmlns:a16="http://schemas.microsoft.com/office/drawing/2014/main" id="{EB52C166-C8B7-4D56-A7B2-335323390190}"/>
+                <a16:creationId xmlns:a16="http://schemas.microsoft.com/office/drawing/2014/main" id="{14A855A2-5A05-486E-8F90-AF62AB3B93E5}"/>
               </a:ext>
             </a:extLst>
           </p:cNvPr>
           <p:cNvCxnSpPr>
             <a:cxnSpLocks/>
-            <a:stCxn id="33" idx="2"/>
+            <a:stCxn id="43" idx="0"/>
           </p:cNvCxnSpPr>
           <p:nvPr/>
         </p:nvCxnSpPr>
         <p:spPr>
-          <a:xfrm>
-            <a:off x="6516025" y="2147716"/>
-            <a:ext cx="118140" cy="546098"/>
+          <a:xfrm flipV="1">
+            <a:off x="5919983" y="4143023"/>
+            <a:ext cx="0" cy="477045"/>
           </a:xfrm>
           <a:prstGeom prst="straightConnector1">
             <a:avLst/>
@@ -3680,57 +3679,12 @@
           </a:fontRef>
         </p:style>
       </p:cxnSp>
-      <p:cxnSp>
-        <p:nvCxnSpPr>
-          <p:cNvPr id="35" name="Straight Arrow Connector 34">
+      <p:sp>
+        <p:nvSpPr>
+          <p:cNvPr id="48" name="TextBox 47">
             <a:extLst>
               <a:ext uri="{FF2B5EF4-FFF2-40B4-BE49-F238E27FC236}">
-                <a16:creationId xmlns:a16="http://schemas.microsoft.com/office/drawing/2014/main" id="{1042751D-A472-4A57-A6CF-228B55BC0127}"/>
-              </a:ext>
-            </a:extLst>
-          </p:cNvPr>
-          <p:cNvCxnSpPr>
-            <a:cxnSpLocks/>
-            <a:stCxn id="33" idx="1"/>
-          </p:cNvCxnSpPr>
-          <p:nvPr/>
-        </p:nvCxnSpPr>
-        <p:spPr>
-          <a:xfrm flipH="1">
-            <a:off x="5519010" y="2009217"/>
-            <a:ext cx="618397" cy="684597"/>
-          </a:xfrm>
-          <a:prstGeom prst="straightConnector1">
-            <a:avLst/>
-          </a:prstGeom>
-          <a:ln w="38100">
-            <a:solidFill>
-              <a:schemeClr val="tx1"/>
-            </a:solidFill>
-            <a:tailEnd type="triangle"/>
-          </a:ln>
-        </p:spPr>
-        <p:style>
-          <a:lnRef idx="1">
-            <a:schemeClr val="accent1"/>
-          </a:lnRef>
-          <a:fillRef idx="0">
-            <a:schemeClr val="accent1"/>
-          </a:fillRef>
-          <a:effectRef idx="0">
-            <a:schemeClr val="accent1"/>
-          </a:effectRef>
-          <a:fontRef idx="minor">
-            <a:schemeClr val="tx1"/>
-          </a:fontRef>
-        </p:style>
-      </p:cxnSp>
-      <p:sp>
-        <p:nvSpPr>
-          <p:cNvPr id="40" name="TextBox 39">
-            <a:extLst>
-              <a:ext uri="{FF2B5EF4-FFF2-40B4-BE49-F238E27FC236}">
-                <a16:creationId xmlns:a16="http://schemas.microsoft.com/office/drawing/2014/main" id="{EBD5832B-F776-415A-8D93-07A8A792B5CC}"/>
+                <a16:creationId xmlns:a16="http://schemas.microsoft.com/office/drawing/2014/main" id="{2F8A99B3-094A-4B2F-A017-7A805FEDE55E}"/>
               </a:ext>
             </a:extLst>
           </p:cNvPr>
@@ -3739,8 +3693,8 @@
         </p:nvSpPr>
         <p:spPr>
           <a:xfrm>
-            <a:off x="4648201" y="3822766"/>
-            <a:ext cx="832755" cy="276999"/>
+            <a:off x="4744394" y="3477542"/>
+            <a:ext cx="832755" cy="277127"/>
           </a:xfrm>
           <a:prstGeom prst="rect">
             <a:avLst/>
@@ -3794,7 +3748,7 @@
           <a:p>
             <a:pPr algn="ctr"/>
             <a:r>
-              <a:rPr lang="en-US" sz="1200" dirty="0"/>
+              <a:rPr lang="en-US" sz="1201" dirty="0"/>
               <a:t>crossover</a:t>
             </a:r>
           </a:p>
@@ -3802,23 +3756,23 @@
       </p:sp>
       <p:cxnSp>
         <p:nvCxnSpPr>
-          <p:cNvPr id="41" name="Straight Arrow Connector 40">
+          <p:cNvPr id="49" name="Straight Arrow Connector 48">
             <a:extLst>
               <a:ext uri="{FF2B5EF4-FFF2-40B4-BE49-F238E27FC236}">
-                <a16:creationId xmlns:a16="http://schemas.microsoft.com/office/drawing/2014/main" id="{67FD0629-BD51-4F43-8C34-2F4EF66AC276}"/>
+                <a16:creationId xmlns:a16="http://schemas.microsoft.com/office/drawing/2014/main" id="{B4A8017D-C686-41EC-A71B-F3AB0E58879F}"/>
               </a:ext>
             </a:extLst>
           </p:cNvPr>
           <p:cNvCxnSpPr>
             <a:cxnSpLocks/>
-            <a:stCxn id="40" idx="1"/>
+            <a:stCxn id="48" idx="1"/>
           </p:cNvCxnSpPr>
           <p:nvPr/>
         </p:nvCxnSpPr>
         <p:spPr>
           <a:xfrm flipH="1" flipV="1">
-            <a:off x="4320541" y="3159126"/>
-            <a:ext cx="327660" cy="802140"/>
+            <a:off x="4232024" y="3492130"/>
+            <a:ext cx="512370" cy="123976"/>
           </a:xfrm>
           <a:prstGeom prst="straightConnector1">
             <a:avLst/>
@@ -3847,23 +3801,23 @@
       </p:cxnSp>
       <p:cxnSp>
         <p:nvCxnSpPr>
-          <p:cNvPr id="44" name="Straight Arrow Connector 43">
+          <p:cNvPr id="53" name="Straight Arrow Connector 52">
             <a:extLst>
               <a:ext uri="{FF2B5EF4-FFF2-40B4-BE49-F238E27FC236}">
-                <a16:creationId xmlns:a16="http://schemas.microsoft.com/office/drawing/2014/main" id="{07749597-BF2D-4114-856C-CB43C20FBAF7}"/>
+                <a16:creationId xmlns:a16="http://schemas.microsoft.com/office/drawing/2014/main" id="{BEC23C9C-F04A-4D5F-9F93-9CDEF9A923A3}"/>
               </a:ext>
             </a:extLst>
           </p:cNvPr>
           <p:cNvCxnSpPr>
             <a:cxnSpLocks/>
-            <a:stCxn id="40" idx="0"/>
+            <a:stCxn id="48" idx="3"/>
           </p:cNvCxnSpPr>
           <p:nvPr/>
         </p:nvCxnSpPr>
         <p:spPr>
           <a:xfrm flipV="1">
-            <a:off x="5064579" y="3159124"/>
-            <a:ext cx="658041" cy="663642"/>
+            <a:off x="5577149" y="3491164"/>
+            <a:ext cx="738364" cy="124942"/>
           </a:xfrm>
           <a:prstGeom prst="straightConnector1">
             <a:avLst/>
@@ -3890,57 +3844,12 @@
           </a:fontRef>
         </p:style>
       </p:cxnSp>
-      <p:cxnSp>
-        <p:nvCxnSpPr>
-          <p:cNvPr id="47" name="Straight Arrow Connector 46">
+      <p:sp>
+        <p:nvSpPr>
+          <p:cNvPr id="57" name="TextBox 56">
             <a:extLst>
               <a:ext uri="{FF2B5EF4-FFF2-40B4-BE49-F238E27FC236}">
-                <a16:creationId xmlns:a16="http://schemas.microsoft.com/office/drawing/2014/main" id="{5B150539-0E64-4520-A506-61E756BC8562}"/>
-              </a:ext>
-            </a:extLst>
-          </p:cNvPr>
-          <p:cNvCxnSpPr>
-            <a:cxnSpLocks/>
-            <a:stCxn id="40" idx="3"/>
-          </p:cNvCxnSpPr>
-          <p:nvPr/>
-        </p:nvCxnSpPr>
-        <p:spPr>
-          <a:xfrm flipV="1">
-            <a:off x="5480956" y="3173026"/>
-            <a:ext cx="394064" cy="788240"/>
-          </a:xfrm>
-          <a:prstGeom prst="straightConnector1">
-            <a:avLst/>
-          </a:prstGeom>
-          <a:ln w="38100">
-            <a:solidFill>
-              <a:schemeClr val="tx1"/>
-            </a:solidFill>
-            <a:tailEnd type="triangle"/>
-          </a:ln>
-        </p:spPr>
-        <p:style>
-          <a:lnRef idx="1">
-            <a:schemeClr val="accent1"/>
-          </a:lnRef>
-          <a:fillRef idx="0">
-            <a:schemeClr val="accent1"/>
-          </a:fillRef>
-          <a:effectRef idx="0">
-            <a:schemeClr val="accent1"/>
-          </a:effectRef>
-          <a:fontRef idx="minor">
-            <a:schemeClr val="tx1"/>
-          </a:fontRef>
-        </p:style>
-      </p:cxnSp>
-      <p:sp>
-        <p:nvSpPr>
-          <p:cNvPr id="50" name="TextBox 49">
-            <a:extLst>
-              <a:ext uri="{FF2B5EF4-FFF2-40B4-BE49-F238E27FC236}">
-                <a16:creationId xmlns:a16="http://schemas.microsoft.com/office/drawing/2014/main" id="{74BA197A-04C0-4857-90A7-4F9263E4EB26}"/>
+                <a16:creationId xmlns:a16="http://schemas.microsoft.com/office/drawing/2014/main" id="{392D63F9-4C1C-4B6F-9577-049413F58489}"/>
               </a:ext>
             </a:extLst>
           </p:cNvPr>
@@ -3949,8 +3858,8 @@
         </p:nvSpPr>
         <p:spPr>
           <a:xfrm>
-            <a:off x="7631977" y="3034526"/>
-            <a:ext cx="832755" cy="276999"/>
+            <a:off x="9117878" y="3328441"/>
+            <a:ext cx="832755" cy="277127"/>
           </a:xfrm>
           <a:prstGeom prst="rect">
             <a:avLst/>
@@ -4004,32 +3913,32 @@
           <a:p>
             <a:pPr algn="ctr"/>
             <a:r>
-              <a:rPr lang="en-US" sz="1200" dirty="0" err="1"/>
+              <a:rPr lang="en-US" sz="1201" dirty="0" err="1"/>
               <a:t>loopout</a:t>
             </a:r>
-            <a:endParaRPr lang="en-US" sz="1200" dirty="0"/>
+            <a:endParaRPr lang="en-US" sz="1201" dirty="0"/>
           </a:p>
         </p:txBody>
       </p:sp>
       <p:cxnSp>
         <p:nvCxnSpPr>
-          <p:cNvPr id="51" name="Straight Arrow Connector 50">
+          <p:cNvPr id="58" name="Straight Arrow Connector 57">
             <a:extLst>
               <a:ext uri="{FF2B5EF4-FFF2-40B4-BE49-F238E27FC236}">
-                <a16:creationId xmlns:a16="http://schemas.microsoft.com/office/drawing/2014/main" id="{94D514E6-25DD-4603-B6E9-3CC1F01C1C80}"/>
+                <a16:creationId xmlns:a16="http://schemas.microsoft.com/office/drawing/2014/main" id="{BF974F81-A01B-4A14-B5ED-611E46AC83DF}"/>
               </a:ext>
             </a:extLst>
           </p:cNvPr>
           <p:cNvCxnSpPr>
             <a:cxnSpLocks/>
-            <a:stCxn id="50" idx="1"/>
+            <a:stCxn id="57" idx="1"/>
           </p:cNvCxnSpPr>
           <p:nvPr/>
         </p:nvCxnSpPr>
         <p:spPr>
-          <a:xfrm flipH="1">
-            <a:off x="7292340" y="3173026"/>
-            <a:ext cx="339637" cy="0"/>
+          <a:xfrm flipH="1" flipV="1">
+            <a:off x="8778242" y="3466941"/>
+            <a:ext cx="339636" cy="64"/>
           </a:xfrm>
           <a:prstGeom prst="straightConnector1">
             <a:avLst/>
@@ -4058,10 +3967,10 @@
       </p:cxnSp>
       <p:sp>
         <p:nvSpPr>
-          <p:cNvPr id="54" name="TextBox 53">
+          <p:cNvPr id="60" name="TextBox 59">
             <a:extLst>
               <a:ext uri="{FF2B5EF4-FFF2-40B4-BE49-F238E27FC236}">
-                <a16:creationId xmlns:a16="http://schemas.microsoft.com/office/drawing/2014/main" id="{B1531EDD-4191-4EA7-89E0-E8BC6409CFB6}"/>
+                <a16:creationId xmlns:a16="http://schemas.microsoft.com/office/drawing/2014/main" id="{F1F18B27-7D17-4079-8264-2CE44C3098EC}"/>
               </a:ext>
             </a:extLst>
           </p:cNvPr>
@@ -4070,8 +3979,8 @@
         </p:nvSpPr>
         <p:spPr>
           <a:xfrm>
-            <a:off x="5509933" y="4575658"/>
-            <a:ext cx="832755" cy="276999"/>
+            <a:off x="9117878" y="2450927"/>
+            <a:ext cx="832755" cy="277127"/>
           </a:xfrm>
           <a:prstGeom prst="rect">
             <a:avLst/>
@@ -4125,7 +4034,7 @@
           <a:p>
             <a:pPr algn="ctr"/>
             <a:r>
-              <a:rPr lang="en-US" sz="1200" dirty="0"/>
+              <a:rPr lang="en-US" sz="1201" dirty="0"/>
               <a:t>5’ end</a:t>
             </a:r>
           </a:p>
@@ -4133,10 +4042,10 @@
       </p:sp>
       <p:sp>
         <p:nvSpPr>
-          <p:cNvPr id="55" name="TextBox 54">
+          <p:cNvPr id="61" name="TextBox 60">
             <a:extLst>
               <a:ext uri="{FF2B5EF4-FFF2-40B4-BE49-F238E27FC236}">
-                <a16:creationId xmlns:a16="http://schemas.microsoft.com/office/drawing/2014/main" id="{B249D13C-0125-494E-A0F3-FFBCC3DE399C}"/>
+                <a16:creationId xmlns:a16="http://schemas.microsoft.com/office/drawing/2014/main" id="{1B86553E-BD89-421D-92F8-E8EF681B9FDA}"/>
               </a:ext>
             </a:extLst>
           </p:cNvPr>
@@ -4145,8 +4054,8 @@
         </p:nvSpPr>
         <p:spPr>
           <a:xfrm>
-            <a:off x="6894643" y="4539652"/>
-            <a:ext cx="832755" cy="276999"/>
+            <a:off x="9077231" y="4202908"/>
+            <a:ext cx="832755" cy="277127"/>
           </a:xfrm>
           <a:prstGeom prst="rect">
             <a:avLst/>
@@ -4200,7 +4109,7 @@
           <a:p>
             <a:pPr algn="ctr"/>
             <a:r>
-              <a:rPr lang="en-US" sz="1200" dirty="0"/>
+              <a:rPr lang="en-US" sz="1201" dirty="0"/>
               <a:t>3’ end</a:t>
             </a:r>
           </a:p>
@@ -4208,23 +4117,23 @@
       </p:sp>
       <p:cxnSp>
         <p:nvCxnSpPr>
-          <p:cNvPr id="56" name="Straight Arrow Connector 55">
+          <p:cNvPr id="62" name="Straight Arrow Connector 61">
             <a:extLst>
               <a:ext uri="{FF2B5EF4-FFF2-40B4-BE49-F238E27FC236}">
-                <a16:creationId xmlns:a16="http://schemas.microsoft.com/office/drawing/2014/main" id="{0BEF8510-B150-4B58-AD47-C0074F04CECA}"/>
+                <a16:creationId xmlns:a16="http://schemas.microsoft.com/office/drawing/2014/main" id="{F1A1C5F4-FE8B-4F15-A2BC-2FC615654D90}"/>
               </a:ext>
             </a:extLst>
           </p:cNvPr>
           <p:cNvCxnSpPr>
             <a:cxnSpLocks/>
-            <a:stCxn id="54" idx="1"/>
+            <a:stCxn id="60" idx="1"/>
           </p:cNvCxnSpPr>
           <p:nvPr/>
         </p:nvCxnSpPr>
         <p:spPr>
-          <a:xfrm flipH="1" flipV="1">
-            <a:off x="4314553" y="4175760"/>
-            <a:ext cx="1195380" cy="538398"/>
+          <a:xfrm flipH="1">
+            <a:off x="8719457" y="2589491"/>
+            <a:ext cx="398421" cy="400318"/>
           </a:xfrm>
           <a:prstGeom prst="straightConnector1">
             <a:avLst/>
@@ -4253,23 +4162,23 @@
       </p:cxnSp>
       <p:cxnSp>
         <p:nvCxnSpPr>
-          <p:cNvPr id="59" name="Straight Arrow Connector 58">
+          <p:cNvPr id="65" name="Straight Arrow Connector 64">
             <a:extLst>
               <a:ext uri="{FF2B5EF4-FFF2-40B4-BE49-F238E27FC236}">
-                <a16:creationId xmlns:a16="http://schemas.microsoft.com/office/drawing/2014/main" id="{B1DF76C7-1AD0-4059-9095-ECB02A8A0272}"/>
+                <a16:creationId xmlns:a16="http://schemas.microsoft.com/office/drawing/2014/main" id="{D7BA36F5-F2F9-459C-8B32-D8DB898ECB9D}"/>
               </a:ext>
             </a:extLst>
           </p:cNvPr>
           <p:cNvCxnSpPr>
             <a:cxnSpLocks/>
-            <a:stCxn id="54" idx="0"/>
+            <a:stCxn id="61" idx="1"/>
           </p:cNvCxnSpPr>
           <p:nvPr/>
         </p:nvCxnSpPr>
         <p:spPr>
           <a:xfrm flipH="1" flipV="1">
-            <a:off x="5855494" y="4202906"/>
-            <a:ext cx="70817" cy="372752"/>
+            <a:off x="8665029" y="3944137"/>
+            <a:ext cx="412202" cy="397335"/>
           </a:xfrm>
           <a:prstGeom prst="straightConnector1">
             <a:avLst/>
@@ -4296,70 +4205,101 @@
           </a:fontRef>
         </p:style>
       </p:cxnSp>
+      <p:sp>
+        <p:nvSpPr>
+          <p:cNvPr id="83" name="TextBox 82">
+            <a:extLst>
+              <a:ext uri="{FF2B5EF4-FFF2-40B4-BE49-F238E27FC236}">
+                <a16:creationId xmlns:a16="http://schemas.microsoft.com/office/drawing/2014/main" id="{E7401456-5654-4573-B895-0E4BCC0E8750}"/>
+              </a:ext>
+            </a:extLst>
+          </p:cNvPr>
+          <p:cNvSpPr txBox="1"/>
+          <p:nvPr/>
+        </p:nvSpPr>
+        <p:spPr>
+          <a:xfrm>
+            <a:off x="2993571" y="4656816"/>
+            <a:ext cx="988080" cy="523220"/>
+          </a:xfrm>
+          <a:prstGeom prst="rect">
+            <a:avLst/>
+          </a:prstGeom>
+          <a:gradFill flip="none" rotWithShape="1">
+            <a:gsLst>
+              <a:gs pos="0">
+                <a:schemeClr val="accent2">
+                  <a:lumMod val="67000"/>
+                </a:schemeClr>
+              </a:gs>
+              <a:gs pos="48000">
+                <a:schemeClr val="accent2">
+                  <a:lumMod val="97000"/>
+                  <a:lumOff val="3000"/>
+                </a:schemeClr>
+              </a:gs>
+              <a:gs pos="100000">
+                <a:schemeClr val="accent2">
+                  <a:lumMod val="60000"/>
+                  <a:lumOff val="40000"/>
+                </a:schemeClr>
+              </a:gs>
+            </a:gsLst>
+            <a:lin ang="16200000" scaled="1"/>
+            <a:tileRect/>
+          </a:gradFill>
+          <a:ln>
+            <a:noFill/>
+          </a:ln>
+        </p:spPr>
+        <p:style>
+          <a:lnRef idx="0">
+            <a:scrgbClr r="0" g="0" b="0"/>
+          </a:lnRef>
+          <a:fillRef idx="0">
+            <a:scrgbClr r="0" g="0" b="0"/>
+          </a:fillRef>
+          <a:effectRef idx="0">
+            <a:scrgbClr r="0" g="0" b="0"/>
+          </a:effectRef>
+          <a:fontRef idx="minor">
+            <a:schemeClr val="lt1"/>
+          </a:fontRef>
+        </p:style>
+        <p:txBody>
+          <a:bodyPr wrap="square" rtlCol="0">
+            <a:spAutoFit/>
+          </a:bodyPr>
+          <a:lstStyle/>
+          <a:p>
+            <a:pPr algn="ctr"/>
+            <a:r>
+              <a:rPr lang="en-US" sz="1400" dirty="0"/>
+              <a:t>offset 3 on helix 1</a:t>
+            </a:r>
+            <a:endParaRPr lang="en-US" sz="1100" dirty="0"/>
+          </a:p>
+        </p:txBody>
+      </p:sp>
       <p:cxnSp>
         <p:nvCxnSpPr>
-          <p:cNvPr id="63" name="Straight Arrow Connector 62">
+          <p:cNvPr id="84" name="Straight Arrow Connector 83">
             <a:extLst>
               <a:ext uri="{FF2B5EF4-FFF2-40B4-BE49-F238E27FC236}">
-                <a16:creationId xmlns:a16="http://schemas.microsoft.com/office/drawing/2014/main" id="{E0C1E6CF-F553-4B26-99FC-68D224DAF2EC}"/>
+                <a16:creationId xmlns:a16="http://schemas.microsoft.com/office/drawing/2014/main" id="{C2344E17-461C-4DFF-8581-21AF8675FB39}"/>
               </a:ext>
             </a:extLst>
           </p:cNvPr>
           <p:cNvCxnSpPr>
             <a:cxnSpLocks/>
-            <a:stCxn id="55" idx="0"/>
-          </p:cNvCxnSpPr>
-          <p:nvPr/>
-        </p:nvCxnSpPr>
-        <p:spPr>
-          <a:xfrm flipH="1" flipV="1">
-            <a:off x="7292340" y="4202906"/>
-            <a:ext cx="18681" cy="336746"/>
-          </a:xfrm>
-          <a:prstGeom prst="straightConnector1">
-            <a:avLst/>
-          </a:prstGeom>
-          <a:ln w="38100">
-            <a:solidFill>
-              <a:schemeClr val="tx1"/>
-            </a:solidFill>
-            <a:tailEnd type="triangle"/>
-          </a:ln>
-        </p:spPr>
-        <p:style>
-          <a:lnRef idx="1">
-            <a:schemeClr val="accent1"/>
-          </a:lnRef>
-          <a:fillRef idx="0">
-            <a:schemeClr val="accent1"/>
-          </a:fillRef>
-          <a:effectRef idx="0">
-            <a:schemeClr val="accent1"/>
-          </a:effectRef>
-          <a:fontRef idx="minor">
-            <a:schemeClr val="tx1"/>
-          </a:fontRef>
-        </p:style>
-      </p:cxnSp>
-      <p:cxnSp>
-        <p:nvCxnSpPr>
-          <p:cNvPr id="66" name="Straight Arrow Connector 65">
-            <a:extLst>
-              <a:ext uri="{FF2B5EF4-FFF2-40B4-BE49-F238E27FC236}">
-                <a16:creationId xmlns:a16="http://schemas.microsoft.com/office/drawing/2014/main" id="{334D521A-2894-4A2D-A876-8E81D54386F1}"/>
-              </a:ext>
-            </a:extLst>
-          </p:cNvPr>
-          <p:cNvCxnSpPr>
-            <a:cxnSpLocks/>
-            <a:stCxn id="55" idx="0"/>
+            <a:stCxn id="83" idx="0"/>
           </p:cNvCxnSpPr>
           <p:nvPr/>
         </p:nvCxnSpPr>
         <p:spPr>
           <a:xfrm flipV="1">
-            <a:off x="7311021" y="4300538"/>
-            <a:ext cx="99429" cy="239114"/>
+            <a:off x="3487611" y="4142016"/>
+            <a:ext cx="0" cy="514800"/>
           </a:xfrm>
           <a:prstGeom prst="straightConnector1">
             <a:avLst/>

</xml_diff>

<commit_message>
updated initial screenshot pictures
</commit_message>
<xml_diff>
--- a/doc-images/screenshot-initial.pptx
+++ b/doc-images/screenshot-initial.pptx
@@ -2,12 +2,12 @@
 <file path=ppt/presentation.xml><?xml version="1.0" encoding="utf-8"?>
 <p:presentation xmlns:a="http://schemas.openxmlformats.org/drawingml/2006/main" xmlns:r="http://schemas.openxmlformats.org/officeDocument/2006/relationships" xmlns:p="http://schemas.openxmlformats.org/presentationml/2006/main" saveSubsetFonts="1">
   <p:sldMasterIdLst>
-    <p:sldMasterId id="2147483672" r:id="rId1"/>
+    <p:sldMasterId id="2147483684" r:id="rId1"/>
   </p:sldMasterIdLst>
   <p:sldIdLst>
     <p:sldId id="256" r:id="rId2"/>
   </p:sldIdLst>
-  <p:sldSz cx="11293475" cy="6318250"/>
+  <p:sldSz cx="11293475" cy="5943600"/>
   <p:notesSz cx="6858000" cy="9144000"/>
   <p:defaultTextStyle>
     <a:defPPr>
@@ -141,15 +141,15 @@
         </p:nvSpPr>
         <p:spPr>
           <a:xfrm>
-            <a:off x="1411685" y="1034029"/>
-            <a:ext cx="8470106" cy="2199687"/>
+            <a:off x="1411685" y="972715"/>
+            <a:ext cx="8470106" cy="2069253"/>
           </a:xfrm>
         </p:spPr>
         <p:txBody>
           <a:bodyPr anchor="b"/>
           <a:lstStyle>
             <a:lvl1pPr algn="ctr">
-              <a:defRPr sz="5528"/>
+              <a:defRPr sz="5200"/>
             </a:lvl1pPr>
           </a:lstStyle>
           <a:p>
@@ -173,8 +173,8 @@
         </p:nvSpPr>
         <p:spPr>
           <a:xfrm>
-            <a:off x="1411685" y="3318544"/>
-            <a:ext cx="8470106" cy="1525447"/>
+            <a:off x="1411685" y="3121766"/>
+            <a:ext cx="8470106" cy="1434994"/>
           </a:xfrm>
         </p:spPr>
         <p:txBody>
@@ -182,39 +182,39 @@
           <a:lstStyle>
             <a:lvl1pPr marL="0" indent="0" algn="ctr">
               <a:buNone/>
-              <a:defRPr sz="2211"/>
+              <a:defRPr sz="2080"/>
             </a:lvl1pPr>
-            <a:lvl2pPr marL="421218" indent="0" algn="ctr">
-              <a:buNone/>
-              <a:defRPr sz="1843"/>
+            <a:lvl2pPr marL="396255" indent="0" algn="ctr">
+              <a:buNone/>
+              <a:defRPr sz="1733"/>
             </a:lvl2pPr>
-            <a:lvl3pPr marL="842437" indent="0" algn="ctr">
-              <a:buNone/>
-              <a:defRPr sz="1658"/>
+            <a:lvl3pPr marL="792510" indent="0" algn="ctr">
+              <a:buNone/>
+              <a:defRPr sz="1560"/>
             </a:lvl3pPr>
-            <a:lvl4pPr marL="1263655" indent="0" algn="ctr">
-              <a:buNone/>
-              <a:defRPr sz="1474"/>
+            <a:lvl4pPr marL="1188766" indent="0" algn="ctr">
+              <a:buNone/>
+              <a:defRPr sz="1387"/>
             </a:lvl4pPr>
-            <a:lvl5pPr marL="1684873" indent="0" algn="ctr">
-              <a:buNone/>
-              <a:defRPr sz="1474"/>
+            <a:lvl5pPr marL="1585021" indent="0" algn="ctr">
+              <a:buNone/>
+              <a:defRPr sz="1387"/>
             </a:lvl5pPr>
-            <a:lvl6pPr marL="2106092" indent="0" algn="ctr">
-              <a:buNone/>
-              <a:defRPr sz="1474"/>
+            <a:lvl6pPr marL="1981276" indent="0" algn="ctr">
+              <a:buNone/>
+              <a:defRPr sz="1387"/>
             </a:lvl6pPr>
-            <a:lvl7pPr marL="2527310" indent="0" algn="ctr">
-              <a:buNone/>
-              <a:defRPr sz="1474"/>
+            <a:lvl7pPr marL="2377531" indent="0" algn="ctr">
+              <a:buNone/>
+              <a:defRPr sz="1387"/>
             </a:lvl7pPr>
-            <a:lvl8pPr marL="2948529" indent="0" algn="ctr">
-              <a:buNone/>
-              <a:defRPr sz="1474"/>
+            <a:lvl8pPr marL="2773787" indent="0" algn="ctr">
+              <a:buNone/>
+              <a:defRPr sz="1387"/>
             </a:lvl8pPr>
-            <a:lvl9pPr marL="3369747" indent="0" algn="ctr">
-              <a:buNone/>
-              <a:defRPr sz="1474"/>
+            <a:lvl9pPr marL="3170042" indent="0" algn="ctr">
+              <a:buNone/>
+              <a:defRPr sz="1387"/>
             </a:lvl9pPr>
           </a:lstStyle>
           <a:p>
@@ -243,7 +243,7 @@
           <a:p>
             <a:fld id="{93DF655C-B5A4-4D87-897F-CE3EA9D19754}" type="datetimeFigureOut">
               <a:rPr lang="en-US" smtClean="0"/>
-              <a:t>1/11/2020</a:t>
+              <a:t>2/13/2020</a:t>
             </a:fld>
             <a:endParaRPr lang="en-US"/>
           </a:p>
@@ -294,7 +294,7 @@
     </p:spTree>
     <p:extLst>
       <p:ext uri="{BB962C8B-B14F-4D97-AF65-F5344CB8AC3E}">
-        <p14:creationId xmlns:p14="http://schemas.microsoft.com/office/powerpoint/2010/main" val="3333276551"/>
+        <p14:creationId xmlns:p14="http://schemas.microsoft.com/office/powerpoint/2010/main" val="3341022766"/>
       </p:ext>
     </p:extLst>
   </p:cSld>
@@ -413,7 +413,7 @@
           <a:p>
             <a:fld id="{93DF655C-B5A4-4D87-897F-CE3EA9D19754}" type="datetimeFigureOut">
               <a:rPr lang="en-US" smtClean="0"/>
-              <a:t>1/11/2020</a:t>
+              <a:t>2/13/2020</a:t>
             </a:fld>
             <a:endParaRPr lang="en-US"/>
           </a:p>
@@ -464,7 +464,7 @@
     </p:spTree>
     <p:extLst>
       <p:ext uri="{BB962C8B-B14F-4D97-AF65-F5344CB8AC3E}">
-        <p14:creationId xmlns:p14="http://schemas.microsoft.com/office/powerpoint/2010/main" val="3659710671"/>
+        <p14:creationId xmlns:p14="http://schemas.microsoft.com/office/powerpoint/2010/main" val="2450833519"/>
       </p:ext>
     </p:extLst>
   </p:cSld>
@@ -503,8 +503,8 @@
         </p:nvSpPr>
         <p:spPr>
           <a:xfrm>
-            <a:off x="8081893" y="336388"/>
-            <a:ext cx="2435156" cy="5354425"/>
+            <a:off x="8081893" y="316442"/>
+            <a:ext cx="2435156" cy="5036926"/>
           </a:xfrm>
         </p:spPr>
         <p:txBody>
@@ -531,8 +531,8 @@
         </p:nvSpPr>
         <p:spPr>
           <a:xfrm>
-            <a:off x="776427" y="336388"/>
-            <a:ext cx="7164298" cy="5354425"/>
+            <a:off x="776427" y="316442"/>
+            <a:ext cx="7164298" cy="5036926"/>
           </a:xfrm>
         </p:spPr>
         <p:txBody>
@@ -593,7 +593,7 @@
           <a:p>
             <a:fld id="{93DF655C-B5A4-4D87-897F-CE3EA9D19754}" type="datetimeFigureOut">
               <a:rPr lang="en-US" smtClean="0"/>
-              <a:t>1/11/2020</a:t>
+              <a:t>2/13/2020</a:t>
             </a:fld>
             <a:endParaRPr lang="en-US"/>
           </a:p>
@@ -644,7 +644,7 @@
     </p:spTree>
     <p:extLst>
       <p:ext uri="{BB962C8B-B14F-4D97-AF65-F5344CB8AC3E}">
-        <p14:creationId xmlns:p14="http://schemas.microsoft.com/office/powerpoint/2010/main" val="3580776902"/>
+        <p14:creationId xmlns:p14="http://schemas.microsoft.com/office/powerpoint/2010/main" val="3578685471"/>
       </p:ext>
     </p:extLst>
   </p:cSld>
@@ -763,7 +763,7 @@
           <a:p>
             <a:fld id="{93DF655C-B5A4-4D87-897F-CE3EA9D19754}" type="datetimeFigureOut">
               <a:rPr lang="en-US" smtClean="0"/>
-              <a:t>1/11/2020</a:t>
+              <a:t>2/13/2020</a:t>
             </a:fld>
             <a:endParaRPr lang="en-US"/>
           </a:p>
@@ -814,7 +814,7 @@
     </p:spTree>
     <p:extLst>
       <p:ext uri="{BB962C8B-B14F-4D97-AF65-F5344CB8AC3E}">
-        <p14:creationId xmlns:p14="http://schemas.microsoft.com/office/powerpoint/2010/main" val="453940521"/>
+        <p14:creationId xmlns:p14="http://schemas.microsoft.com/office/powerpoint/2010/main" val="1534250999"/>
       </p:ext>
     </p:extLst>
   </p:cSld>
@@ -853,15 +853,15 @@
         </p:nvSpPr>
         <p:spPr>
           <a:xfrm>
-            <a:off x="770544" y="1575176"/>
-            <a:ext cx="9740622" cy="2628216"/>
+            <a:off x="770544" y="1481773"/>
+            <a:ext cx="9740622" cy="2472372"/>
           </a:xfrm>
         </p:spPr>
         <p:txBody>
           <a:bodyPr anchor="b"/>
           <a:lstStyle>
             <a:lvl1pPr>
-              <a:defRPr sz="5528"/>
+              <a:defRPr sz="5200"/>
             </a:lvl1pPr>
           </a:lstStyle>
           <a:p>
@@ -885,8 +885,8 @@
         </p:nvSpPr>
         <p:spPr>
           <a:xfrm>
-            <a:off x="770544" y="4228256"/>
-            <a:ext cx="9740622" cy="1382117"/>
+            <a:off x="770544" y="3977535"/>
+            <a:ext cx="9740622" cy="1300162"/>
           </a:xfrm>
         </p:spPr>
         <p:txBody>
@@ -894,7 +894,7 @@
           <a:lstStyle>
             <a:lvl1pPr marL="0" indent="0">
               <a:buNone/>
-              <a:defRPr sz="2211">
+              <a:defRPr sz="2080">
                 <a:solidFill>
                   <a:schemeClr val="tx1">
                     <a:tint val="75000"/>
@@ -902,9 +902,9 @@
                 </a:solidFill>
               </a:defRPr>
             </a:lvl1pPr>
-            <a:lvl2pPr marL="421218" indent="0">
-              <a:buNone/>
-              <a:defRPr sz="1843">
+            <a:lvl2pPr marL="396255" indent="0">
+              <a:buNone/>
+              <a:defRPr sz="1733">
                 <a:solidFill>
                   <a:schemeClr val="tx1">
                     <a:tint val="75000"/>
@@ -912,9 +912,9 @@
                 </a:solidFill>
               </a:defRPr>
             </a:lvl2pPr>
-            <a:lvl3pPr marL="842437" indent="0">
-              <a:buNone/>
-              <a:defRPr sz="1658">
+            <a:lvl3pPr marL="792510" indent="0">
+              <a:buNone/>
+              <a:defRPr sz="1560">
                 <a:solidFill>
                   <a:schemeClr val="tx1">
                     <a:tint val="75000"/>
@@ -922,9 +922,9 @@
                 </a:solidFill>
               </a:defRPr>
             </a:lvl3pPr>
-            <a:lvl4pPr marL="1263655" indent="0">
-              <a:buNone/>
-              <a:defRPr sz="1474">
+            <a:lvl4pPr marL="1188766" indent="0">
+              <a:buNone/>
+              <a:defRPr sz="1387">
                 <a:solidFill>
                   <a:schemeClr val="tx1">
                     <a:tint val="75000"/>
@@ -932,9 +932,9 @@
                 </a:solidFill>
               </a:defRPr>
             </a:lvl4pPr>
-            <a:lvl5pPr marL="1684873" indent="0">
-              <a:buNone/>
-              <a:defRPr sz="1474">
+            <a:lvl5pPr marL="1585021" indent="0">
+              <a:buNone/>
+              <a:defRPr sz="1387">
                 <a:solidFill>
                   <a:schemeClr val="tx1">
                     <a:tint val="75000"/>
@@ -942,9 +942,9 @@
                 </a:solidFill>
               </a:defRPr>
             </a:lvl5pPr>
-            <a:lvl6pPr marL="2106092" indent="0">
-              <a:buNone/>
-              <a:defRPr sz="1474">
+            <a:lvl6pPr marL="1981276" indent="0">
+              <a:buNone/>
+              <a:defRPr sz="1387">
                 <a:solidFill>
                   <a:schemeClr val="tx1">
                     <a:tint val="75000"/>
@@ -952,9 +952,9 @@
                 </a:solidFill>
               </a:defRPr>
             </a:lvl6pPr>
-            <a:lvl7pPr marL="2527310" indent="0">
-              <a:buNone/>
-              <a:defRPr sz="1474">
+            <a:lvl7pPr marL="2377531" indent="0">
+              <a:buNone/>
+              <a:defRPr sz="1387">
                 <a:solidFill>
                   <a:schemeClr val="tx1">
                     <a:tint val="75000"/>
@@ -962,9 +962,9 @@
                 </a:solidFill>
               </a:defRPr>
             </a:lvl7pPr>
-            <a:lvl8pPr marL="2948529" indent="0">
-              <a:buNone/>
-              <a:defRPr sz="1474">
+            <a:lvl8pPr marL="2773787" indent="0">
+              <a:buNone/>
+              <a:defRPr sz="1387">
                 <a:solidFill>
                   <a:schemeClr val="tx1">
                     <a:tint val="75000"/>
@@ -972,9 +972,9 @@
                 </a:solidFill>
               </a:defRPr>
             </a:lvl8pPr>
-            <a:lvl9pPr marL="3369747" indent="0">
-              <a:buNone/>
-              <a:defRPr sz="1474">
+            <a:lvl9pPr marL="3170042" indent="0">
+              <a:buNone/>
+              <a:defRPr sz="1387">
                 <a:solidFill>
                   <a:schemeClr val="tx1">
                     <a:tint val="75000"/>
@@ -1009,7 +1009,7 @@
           <a:p>
             <a:fld id="{93DF655C-B5A4-4D87-897F-CE3EA9D19754}" type="datetimeFigureOut">
               <a:rPr lang="en-US" smtClean="0"/>
-              <a:t>1/11/2020</a:t>
+              <a:t>2/13/2020</a:t>
             </a:fld>
             <a:endParaRPr lang="en-US"/>
           </a:p>
@@ -1060,7 +1060,7 @@
     </p:spTree>
     <p:extLst>
       <p:ext uri="{BB962C8B-B14F-4D97-AF65-F5344CB8AC3E}">
-        <p14:creationId xmlns:p14="http://schemas.microsoft.com/office/powerpoint/2010/main" val="3439082163"/>
+        <p14:creationId xmlns:p14="http://schemas.microsoft.com/office/powerpoint/2010/main" val="4052162142"/>
       </p:ext>
     </p:extLst>
   </p:cSld>
@@ -1122,8 +1122,8 @@
         </p:nvSpPr>
         <p:spPr>
           <a:xfrm>
-            <a:off x="776426" y="1681941"/>
-            <a:ext cx="4799727" cy="4008872"/>
+            <a:off x="776426" y="1582208"/>
+            <a:ext cx="4799727" cy="3771160"/>
           </a:xfrm>
         </p:spPr>
         <p:txBody>
@@ -1179,8 +1179,8 @@
         </p:nvSpPr>
         <p:spPr>
           <a:xfrm>
-            <a:off x="5717322" y="1681941"/>
-            <a:ext cx="4799727" cy="4008872"/>
+            <a:off x="5717322" y="1582208"/>
+            <a:ext cx="4799727" cy="3771160"/>
           </a:xfrm>
         </p:spPr>
         <p:txBody>
@@ -1241,7 +1241,7 @@
           <a:p>
             <a:fld id="{93DF655C-B5A4-4D87-897F-CE3EA9D19754}" type="datetimeFigureOut">
               <a:rPr lang="en-US" smtClean="0"/>
-              <a:t>1/11/2020</a:t>
+              <a:t>2/13/2020</a:t>
             </a:fld>
             <a:endParaRPr lang="en-US"/>
           </a:p>
@@ -1292,7 +1292,7 @@
     </p:spTree>
     <p:extLst>
       <p:ext uri="{BB962C8B-B14F-4D97-AF65-F5344CB8AC3E}">
-        <p14:creationId xmlns:p14="http://schemas.microsoft.com/office/powerpoint/2010/main" val="110329012"/>
+        <p14:creationId xmlns:p14="http://schemas.microsoft.com/office/powerpoint/2010/main" val="400411062"/>
       </p:ext>
     </p:extLst>
   </p:cSld>
@@ -1331,8 +1331,8 @@
         </p:nvSpPr>
         <p:spPr>
           <a:xfrm>
-            <a:off x="777897" y="336389"/>
-            <a:ext cx="9740622" cy="1221236"/>
+            <a:off x="777897" y="316442"/>
+            <a:ext cx="9740622" cy="1148821"/>
           </a:xfrm>
         </p:spPr>
         <p:txBody>
@@ -1359,8 +1359,8 @@
         </p:nvSpPr>
         <p:spPr>
           <a:xfrm>
-            <a:off x="777898" y="1548849"/>
-            <a:ext cx="4777669" cy="759067"/>
+            <a:off x="777898" y="1457008"/>
+            <a:ext cx="4777669" cy="714057"/>
           </a:xfrm>
         </p:spPr>
         <p:txBody>
@@ -1368,39 +1368,39 @@
           <a:lstStyle>
             <a:lvl1pPr marL="0" indent="0">
               <a:buNone/>
-              <a:defRPr sz="2211" b="1"/>
+              <a:defRPr sz="2080" b="1"/>
             </a:lvl1pPr>
-            <a:lvl2pPr marL="421218" indent="0">
-              <a:buNone/>
-              <a:defRPr sz="1843" b="1"/>
+            <a:lvl2pPr marL="396255" indent="0">
+              <a:buNone/>
+              <a:defRPr sz="1733" b="1"/>
             </a:lvl2pPr>
-            <a:lvl3pPr marL="842437" indent="0">
-              <a:buNone/>
-              <a:defRPr sz="1658" b="1"/>
+            <a:lvl3pPr marL="792510" indent="0">
+              <a:buNone/>
+              <a:defRPr sz="1560" b="1"/>
             </a:lvl3pPr>
-            <a:lvl4pPr marL="1263655" indent="0">
-              <a:buNone/>
-              <a:defRPr sz="1474" b="1"/>
+            <a:lvl4pPr marL="1188766" indent="0">
+              <a:buNone/>
+              <a:defRPr sz="1387" b="1"/>
             </a:lvl4pPr>
-            <a:lvl5pPr marL="1684873" indent="0">
-              <a:buNone/>
-              <a:defRPr sz="1474" b="1"/>
+            <a:lvl5pPr marL="1585021" indent="0">
+              <a:buNone/>
+              <a:defRPr sz="1387" b="1"/>
             </a:lvl5pPr>
-            <a:lvl6pPr marL="2106092" indent="0">
-              <a:buNone/>
-              <a:defRPr sz="1474" b="1"/>
+            <a:lvl6pPr marL="1981276" indent="0">
+              <a:buNone/>
+              <a:defRPr sz="1387" b="1"/>
             </a:lvl6pPr>
-            <a:lvl7pPr marL="2527310" indent="0">
-              <a:buNone/>
-              <a:defRPr sz="1474" b="1"/>
+            <a:lvl7pPr marL="2377531" indent="0">
+              <a:buNone/>
+              <a:defRPr sz="1387" b="1"/>
             </a:lvl7pPr>
-            <a:lvl8pPr marL="2948529" indent="0">
-              <a:buNone/>
-              <a:defRPr sz="1474" b="1"/>
+            <a:lvl8pPr marL="2773787" indent="0">
+              <a:buNone/>
+              <a:defRPr sz="1387" b="1"/>
             </a:lvl8pPr>
-            <a:lvl9pPr marL="3369747" indent="0">
-              <a:buNone/>
-              <a:defRPr sz="1474" b="1"/>
+            <a:lvl9pPr marL="3170042" indent="0">
+              <a:buNone/>
+              <a:defRPr sz="1387" b="1"/>
             </a:lvl9pPr>
           </a:lstStyle>
           <a:p>
@@ -1424,8 +1424,8 @@
         </p:nvSpPr>
         <p:spPr>
           <a:xfrm>
-            <a:off x="777898" y="2307916"/>
-            <a:ext cx="4777669" cy="3394597"/>
+            <a:off x="777898" y="2171065"/>
+            <a:ext cx="4777669" cy="3193310"/>
           </a:xfrm>
         </p:spPr>
         <p:txBody>
@@ -1481,8 +1481,8 @@
         </p:nvSpPr>
         <p:spPr>
           <a:xfrm>
-            <a:off x="5717322" y="1548849"/>
-            <a:ext cx="4801198" cy="759067"/>
+            <a:off x="5717322" y="1457008"/>
+            <a:ext cx="4801198" cy="714057"/>
           </a:xfrm>
         </p:spPr>
         <p:txBody>
@@ -1490,39 +1490,39 @@
           <a:lstStyle>
             <a:lvl1pPr marL="0" indent="0">
               <a:buNone/>
-              <a:defRPr sz="2211" b="1"/>
+              <a:defRPr sz="2080" b="1"/>
             </a:lvl1pPr>
-            <a:lvl2pPr marL="421218" indent="0">
-              <a:buNone/>
-              <a:defRPr sz="1843" b="1"/>
+            <a:lvl2pPr marL="396255" indent="0">
+              <a:buNone/>
+              <a:defRPr sz="1733" b="1"/>
             </a:lvl2pPr>
-            <a:lvl3pPr marL="842437" indent="0">
-              <a:buNone/>
-              <a:defRPr sz="1658" b="1"/>
+            <a:lvl3pPr marL="792510" indent="0">
+              <a:buNone/>
+              <a:defRPr sz="1560" b="1"/>
             </a:lvl3pPr>
-            <a:lvl4pPr marL="1263655" indent="0">
-              <a:buNone/>
-              <a:defRPr sz="1474" b="1"/>
+            <a:lvl4pPr marL="1188766" indent="0">
+              <a:buNone/>
+              <a:defRPr sz="1387" b="1"/>
             </a:lvl4pPr>
-            <a:lvl5pPr marL="1684873" indent="0">
-              <a:buNone/>
-              <a:defRPr sz="1474" b="1"/>
+            <a:lvl5pPr marL="1585021" indent="0">
+              <a:buNone/>
+              <a:defRPr sz="1387" b="1"/>
             </a:lvl5pPr>
-            <a:lvl6pPr marL="2106092" indent="0">
-              <a:buNone/>
-              <a:defRPr sz="1474" b="1"/>
+            <a:lvl6pPr marL="1981276" indent="0">
+              <a:buNone/>
+              <a:defRPr sz="1387" b="1"/>
             </a:lvl6pPr>
-            <a:lvl7pPr marL="2527310" indent="0">
-              <a:buNone/>
-              <a:defRPr sz="1474" b="1"/>
+            <a:lvl7pPr marL="2377531" indent="0">
+              <a:buNone/>
+              <a:defRPr sz="1387" b="1"/>
             </a:lvl7pPr>
-            <a:lvl8pPr marL="2948529" indent="0">
-              <a:buNone/>
-              <a:defRPr sz="1474" b="1"/>
+            <a:lvl8pPr marL="2773787" indent="0">
+              <a:buNone/>
+              <a:defRPr sz="1387" b="1"/>
             </a:lvl8pPr>
-            <a:lvl9pPr marL="3369747" indent="0">
-              <a:buNone/>
-              <a:defRPr sz="1474" b="1"/>
+            <a:lvl9pPr marL="3170042" indent="0">
+              <a:buNone/>
+              <a:defRPr sz="1387" b="1"/>
             </a:lvl9pPr>
           </a:lstStyle>
           <a:p>
@@ -1546,8 +1546,8 @@
         </p:nvSpPr>
         <p:spPr>
           <a:xfrm>
-            <a:off x="5717322" y="2307916"/>
-            <a:ext cx="4801198" cy="3394597"/>
+            <a:off x="5717322" y="2171065"/>
+            <a:ext cx="4801198" cy="3193310"/>
           </a:xfrm>
         </p:spPr>
         <p:txBody>
@@ -1608,7 +1608,7 @@
           <a:p>
             <a:fld id="{93DF655C-B5A4-4D87-897F-CE3EA9D19754}" type="datetimeFigureOut">
               <a:rPr lang="en-US" smtClean="0"/>
-              <a:t>1/11/2020</a:t>
+              <a:t>2/13/2020</a:t>
             </a:fld>
             <a:endParaRPr lang="en-US"/>
           </a:p>
@@ -1659,7 +1659,7 @@
     </p:spTree>
     <p:extLst>
       <p:ext uri="{BB962C8B-B14F-4D97-AF65-F5344CB8AC3E}">
-        <p14:creationId xmlns:p14="http://schemas.microsoft.com/office/powerpoint/2010/main" val="2255395317"/>
+        <p14:creationId xmlns:p14="http://schemas.microsoft.com/office/powerpoint/2010/main" val="3710866588"/>
       </p:ext>
     </p:extLst>
   </p:cSld>
@@ -1726,7 +1726,7 @@
           <a:p>
             <a:fld id="{93DF655C-B5A4-4D87-897F-CE3EA9D19754}" type="datetimeFigureOut">
               <a:rPr lang="en-US" smtClean="0"/>
-              <a:t>1/11/2020</a:t>
+              <a:t>2/13/2020</a:t>
             </a:fld>
             <a:endParaRPr lang="en-US"/>
           </a:p>
@@ -1777,7 +1777,7 @@
     </p:spTree>
     <p:extLst>
       <p:ext uri="{BB962C8B-B14F-4D97-AF65-F5344CB8AC3E}">
-        <p14:creationId xmlns:p14="http://schemas.microsoft.com/office/powerpoint/2010/main" val="3460412991"/>
+        <p14:creationId xmlns:p14="http://schemas.microsoft.com/office/powerpoint/2010/main" val="3364545500"/>
       </p:ext>
     </p:extLst>
   </p:cSld>
@@ -1821,7 +1821,7 @@
           <a:p>
             <a:fld id="{93DF655C-B5A4-4D87-897F-CE3EA9D19754}" type="datetimeFigureOut">
               <a:rPr lang="en-US" smtClean="0"/>
-              <a:t>1/11/2020</a:t>
+              <a:t>2/13/2020</a:t>
             </a:fld>
             <a:endParaRPr lang="en-US"/>
           </a:p>
@@ -1872,7 +1872,7 @@
     </p:spTree>
     <p:extLst>
       <p:ext uri="{BB962C8B-B14F-4D97-AF65-F5344CB8AC3E}">
-        <p14:creationId xmlns:p14="http://schemas.microsoft.com/office/powerpoint/2010/main" val="2785225562"/>
+        <p14:creationId xmlns:p14="http://schemas.microsoft.com/office/powerpoint/2010/main" val="3020860823"/>
       </p:ext>
     </p:extLst>
   </p:cSld>
@@ -1911,15 +1911,15 @@
         </p:nvSpPr>
         <p:spPr>
           <a:xfrm>
-            <a:off x="777898" y="421217"/>
-            <a:ext cx="3642439" cy="1474258"/>
+            <a:off x="777898" y="396240"/>
+            <a:ext cx="3642439" cy="1386840"/>
           </a:xfrm>
         </p:spPr>
         <p:txBody>
           <a:bodyPr anchor="b"/>
           <a:lstStyle>
             <a:lvl1pPr>
-              <a:defRPr sz="2948"/>
+              <a:defRPr sz="2773"/>
             </a:lvl1pPr>
           </a:lstStyle>
           <a:p>
@@ -1943,39 +1943,39 @@
         </p:nvSpPr>
         <p:spPr>
           <a:xfrm>
-            <a:off x="4801198" y="909711"/>
-            <a:ext cx="5717322" cy="4490053"/>
+            <a:off x="4801198" y="855769"/>
+            <a:ext cx="5717322" cy="4223808"/>
           </a:xfrm>
         </p:spPr>
         <p:txBody>
           <a:bodyPr/>
           <a:lstStyle>
             <a:lvl1pPr>
-              <a:defRPr sz="2948"/>
+              <a:defRPr sz="2773"/>
             </a:lvl1pPr>
             <a:lvl2pPr>
-              <a:defRPr sz="2580"/>
+              <a:defRPr sz="2427"/>
             </a:lvl2pPr>
             <a:lvl3pPr>
-              <a:defRPr sz="2211"/>
+              <a:defRPr sz="2080"/>
             </a:lvl3pPr>
             <a:lvl4pPr>
-              <a:defRPr sz="1843"/>
+              <a:defRPr sz="1733"/>
             </a:lvl4pPr>
             <a:lvl5pPr>
-              <a:defRPr sz="1843"/>
+              <a:defRPr sz="1733"/>
             </a:lvl5pPr>
             <a:lvl6pPr>
-              <a:defRPr sz="1843"/>
+              <a:defRPr sz="1733"/>
             </a:lvl6pPr>
             <a:lvl7pPr>
-              <a:defRPr sz="1843"/>
+              <a:defRPr sz="1733"/>
             </a:lvl7pPr>
             <a:lvl8pPr>
-              <a:defRPr sz="1843"/>
+              <a:defRPr sz="1733"/>
             </a:lvl8pPr>
             <a:lvl9pPr>
-              <a:defRPr sz="1843"/>
+              <a:defRPr sz="1733"/>
             </a:lvl9pPr>
           </a:lstStyle>
           <a:p>
@@ -2028,8 +2028,8 @@
         </p:nvSpPr>
         <p:spPr>
           <a:xfrm>
-            <a:off x="777898" y="1895475"/>
-            <a:ext cx="3642439" cy="3511602"/>
+            <a:off x="777898" y="1783080"/>
+            <a:ext cx="3642439" cy="3303376"/>
           </a:xfrm>
         </p:spPr>
         <p:txBody>
@@ -2037,39 +2037,39 @@
           <a:lstStyle>
             <a:lvl1pPr marL="0" indent="0">
               <a:buNone/>
-              <a:defRPr sz="1474"/>
+              <a:defRPr sz="1387"/>
             </a:lvl1pPr>
-            <a:lvl2pPr marL="421218" indent="0">
-              <a:buNone/>
-              <a:defRPr sz="1290"/>
+            <a:lvl2pPr marL="396255" indent="0">
+              <a:buNone/>
+              <a:defRPr sz="1213"/>
             </a:lvl2pPr>
-            <a:lvl3pPr marL="842437" indent="0">
-              <a:buNone/>
-              <a:defRPr sz="1106"/>
+            <a:lvl3pPr marL="792510" indent="0">
+              <a:buNone/>
+              <a:defRPr sz="1040"/>
             </a:lvl3pPr>
-            <a:lvl4pPr marL="1263655" indent="0">
-              <a:buNone/>
-              <a:defRPr sz="921"/>
+            <a:lvl4pPr marL="1188766" indent="0">
+              <a:buNone/>
+              <a:defRPr sz="867"/>
             </a:lvl4pPr>
-            <a:lvl5pPr marL="1684873" indent="0">
-              <a:buNone/>
-              <a:defRPr sz="921"/>
+            <a:lvl5pPr marL="1585021" indent="0">
+              <a:buNone/>
+              <a:defRPr sz="867"/>
             </a:lvl5pPr>
-            <a:lvl6pPr marL="2106092" indent="0">
-              <a:buNone/>
-              <a:defRPr sz="921"/>
+            <a:lvl6pPr marL="1981276" indent="0">
+              <a:buNone/>
+              <a:defRPr sz="867"/>
             </a:lvl6pPr>
-            <a:lvl7pPr marL="2527310" indent="0">
-              <a:buNone/>
-              <a:defRPr sz="921"/>
+            <a:lvl7pPr marL="2377531" indent="0">
+              <a:buNone/>
+              <a:defRPr sz="867"/>
             </a:lvl7pPr>
-            <a:lvl8pPr marL="2948529" indent="0">
-              <a:buNone/>
-              <a:defRPr sz="921"/>
+            <a:lvl8pPr marL="2773787" indent="0">
+              <a:buNone/>
+              <a:defRPr sz="867"/>
             </a:lvl8pPr>
-            <a:lvl9pPr marL="3369747" indent="0">
-              <a:buNone/>
-              <a:defRPr sz="921"/>
+            <a:lvl9pPr marL="3170042" indent="0">
+              <a:buNone/>
+              <a:defRPr sz="867"/>
             </a:lvl9pPr>
           </a:lstStyle>
           <a:p>
@@ -2098,7 +2098,7 @@
           <a:p>
             <a:fld id="{93DF655C-B5A4-4D87-897F-CE3EA9D19754}" type="datetimeFigureOut">
               <a:rPr lang="en-US" smtClean="0"/>
-              <a:t>1/11/2020</a:t>
+              <a:t>2/13/2020</a:t>
             </a:fld>
             <a:endParaRPr lang="en-US"/>
           </a:p>
@@ -2149,7 +2149,7 @@
     </p:spTree>
     <p:extLst>
       <p:ext uri="{BB962C8B-B14F-4D97-AF65-F5344CB8AC3E}">
-        <p14:creationId xmlns:p14="http://schemas.microsoft.com/office/powerpoint/2010/main" val="517608717"/>
+        <p14:creationId xmlns:p14="http://schemas.microsoft.com/office/powerpoint/2010/main" val="2359293660"/>
       </p:ext>
     </p:extLst>
   </p:cSld>
@@ -2188,15 +2188,15 @@
         </p:nvSpPr>
         <p:spPr>
           <a:xfrm>
-            <a:off x="777898" y="421217"/>
-            <a:ext cx="3642439" cy="1474258"/>
+            <a:off x="777898" y="396240"/>
+            <a:ext cx="3642439" cy="1386840"/>
           </a:xfrm>
         </p:spPr>
         <p:txBody>
           <a:bodyPr anchor="b"/>
           <a:lstStyle>
             <a:lvl1pPr>
-              <a:defRPr sz="2948"/>
+              <a:defRPr sz="2773"/>
             </a:lvl1pPr>
           </a:lstStyle>
           <a:p>
@@ -2220,8 +2220,8 @@
         </p:nvSpPr>
         <p:spPr>
           <a:xfrm>
-            <a:off x="4801198" y="909711"/>
-            <a:ext cx="5717322" cy="4490053"/>
+            <a:off x="4801198" y="855769"/>
+            <a:ext cx="5717322" cy="4223808"/>
           </a:xfrm>
         </p:spPr>
         <p:txBody>
@@ -2229,39 +2229,39 @@
           <a:lstStyle>
             <a:lvl1pPr marL="0" indent="0">
               <a:buNone/>
-              <a:defRPr sz="2948"/>
+              <a:defRPr sz="2773"/>
             </a:lvl1pPr>
-            <a:lvl2pPr marL="421218" indent="0">
-              <a:buNone/>
-              <a:defRPr sz="2580"/>
+            <a:lvl2pPr marL="396255" indent="0">
+              <a:buNone/>
+              <a:defRPr sz="2427"/>
             </a:lvl2pPr>
-            <a:lvl3pPr marL="842437" indent="0">
-              <a:buNone/>
-              <a:defRPr sz="2211"/>
+            <a:lvl3pPr marL="792510" indent="0">
+              <a:buNone/>
+              <a:defRPr sz="2080"/>
             </a:lvl3pPr>
-            <a:lvl4pPr marL="1263655" indent="0">
-              <a:buNone/>
-              <a:defRPr sz="1843"/>
+            <a:lvl4pPr marL="1188766" indent="0">
+              <a:buNone/>
+              <a:defRPr sz="1733"/>
             </a:lvl4pPr>
-            <a:lvl5pPr marL="1684873" indent="0">
-              <a:buNone/>
-              <a:defRPr sz="1843"/>
+            <a:lvl5pPr marL="1585021" indent="0">
+              <a:buNone/>
+              <a:defRPr sz="1733"/>
             </a:lvl5pPr>
-            <a:lvl6pPr marL="2106092" indent="0">
-              <a:buNone/>
-              <a:defRPr sz="1843"/>
+            <a:lvl6pPr marL="1981276" indent="0">
+              <a:buNone/>
+              <a:defRPr sz="1733"/>
             </a:lvl6pPr>
-            <a:lvl7pPr marL="2527310" indent="0">
-              <a:buNone/>
-              <a:defRPr sz="1843"/>
+            <a:lvl7pPr marL="2377531" indent="0">
+              <a:buNone/>
+              <a:defRPr sz="1733"/>
             </a:lvl7pPr>
-            <a:lvl8pPr marL="2948529" indent="0">
-              <a:buNone/>
-              <a:defRPr sz="1843"/>
+            <a:lvl8pPr marL="2773787" indent="0">
+              <a:buNone/>
+              <a:defRPr sz="1733"/>
             </a:lvl8pPr>
-            <a:lvl9pPr marL="3369747" indent="0">
-              <a:buNone/>
-              <a:defRPr sz="1843"/>
+            <a:lvl9pPr marL="3170042" indent="0">
+              <a:buNone/>
+              <a:defRPr sz="1733"/>
             </a:lvl9pPr>
           </a:lstStyle>
           <a:p>
@@ -2285,8 +2285,8 @@
         </p:nvSpPr>
         <p:spPr>
           <a:xfrm>
-            <a:off x="777898" y="1895475"/>
-            <a:ext cx="3642439" cy="3511602"/>
+            <a:off x="777898" y="1783080"/>
+            <a:ext cx="3642439" cy="3303376"/>
           </a:xfrm>
         </p:spPr>
         <p:txBody>
@@ -2294,39 +2294,39 @@
           <a:lstStyle>
             <a:lvl1pPr marL="0" indent="0">
               <a:buNone/>
-              <a:defRPr sz="1474"/>
+              <a:defRPr sz="1387"/>
             </a:lvl1pPr>
-            <a:lvl2pPr marL="421218" indent="0">
-              <a:buNone/>
-              <a:defRPr sz="1290"/>
+            <a:lvl2pPr marL="396255" indent="0">
+              <a:buNone/>
+              <a:defRPr sz="1213"/>
             </a:lvl2pPr>
-            <a:lvl3pPr marL="842437" indent="0">
-              <a:buNone/>
-              <a:defRPr sz="1106"/>
+            <a:lvl3pPr marL="792510" indent="0">
+              <a:buNone/>
+              <a:defRPr sz="1040"/>
             </a:lvl3pPr>
-            <a:lvl4pPr marL="1263655" indent="0">
-              <a:buNone/>
-              <a:defRPr sz="921"/>
+            <a:lvl4pPr marL="1188766" indent="0">
+              <a:buNone/>
+              <a:defRPr sz="867"/>
             </a:lvl4pPr>
-            <a:lvl5pPr marL="1684873" indent="0">
-              <a:buNone/>
-              <a:defRPr sz="921"/>
+            <a:lvl5pPr marL="1585021" indent="0">
+              <a:buNone/>
+              <a:defRPr sz="867"/>
             </a:lvl5pPr>
-            <a:lvl6pPr marL="2106092" indent="0">
-              <a:buNone/>
-              <a:defRPr sz="921"/>
+            <a:lvl6pPr marL="1981276" indent="0">
+              <a:buNone/>
+              <a:defRPr sz="867"/>
             </a:lvl6pPr>
-            <a:lvl7pPr marL="2527310" indent="0">
-              <a:buNone/>
-              <a:defRPr sz="921"/>
+            <a:lvl7pPr marL="2377531" indent="0">
+              <a:buNone/>
+              <a:defRPr sz="867"/>
             </a:lvl7pPr>
-            <a:lvl8pPr marL="2948529" indent="0">
-              <a:buNone/>
-              <a:defRPr sz="921"/>
+            <a:lvl8pPr marL="2773787" indent="0">
+              <a:buNone/>
+              <a:defRPr sz="867"/>
             </a:lvl8pPr>
-            <a:lvl9pPr marL="3369747" indent="0">
-              <a:buNone/>
-              <a:defRPr sz="921"/>
+            <a:lvl9pPr marL="3170042" indent="0">
+              <a:buNone/>
+              <a:defRPr sz="867"/>
             </a:lvl9pPr>
           </a:lstStyle>
           <a:p>
@@ -2355,7 +2355,7 @@
           <a:p>
             <a:fld id="{93DF655C-B5A4-4D87-897F-CE3EA9D19754}" type="datetimeFigureOut">
               <a:rPr lang="en-US" smtClean="0"/>
-              <a:t>1/11/2020</a:t>
+              <a:t>2/13/2020</a:t>
             </a:fld>
             <a:endParaRPr lang="en-US"/>
           </a:p>
@@ -2406,7 +2406,7 @@
     </p:spTree>
     <p:extLst>
       <p:ext uri="{BB962C8B-B14F-4D97-AF65-F5344CB8AC3E}">
-        <p14:creationId xmlns:p14="http://schemas.microsoft.com/office/powerpoint/2010/main" val="1610541603"/>
+        <p14:creationId xmlns:p14="http://schemas.microsoft.com/office/powerpoint/2010/main" val="4206664967"/>
       </p:ext>
     </p:extLst>
   </p:cSld>
@@ -2450,8 +2450,8 @@
         </p:nvSpPr>
         <p:spPr>
           <a:xfrm>
-            <a:off x="776427" y="336389"/>
-            <a:ext cx="9740622" cy="1221236"/>
+            <a:off x="776427" y="316442"/>
+            <a:ext cx="9740622" cy="1148821"/>
           </a:xfrm>
           <a:prstGeom prst="rect">
             <a:avLst/>
@@ -2483,8 +2483,8 @@
         </p:nvSpPr>
         <p:spPr>
           <a:xfrm>
-            <a:off x="776427" y="1681941"/>
-            <a:ext cx="9740622" cy="4008872"/>
+            <a:off x="776427" y="1582208"/>
+            <a:ext cx="9740622" cy="3771160"/>
           </a:xfrm>
           <a:prstGeom prst="rect">
             <a:avLst/>
@@ -2545,8 +2545,8 @@
         </p:nvSpPr>
         <p:spPr>
           <a:xfrm>
-            <a:off x="776426" y="5856082"/>
-            <a:ext cx="2541032" cy="336388"/>
+            <a:off x="776426" y="5508837"/>
+            <a:ext cx="2541032" cy="316442"/>
           </a:xfrm>
           <a:prstGeom prst="rect">
             <a:avLst/>
@@ -2556,7 +2556,7 @@
           <a:bodyPr vert="horz" lIns="91440" tIns="45720" rIns="91440" bIns="45720" rtlCol="0" anchor="ctr"/>
           <a:lstStyle>
             <a:lvl1pPr algn="l">
-              <a:defRPr sz="1106">
+              <a:defRPr sz="1040">
                 <a:solidFill>
                   <a:schemeClr val="tx1">
                     <a:tint val="75000"/>
@@ -2568,7 +2568,7 @@
           <a:p>
             <a:fld id="{93DF655C-B5A4-4D87-897F-CE3EA9D19754}" type="datetimeFigureOut">
               <a:rPr lang="en-US" smtClean="0"/>
-              <a:t>1/11/2020</a:t>
+              <a:t>2/13/2020</a:t>
             </a:fld>
             <a:endParaRPr lang="en-US"/>
           </a:p>
@@ -2586,8 +2586,8 @@
         </p:nvSpPr>
         <p:spPr>
           <a:xfrm>
-            <a:off x="3740964" y="5856082"/>
-            <a:ext cx="3811548" cy="336388"/>
+            <a:off x="3740964" y="5508837"/>
+            <a:ext cx="3811548" cy="316442"/>
           </a:xfrm>
           <a:prstGeom prst="rect">
             <a:avLst/>
@@ -2597,7 +2597,7 @@
           <a:bodyPr vert="horz" lIns="91440" tIns="45720" rIns="91440" bIns="45720" rtlCol="0" anchor="ctr"/>
           <a:lstStyle>
             <a:lvl1pPr algn="ctr">
-              <a:defRPr sz="1106">
+              <a:defRPr sz="1040">
                 <a:solidFill>
                   <a:schemeClr val="tx1">
                     <a:tint val="75000"/>
@@ -2623,8 +2623,8 @@
         </p:nvSpPr>
         <p:spPr>
           <a:xfrm>
-            <a:off x="7976017" y="5856082"/>
-            <a:ext cx="2541032" cy="336388"/>
+            <a:off x="7976017" y="5508837"/>
+            <a:ext cx="2541032" cy="316442"/>
           </a:xfrm>
           <a:prstGeom prst="rect">
             <a:avLst/>
@@ -2634,7 +2634,7 @@
           <a:bodyPr vert="horz" lIns="91440" tIns="45720" rIns="91440" bIns="45720" rtlCol="0" anchor="ctr"/>
           <a:lstStyle>
             <a:lvl1pPr algn="r">
-              <a:defRPr sz="1106">
+              <a:defRPr sz="1040">
                 <a:solidFill>
                   <a:schemeClr val="tx1">
                     <a:tint val="75000"/>
@@ -2655,27 +2655,27 @@
     </p:spTree>
     <p:extLst>
       <p:ext uri="{BB962C8B-B14F-4D97-AF65-F5344CB8AC3E}">
-        <p14:creationId xmlns:p14="http://schemas.microsoft.com/office/powerpoint/2010/main" val="1622406701"/>
+        <p14:creationId xmlns:p14="http://schemas.microsoft.com/office/powerpoint/2010/main" val="3680434759"/>
       </p:ext>
     </p:extLst>
   </p:cSld>
   <p:clrMap bg1="lt1" tx1="dk1" bg2="lt2" tx2="dk2" accent1="accent1" accent2="accent2" accent3="accent3" accent4="accent4" accent5="accent5" accent6="accent6" hlink="hlink" folHlink="folHlink"/>
   <p:sldLayoutIdLst>
-    <p:sldLayoutId id="2147483673" r:id="rId1"/>
-    <p:sldLayoutId id="2147483674" r:id="rId2"/>
-    <p:sldLayoutId id="2147483675" r:id="rId3"/>
-    <p:sldLayoutId id="2147483676" r:id="rId4"/>
-    <p:sldLayoutId id="2147483677" r:id="rId5"/>
-    <p:sldLayoutId id="2147483678" r:id="rId6"/>
-    <p:sldLayoutId id="2147483679" r:id="rId7"/>
-    <p:sldLayoutId id="2147483680" r:id="rId8"/>
-    <p:sldLayoutId id="2147483681" r:id="rId9"/>
-    <p:sldLayoutId id="2147483682" r:id="rId10"/>
-    <p:sldLayoutId id="2147483683" r:id="rId11"/>
+    <p:sldLayoutId id="2147483685" r:id="rId1"/>
+    <p:sldLayoutId id="2147483686" r:id="rId2"/>
+    <p:sldLayoutId id="2147483687" r:id="rId3"/>
+    <p:sldLayoutId id="2147483688" r:id="rId4"/>
+    <p:sldLayoutId id="2147483689" r:id="rId5"/>
+    <p:sldLayoutId id="2147483690" r:id="rId6"/>
+    <p:sldLayoutId id="2147483691" r:id="rId7"/>
+    <p:sldLayoutId id="2147483692" r:id="rId8"/>
+    <p:sldLayoutId id="2147483693" r:id="rId9"/>
+    <p:sldLayoutId id="2147483694" r:id="rId10"/>
+    <p:sldLayoutId id="2147483695" r:id="rId11"/>
   </p:sldLayoutIdLst>
   <p:txStyles>
     <p:titleStyle>
-      <a:lvl1pPr algn="l" defTabSz="842437" rtl="0" eaLnBrk="1" latinLnBrk="0" hangingPunct="1">
+      <a:lvl1pPr algn="l" defTabSz="792510" rtl="0" eaLnBrk="1" latinLnBrk="0" hangingPunct="1">
         <a:lnSpc>
           <a:spcPct val="90000"/>
         </a:lnSpc>
@@ -2683,7 +2683,7 @@
           <a:spcPct val="0"/>
         </a:spcBef>
         <a:buNone/>
-        <a:defRPr sz="4054" kern="1200">
+        <a:defRPr sz="3813" kern="1200">
           <a:solidFill>
             <a:schemeClr val="tx1"/>
           </a:solidFill>
@@ -2694,16 +2694,16 @@
       </a:lvl1pPr>
     </p:titleStyle>
     <p:bodyStyle>
-      <a:lvl1pPr marL="210609" indent="-210609" algn="l" defTabSz="842437" rtl="0" eaLnBrk="1" latinLnBrk="0" hangingPunct="1">
+      <a:lvl1pPr marL="198128" indent="-198128" algn="l" defTabSz="792510" rtl="0" eaLnBrk="1" latinLnBrk="0" hangingPunct="1">
         <a:lnSpc>
           <a:spcPct val="90000"/>
         </a:lnSpc>
         <a:spcBef>
-          <a:spcPts val="921"/>
+          <a:spcPts val="867"/>
         </a:spcBef>
         <a:buFont typeface="Arial" panose="020B0604020202020204" pitchFamily="34" charset="0"/>
         <a:buChar char="•"/>
-        <a:defRPr sz="2580" kern="1200">
+        <a:defRPr sz="2427" kern="1200">
           <a:solidFill>
             <a:schemeClr val="tx1"/>
           </a:solidFill>
@@ -2712,16 +2712,16 @@
           <a:cs typeface="+mn-cs"/>
         </a:defRPr>
       </a:lvl1pPr>
-      <a:lvl2pPr marL="631828" indent="-210609" algn="l" defTabSz="842437" rtl="0" eaLnBrk="1" latinLnBrk="0" hangingPunct="1">
+      <a:lvl2pPr marL="594383" indent="-198128" algn="l" defTabSz="792510" rtl="0" eaLnBrk="1" latinLnBrk="0" hangingPunct="1">
         <a:lnSpc>
           <a:spcPct val="90000"/>
         </a:lnSpc>
         <a:spcBef>
-          <a:spcPts val="461"/>
+          <a:spcPts val="433"/>
         </a:spcBef>
         <a:buFont typeface="Arial" panose="020B0604020202020204" pitchFamily="34" charset="0"/>
         <a:buChar char="•"/>
-        <a:defRPr sz="2211" kern="1200">
+        <a:defRPr sz="2080" kern="1200">
           <a:solidFill>
             <a:schemeClr val="tx1"/>
           </a:solidFill>
@@ -2730,16 +2730,16 @@
           <a:cs typeface="+mn-cs"/>
         </a:defRPr>
       </a:lvl2pPr>
-      <a:lvl3pPr marL="1053046" indent="-210609" algn="l" defTabSz="842437" rtl="0" eaLnBrk="1" latinLnBrk="0" hangingPunct="1">
+      <a:lvl3pPr marL="990638" indent="-198128" algn="l" defTabSz="792510" rtl="0" eaLnBrk="1" latinLnBrk="0" hangingPunct="1">
         <a:lnSpc>
           <a:spcPct val="90000"/>
         </a:lnSpc>
         <a:spcBef>
-          <a:spcPts val="461"/>
+          <a:spcPts val="433"/>
         </a:spcBef>
         <a:buFont typeface="Arial" panose="020B0604020202020204" pitchFamily="34" charset="0"/>
         <a:buChar char="•"/>
-        <a:defRPr sz="1843" kern="1200">
+        <a:defRPr sz="1733" kern="1200">
           <a:solidFill>
             <a:schemeClr val="tx1"/>
           </a:solidFill>
@@ -2748,16 +2748,16 @@
           <a:cs typeface="+mn-cs"/>
         </a:defRPr>
       </a:lvl3pPr>
-      <a:lvl4pPr marL="1474264" indent="-210609" algn="l" defTabSz="842437" rtl="0" eaLnBrk="1" latinLnBrk="0" hangingPunct="1">
+      <a:lvl4pPr marL="1386893" indent="-198128" algn="l" defTabSz="792510" rtl="0" eaLnBrk="1" latinLnBrk="0" hangingPunct="1">
         <a:lnSpc>
           <a:spcPct val="90000"/>
         </a:lnSpc>
         <a:spcBef>
-          <a:spcPts val="461"/>
+          <a:spcPts val="433"/>
         </a:spcBef>
         <a:buFont typeface="Arial" panose="020B0604020202020204" pitchFamily="34" charset="0"/>
         <a:buChar char="•"/>
-        <a:defRPr sz="1658" kern="1200">
+        <a:defRPr sz="1560" kern="1200">
           <a:solidFill>
             <a:schemeClr val="tx1"/>
           </a:solidFill>
@@ -2766,16 +2766,16 @@
           <a:cs typeface="+mn-cs"/>
         </a:defRPr>
       </a:lvl4pPr>
-      <a:lvl5pPr marL="1895483" indent="-210609" algn="l" defTabSz="842437" rtl="0" eaLnBrk="1" latinLnBrk="0" hangingPunct="1">
+      <a:lvl5pPr marL="1783149" indent="-198128" algn="l" defTabSz="792510" rtl="0" eaLnBrk="1" latinLnBrk="0" hangingPunct="1">
         <a:lnSpc>
           <a:spcPct val="90000"/>
         </a:lnSpc>
         <a:spcBef>
-          <a:spcPts val="461"/>
+          <a:spcPts val="433"/>
         </a:spcBef>
         <a:buFont typeface="Arial" panose="020B0604020202020204" pitchFamily="34" charset="0"/>
         <a:buChar char="•"/>
-        <a:defRPr sz="1658" kern="1200">
+        <a:defRPr sz="1560" kern="1200">
           <a:solidFill>
             <a:schemeClr val="tx1"/>
           </a:solidFill>
@@ -2784,16 +2784,16 @@
           <a:cs typeface="+mn-cs"/>
         </a:defRPr>
       </a:lvl5pPr>
-      <a:lvl6pPr marL="2316701" indent="-210609" algn="l" defTabSz="842437" rtl="0" eaLnBrk="1" latinLnBrk="0" hangingPunct="1">
+      <a:lvl6pPr marL="2179404" indent="-198128" algn="l" defTabSz="792510" rtl="0" eaLnBrk="1" latinLnBrk="0" hangingPunct="1">
         <a:lnSpc>
           <a:spcPct val="90000"/>
         </a:lnSpc>
         <a:spcBef>
-          <a:spcPts val="461"/>
+          <a:spcPts val="433"/>
         </a:spcBef>
         <a:buFont typeface="Arial" panose="020B0604020202020204" pitchFamily="34" charset="0"/>
         <a:buChar char="•"/>
-        <a:defRPr sz="1658" kern="1200">
+        <a:defRPr sz="1560" kern="1200">
           <a:solidFill>
             <a:schemeClr val="tx1"/>
           </a:solidFill>
@@ -2802,16 +2802,16 @@
           <a:cs typeface="+mn-cs"/>
         </a:defRPr>
       </a:lvl6pPr>
-      <a:lvl7pPr marL="2737919" indent="-210609" algn="l" defTabSz="842437" rtl="0" eaLnBrk="1" latinLnBrk="0" hangingPunct="1">
+      <a:lvl7pPr marL="2575659" indent="-198128" algn="l" defTabSz="792510" rtl="0" eaLnBrk="1" latinLnBrk="0" hangingPunct="1">
         <a:lnSpc>
           <a:spcPct val="90000"/>
         </a:lnSpc>
         <a:spcBef>
-          <a:spcPts val="461"/>
+          <a:spcPts val="433"/>
         </a:spcBef>
         <a:buFont typeface="Arial" panose="020B0604020202020204" pitchFamily="34" charset="0"/>
         <a:buChar char="•"/>
-        <a:defRPr sz="1658" kern="1200">
+        <a:defRPr sz="1560" kern="1200">
           <a:solidFill>
             <a:schemeClr val="tx1"/>
           </a:solidFill>
@@ -2820,16 +2820,16 @@
           <a:cs typeface="+mn-cs"/>
         </a:defRPr>
       </a:lvl7pPr>
-      <a:lvl8pPr marL="3159138" indent="-210609" algn="l" defTabSz="842437" rtl="0" eaLnBrk="1" latinLnBrk="0" hangingPunct="1">
+      <a:lvl8pPr marL="2971914" indent="-198128" algn="l" defTabSz="792510" rtl="0" eaLnBrk="1" latinLnBrk="0" hangingPunct="1">
         <a:lnSpc>
           <a:spcPct val="90000"/>
         </a:lnSpc>
         <a:spcBef>
-          <a:spcPts val="461"/>
+          <a:spcPts val="433"/>
         </a:spcBef>
         <a:buFont typeface="Arial" panose="020B0604020202020204" pitchFamily="34" charset="0"/>
         <a:buChar char="•"/>
-        <a:defRPr sz="1658" kern="1200">
+        <a:defRPr sz="1560" kern="1200">
           <a:solidFill>
             <a:schemeClr val="tx1"/>
           </a:solidFill>
@@ -2838,16 +2838,16 @@
           <a:cs typeface="+mn-cs"/>
         </a:defRPr>
       </a:lvl8pPr>
-      <a:lvl9pPr marL="3580356" indent="-210609" algn="l" defTabSz="842437" rtl="0" eaLnBrk="1" latinLnBrk="0" hangingPunct="1">
+      <a:lvl9pPr marL="3368170" indent="-198128" algn="l" defTabSz="792510" rtl="0" eaLnBrk="1" latinLnBrk="0" hangingPunct="1">
         <a:lnSpc>
           <a:spcPct val="90000"/>
         </a:lnSpc>
         <a:spcBef>
-          <a:spcPts val="461"/>
+          <a:spcPts val="433"/>
         </a:spcBef>
         <a:buFont typeface="Arial" panose="020B0604020202020204" pitchFamily="34" charset="0"/>
         <a:buChar char="•"/>
-        <a:defRPr sz="1658" kern="1200">
+        <a:defRPr sz="1560" kern="1200">
           <a:solidFill>
             <a:schemeClr val="tx1"/>
           </a:solidFill>
@@ -2861,8 +2861,8 @@
       <a:defPPr>
         <a:defRPr lang="en-US"/>
       </a:defPPr>
-      <a:lvl1pPr marL="0" algn="l" defTabSz="842437" rtl="0" eaLnBrk="1" latinLnBrk="0" hangingPunct="1">
-        <a:defRPr sz="1658" kern="1200">
+      <a:lvl1pPr marL="0" algn="l" defTabSz="792510" rtl="0" eaLnBrk="1" latinLnBrk="0" hangingPunct="1">
+        <a:defRPr sz="1560" kern="1200">
           <a:solidFill>
             <a:schemeClr val="tx1"/>
           </a:solidFill>
@@ -2871,8 +2871,8 @@
           <a:cs typeface="+mn-cs"/>
         </a:defRPr>
       </a:lvl1pPr>
-      <a:lvl2pPr marL="421218" algn="l" defTabSz="842437" rtl="0" eaLnBrk="1" latinLnBrk="0" hangingPunct="1">
-        <a:defRPr sz="1658" kern="1200">
+      <a:lvl2pPr marL="396255" algn="l" defTabSz="792510" rtl="0" eaLnBrk="1" latinLnBrk="0" hangingPunct="1">
+        <a:defRPr sz="1560" kern="1200">
           <a:solidFill>
             <a:schemeClr val="tx1"/>
           </a:solidFill>
@@ -2881,8 +2881,8 @@
           <a:cs typeface="+mn-cs"/>
         </a:defRPr>
       </a:lvl2pPr>
-      <a:lvl3pPr marL="842437" algn="l" defTabSz="842437" rtl="0" eaLnBrk="1" latinLnBrk="0" hangingPunct="1">
-        <a:defRPr sz="1658" kern="1200">
+      <a:lvl3pPr marL="792510" algn="l" defTabSz="792510" rtl="0" eaLnBrk="1" latinLnBrk="0" hangingPunct="1">
+        <a:defRPr sz="1560" kern="1200">
           <a:solidFill>
             <a:schemeClr val="tx1"/>
           </a:solidFill>
@@ -2891,8 +2891,8 @@
           <a:cs typeface="+mn-cs"/>
         </a:defRPr>
       </a:lvl3pPr>
-      <a:lvl4pPr marL="1263655" algn="l" defTabSz="842437" rtl="0" eaLnBrk="1" latinLnBrk="0" hangingPunct="1">
-        <a:defRPr sz="1658" kern="1200">
+      <a:lvl4pPr marL="1188766" algn="l" defTabSz="792510" rtl="0" eaLnBrk="1" latinLnBrk="0" hangingPunct="1">
+        <a:defRPr sz="1560" kern="1200">
           <a:solidFill>
             <a:schemeClr val="tx1"/>
           </a:solidFill>
@@ -2901,8 +2901,8 @@
           <a:cs typeface="+mn-cs"/>
         </a:defRPr>
       </a:lvl4pPr>
-      <a:lvl5pPr marL="1684873" algn="l" defTabSz="842437" rtl="0" eaLnBrk="1" latinLnBrk="0" hangingPunct="1">
-        <a:defRPr sz="1658" kern="1200">
+      <a:lvl5pPr marL="1585021" algn="l" defTabSz="792510" rtl="0" eaLnBrk="1" latinLnBrk="0" hangingPunct="1">
+        <a:defRPr sz="1560" kern="1200">
           <a:solidFill>
             <a:schemeClr val="tx1"/>
           </a:solidFill>
@@ -2911,8 +2911,8 @@
           <a:cs typeface="+mn-cs"/>
         </a:defRPr>
       </a:lvl5pPr>
-      <a:lvl6pPr marL="2106092" algn="l" defTabSz="842437" rtl="0" eaLnBrk="1" latinLnBrk="0" hangingPunct="1">
-        <a:defRPr sz="1658" kern="1200">
+      <a:lvl6pPr marL="1981276" algn="l" defTabSz="792510" rtl="0" eaLnBrk="1" latinLnBrk="0" hangingPunct="1">
+        <a:defRPr sz="1560" kern="1200">
           <a:solidFill>
             <a:schemeClr val="tx1"/>
           </a:solidFill>
@@ -2921,8 +2921,8 @@
           <a:cs typeface="+mn-cs"/>
         </a:defRPr>
       </a:lvl6pPr>
-      <a:lvl7pPr marL="2527310" algn="l" defTabSz="842437" rtl="0" eaLnBrk="1" latinLnBrk="0" hangingPunct="1">
-        <a:defRPr sz="1658" kern="1200">
+      <a:lvl7pPr marL="2377531" algn="l" defTabSz="792510" rtl="0" eaLnBrk="1" latinLnBrk="0" hangingPunct="1">
+        <a:defRPr sz="1560" kern="1200">
           <a:solidFill>
             <a:schemeClr val="tx1"/>
           </a:solidFill>
@@ -2931,8 +2931,8 @@
           <a:cs typeface="+mn-cs"/>
         </a:defRPr>
       </a:lvl7pPr>
-      <a:lvl8pPr marL="2948529" algn="l" defTabSz="842437" rtl="0" eaLnBrk="1" latinLnBrk="0" hangingPunct="1">
-        <a:defRPr sz="1658" kern="1200">
+      <a:lvl8pPr marL="2773787" algn="l" defTabSz="792510" rtl="0" eaLnBrk="1" latinLnBrk="0" hangingPunct="1">
+        <a:defRPr sz="1560" kern="1200">
           <a:solidFill>
             <a:schemeClr val="tx1"/>
           </a:solidFill>
@@ -2941,8 +2941,8 @@
           <a:cs typeface="+mn-cs"/>
         </a:defRPr>
       </a:lvl8pPr>
-      <a:lvl9pPr marL="3369747" algn="l" defTabSz="842437" rtl="0" eaLnBrk="1" latinLnBrk="0" hangingPunct="1">
-        <a:defRPr sz="1658" kern="1200">
+      <a:lvl9pPr marL="3170042" algn="l" defTabSz="792510" rtl="0" eaLnBrk="1" latinLnBrk="0" hangingPunct="1">
+        <a:defRPr sz="1560" kern="1200">
           <a:solidFill>
             <a:schemeClr val="tx1"/>
           </a:solidFill>
@@ -2975,10 +2975,10 @@
       </p:grpSpPr>
       <p:pic>
         <p:nvPicPr>
-          <p:cNvPr id="28" name="Picture 27">
+          <p:cNvPr id="25" name="Picture 24">
             <a:extLst>
               <a:ext uri="{FF2B5EF4-FFF2-40B4-BE49-F238E27FC236}">
-                <a16:creationId xmlns:a16="http://schemas.microsoft.com/office/drawing/2014/main" id="{75A81EDE-773D-4B7F-966A-C714CFEA180E}"/>
+                <a16:creationId xmlns:a16="http://schemas.microsoft.com/office/drawing/2014/main" id="{90EF4958-E693-49CC-B91B-3B619A69F7DB}"/>
               </a:ext>
             </a:extLst>
           </p:cNvPr>
@@ -2995,8 +2995,8 @@
         </p:blipFill>
         <p:spPr>
           <a:xfrm>
-            <a:off x="0" y="0"/>
-            <a:ext cx="11295758" cy="6318250"/>
+            <a:off x="-1" y="6216"/>
+            <a:ext cx="11293475" cy="5881266"/>
           </a:xfrm>
           <a:prstGeom prst="rect">
             <a:avLst/>
@@ -3005,10 +3005,10 @@
       </p:pic>
       <p:sp>
         <p:nvSpPr>
-          <p:cNvPr id="29" name="TextBox 28">
+          <p:cNvPr id="26" name="TextBox 25">
             <a:extLst>
               <a:ext uri="{FF2B5EF4-FFF2-40B4-BE49-F238E27FC236}">
-                <a16:creationId xmlns:a16="http://schemas.microsoft.com/office/drawing/2014/main" id="{CB30FE2A-95E5-48CC-806D-A036364C3F4C}"/>
+                <a16:creationId xmlns:a16="http://schemas.microsoft.com/office/drawing/2014/main" id="{704C8BA6-32EF-4308-BC07-CE0A12E83308}"/>
               </a:ext>
             </a:extLst>
           </p:cNvPr>
@@ -3017,7 +3017,7 @@
         </p:nvSpPr>
         <p:spPr>
           <a:xfrm>
-            <a:off x="65314" y="5271610"/>
+            <a:off x="34094" y="4890408"/>
             <a:ext cx="778329" cy="646331"/>
           </a:xfrm>
           <a:prstGeom prst="rect">
@@ -3080,10 +3080,10 @@
       </p:sp>
       <p:sp>
         <p:nvSpPr>
-          <p:cNvPr id="30" name="TextBox 29">
+          <p:cNvPr id="27" name="TextBox 26">
             <a:extLst>
               <a:ext uri="{FF2B5EF4-FFF2-40B4-BE49-F238E27FC236}">
-                <a16:creationId xmlns:a16="http://schemas.microsoft.com/office/drawing/2014/main" id="{834BFE88-1277-4AFB-8CC6-4D2D3E97CBEB}"/>
+                <a16:creationId xmlns:a16="http://schemas.microsoft.com/office/drawing/2014/main" id="{307706B6-A064-471A-963C-E66232CE3D7A}"/>
               </a:ext>
             </a:extLst>
           </p:cNvPr>
@@ -3092,7 +3092,7 @@
         </p:nvSpPr>
         <p:spPr>
           <a:xfrm>
-            <a:off x="5099910" y="5531825"/>
+            <a:off x="5388944" y="5161964"/>
             <a:ext cx="1230086" cy="369332"/>
           </a:xfrm>
           <a:prstGeom prst="rect">
@@ -3155,10 +3155,10 @@
       </p:sp>
       <p:sp>
         <p:nvSpPr>
-          <p:cNvPr id="31" name="TextBox 30">
+          <p:cNvPr id="33" name="TextBox 32">
             <a:extLst>
               <a:ext uri="{FF2B5EF4-FFF2-40B4-BE49-F238E27FC236}">
-                <a16:creationId xmlns:a16="http://schemas.microsoft.com/office/drawing/2014/main" id="{2AA3C42C-B276-4E51-B1D8-5FC1D2BC5745}"/>
+                <a16:creationId xmlns:a16="http://schemas.microsoft.com/office/drawing/2014/main" id="{C8BED6F8-0EC5-4745-9694-04A3BC016D58}"/>
               </a:ext>
             </a:extLst>
           </p:cNvPr>
@@ -3167,7 +3167,7 @@
         </p:nvSpPr>
         <p:spPr>
           <a:xfrm>
-            <a:off x="3934409" y="609580"/>
+            <a:off x="2993571" y="508830"/>
             <a:ext cx="615821" cy="307777"/>
           </a:xfrm>
           <a:prstGeom prst="rect">
@@ -3230,10 +3230,10 @@
       </p:sp>
       <p:sp>
         <p:nvSpPr>
-          <p:cNvPr id="32" name="TextBox 31">
+          <p:cNvPr id="34" name="TextBox 33">
             <a:extLst>
               <a:ext uri="{FF2B5EF4-FFF2-40B4-BE49-F238E27FC236}">
-                <a16:creationId xmlns:a16="http://schemas.microsoft.com/office/drawing/2014/main" id="{63CBA88A-F69F-47E2-AFB4-C5BA616F7532}"/>
+                <a16:creationId xmlns:a16="http://schemas.microsoft.com/office/drawing/2014/main" id="{811F3CFC-CF6C-4FCB-8E84-1D0F6D9AC49F}"/>
               </a:ext>
             </a:extLst>
           </p:cNvPr>
@@ -3242,7 +3242,7 @@
         </p:nvSpPr>
         <p:spPr>
           <a:xfrm>
-            <a:off x="1010252" y="2156966"/>
+            <a:off x="801537" y="1712104"/>
             <a:ext cx="559642" cy="307777"/>
           </a:xfrm>
           <a:prstGeom prst="rect">
@@ -3306,22 +3306,22 @@
       </p:sp>
       <p:cxnSp>
         <p:nvCxnSpPr>
-          <p:cNvPr id="36" name="Straight Arrow Connector 35">
+          <p:cNvPr id="35" name="Straight Arrow Connector 34">
             <a:extLst>
               <a:ext uri="{FF2B5EF4-FFF2-40B4-BE49-F238E27FC236}">
-                <a16:creationId xmlns:a16="http://schemas.microsoft.com/office/drawing/2014/main" id="{2F865C1D-780A-47F4-9864-01ED1FA1FFCE}"/>
+                <a16:creationId xmlns:a16="http://schemas.microsoft.com/office/drawing/2014/main" id="{1E07FE48-16BB-4265-8542-7546E8BA94C6}"/>
               </a:ext>
             </a:extLst>
           </p:cNvPr>
           <p:cNvCxnSpPr>
             <a:cxnSpLocks/>
-            <a:stCxn id="32" idx="3"/>
+            <a:stCxn id="34" idx="3"/>
           </p:cNvCxnSpPr>
           <p:nvPr/>
         </p:nvCxnSpPr>
         <p:spPr>
           <a:xfrm>
-            <a:off x="1569894" y="2310855"/>
+            <a:off x="1361179" y="1865993"/>
             <a:ext cx="274941" cy="278636"/>
           </a:xfrm>
           <a:prstGeom prst="straightConnector1">
@@ -3351,22 +3351,22 @@
       </p:cxnSp>
       <p:cxnSp>
         <p:nvCxnSpPr>
-          <p:cNvPr id="37" name="Straight Arrow Connector 36">
+          <p:cNvPr id="40" name="Straight Arrow Connector 39">
             <a:extLst>
               <a:ext uri="{FF2B5EF4-FFF2-40B4-BE49-F238E27FC236}">
-                <a16:creationId xmlns:a16="http://schemas.microsoft.com/office/drawing/2014/main" id="{54D9868B-417E-413A-8FF0-2BC60A70F022}"/>
+                <a16:creationId xmlns:a16="http://schemas.microsoft.com/office/drawing/2014/main" id="{8D3DEFB5-9EEE-4FE2-A8DA-BFE731F37A17}"/>
               </a:ext>
             </a:extLst>
           </p:cNvPr>
           <p:cNvCxnSpPr>
             <a:cxnSpLocks/>
-            <a:stCxn id="32" idx="1"/>
+            <a:stCxn id="34" idx="1"/>
           </p:cNvCxnSpPr>
           <p:nvPr/>
         </p:nvCxnSpPr>
         <p:spPr>
           <a:xfrm flipH="1">
-            <a:off x="684944" y="2310855"/>
+            <a:off x="476229" y="1865993"/>
             <a:ext cx="325308" cy="633731"/>
           </a:xfrm>
           <a:prstGeom prst="straightConnector1">
@@ -3396,10 +3396,10 @@
       </p:cxnSp>
       <p:sp>
         <p:nvSpPr>
-          <p:cNvPr id="38" name="TextBox 37">
+          <p:cNvPr id="41" name="TextBox 40">
             <a:extLst>
               <a:ext uri="{FF2B5EF4-FFF2-40B4-BE49-F238E27FC236}">
-                <a16:creationId xmlns:a16="http://schemas.microsoft.com/office/drawing/2014/main" id="{EA7BAFB4-ABC0-4AFD-9C4F-CEF28ADC826E}"/>
+                <a16:creationId xmlns:a16="http://schemas.microsoft.com/office/drawing/2014/main" id="{D1311B0E-D816-4D06-9969-C0E5886D69BB}"/>
               </a:ext>
             </a:extLst>
           </p:cNvPr>
@@ -3408,7 +3408,7 @@
         </p:nvSpPr>
         <p:spPr>
           <a:xfrm>
-            <a:off x="5561512" y="1932948"/>
+            <a:off x="5413651" y="1675021"/>
             <a:ext cx="884950" cy="277127"/>
           </a:xfrm>
           <a:prstGeom prst="rect">
@@ -3471,22 +3471,22 @@
       </p:sp>
       <p:cxnSp>
         <p:nvCxnSpPr>
-          <p:cNvPr id="39" name="Straight Arrow Connector 38">
+          <p:cNvPr id="44" name="Straight Arrow Connector 43">
             <a:extLst>
               <a:ext uri="{FF2B5EF4-FFF2-40B4-BE49-F238E27FC236}">
-                <a16:creationId xmlns:a16="http://schemas.microsoft.com/office/drawing/2014/main" id="{670B0890-518C-4A5C-ACE5-1F22EC0084A6}"/>
+                <a16:creationId xmlns:a16="http://schemas.microsoft.com/office/drawing/2014/main" id="{2F44FD36-52C1-479F-B098-12BD65A42572}"/>
               </a:ext>
             </a:extLst>
           </p:cNvPr>
           <p:cNvCxnSpPr>
             <a:cxnSpLocks/>
-            <a:stCxn id="38" idx="3"/>
+            <a:stCxn id="41" idx="3"/>
           </p:cNvCxnSpPr>
           <p:nvPr/>
         </p:nvCxnSpPr>
         <p:spPr>
           <a:xfrm>
-            <a:off x="6446462" y="2071512"/>
+            <a:off x="6298601" y="1813585"/>
             <a:ext cx="247669" cy="365295"/>
           </a:xfrm>
           <a:prstGeom prst="straightConnector1">
@@ -3516,22 +3516,22 @@
       </p:cxnSp>
       <p:cxnSp>
         <p:nvCxnSpPr>
-          <p:cNvPr id="42" name="Straight Arrow Connector 41">
+          <p:cNvPr id="45" name="Straight Arrow Connector 44">
             <a:extLst>
               <a:ext uri="{FF2B5EF4-FFF2-40B4-BE49-F238E27FC236}">
-                <a16:creationId xmlns:a16="http://schemas.microsoft.com/office/drawing/2014/main" id="{5784492A-BC77-42C9-834F-DEBE86F819E6}"/>
+                <a16:creationId xmlns:a16="http://schemas.microsoft.com/office/drawing/2014/main" id="{80D1042C-06FB-48B8-AB51-3355302628E2}"/>
               </a:ext>
             </a:extLst>
           </p:cNvPr>
           <p:cNvCxnSpPr>
             <a:cxnSpLocks/>
-            <a:stCxn id="38" idx="1"/>
+            <a:stCxn id="41" idx="1"/>
           </p:cNvCxnSpPr>
           <p:nvPr/>
         </p:nvCxnSpPr>
         <p:spPr>
           <a:xfrm flipH="1">
-            <a:off x="5192486" y="2071512"/>
+            <a:off x="5044625" y="1813585"/>
             <a:ext cx="369026" cy="393231"/>
           </a:xfrm>
           <a:prstGeom prst="straightConnector1">
@@ -3561,10 +3561,10 @@
       </p:cxnSp>
       <p:sp>
         <p:nvSpPr>
-          <p:cNvPr id="43" name="TextBox 42">
+          <p:cNvPr id="47" name="TextBox 46">
             <a:extLst>
               <a:ext uri="{FF2B5EF4-FFF2-40B4-BE49-F238E27FC236}">
-                <a16:creationId xmlns:a16="http://schemas.microsoft.com/office/drawing/2014/main" id="{D8ACECEE-31D6-48E0-88FC-70B2AAE5B739}"/>
+                <a16:creationId xmlns:a16="http://schemas.microsoft.com/office/drawing/2014/main" id="{5C8DAD7A-3FFF-440D-A41B-1F95F9A2F89C}"/>
               </a:ext>
             </a:extLst>
           </p:cNvPr>
@@ -3573,7 +3573,7 @@
         </p:nvSpPr>
         <p:spPr>
           <a:xfrm>
-            <a:off x="5541365" y="4620068"/>
+            <a:off x="5397322" y="4423309"/>
             <a:ext cx="757236" cy="277127"/>
           </a:xfrm>
           <a:prstGeom prst="rect">
@@ -3636,22 +3636,22 @@
       </p:sp>
       <p:cxnSp>
         <p:nvCxnSpPr>
-          <p:cNvPr id="46" name="Straight Arrow Connector 45">
+          <p:cNvPr id="49" name="Straight Arrow Connector 48">
             <a:extLst>
               <a:ext uri="{FF2B5EF4-FFF2-40B4-BE49-F238E27FC236}">
-                <a16:creationId xmlns:a16="http://schemas.microsoft.com/office/drawing/2014/main" id="{14A855A2-5A05-486E-8F90-AF62AB3B93E5}"/>
+                <a16:creationId xmlns:a16="http://schemas.microsoft.com/office/drawing/2014/main" id="{ACBE6FED-6BA9-4C25-AEED-841FCC5AA4A4}"/>
               </a:ext>
             </a:extLst>
           </p:cNvPr>
           <p:cNvCxnSpPr>
             <a:cxnSpLocks/>
-            <a:stCxn id="43" idx="0"/>
+            <a:stCxn id="47" idx="0"/>
           </p:cNvCxnSpPr>
           <p:nvPr/>
         </p:nvCxnSpPr>
         <p:spPr>
           <a:xfrm flipV="1">
-            <a:off x="5919983" y="4143023"/>
+            <a:off x="5775940" y="3946264"/>
             <a:ext cx="0" cy="477045"/>
           </a:xfrm>
           <a:prstGeom prst="straightConnector1">
@@ -3681,10 +3681,10 @@
       </p:cxnSp>
       <p:sp>
         <p:nvSpPr>
-          <p:cNvPr id="48" name="TextBox 47">
+          <p:cNvPr id="50" name="TextBox 49">
             <a:extLst>
               <a:ext uri="{FF2B5EF4-FFF2-40B4-BE49-F238E27FC236}">
-                <a16:creationId xmlns:a16="http://schemas.microsoft.com/office/drawing/2014/main" id="{2F8A99B3-094A-4B2F-A017-7A805FEDE55E}"/>
+                <a16:creationId xmlns:a16="http://schemas.microsoft.com/office/drawing/2014/main" id="{A30C0765-0510-46CD-B44D-E94181F27C14}"/>
               </a:ext>
             </a:extLst>
           </p:cNvPr>
@@ -3693,7 +3693,7 @@
         </p:nvSpPr>
         <p:spPr>
           <a:xfrm>
-            <a:off x="2937025" y="3348813"/>
+            <a:off x="2743199" y="3071518"/>
             <a:ext cx="902343" cy="277127"/>
           </a:xfrm>
           <a:prstGeom prst="rect">
@@ -3756,22 +3756,22 @@
       </p:sp>
       <p:cxnSp>
         <p:nvCxnSpPr>
-          <p:cNvPr id="53" name="Straight Arrow Connector 52">
+          <p:cNvPr id="51" name="Straight Arrow Connector 50">
             <a:extLst>
               <a:ext uri="{FF2B5EF4-FFF2-40B4-BE49-F238E27FC236}">
-                <a16:creationId xmlns:a16="http://schemas.microsoft.com/office/drawing/2014/main" id="{BEC23C9C-F04A-4D5F-9F93-9CDEF9A923A3}"/>
+                <a16:creationId xmlns:a16="http://schemas.microsoft.com/office/drawing/2014/main" id="{936BB162-D1D5-4F09-90CD-2E22ED4AD40C}"/>
               </a:ext>
             </a:extLst>
           </p:cNvPr>
           <p:cNvCxnSpPr>
             <a:cxnSpLocks/>
-            <a:stCxn id="48" idx="3"/>
+            <a:stCxn id="50" idx="3"/>
           </p:cNvCxnSpPr>
           <p:nvPr/>
         </p:nvCxnSpPr>
         <p:spPr>
           <a:xfrm>
-            <a:off x="3839368" y="3487377"/>
+            <a:off x="3645542" y="3210082"/>
             <a:ext cx="330995" cy="0"/>
           </a:xfrm>
           <a:prstGeom prst="straightConnector1">
@@ -3801,10 +3801,10 @@
       </p:cxnSp>
       <p:sp>
         <p:nvSpPr>
-          <p:cNvPr id="57" name="TextBox 56">
+          <p:cNvPr id="52" name="TextBox 51">
             <a:extLst>
               <a:ext uri="{FF2B5EF4-FFF2-40B4-BE49-F238E27FC236}">
-                <a16:creationId xmlns:a16="http://schemas.microsoft.com/office/drawing/2014/main" id="{392D63F9-4C1C-4B6F-9577-049413F58489}"/>
+                <a16:creationId xmlns:a16="http://schemas.microsoft.com/office/drawing/2014/main" id="{190034E4-F236-4100-88A6-390D78FFFDBF}"/>
               </a:ext>
             </a:extLst>
           </p:cNvPr>
@@ -3813,7 +3813,7 @@
         </p:nvSpPr>
         <p:spPr>
           <a:xfrm>
-            <a:off x="9117878" y="3328441"/>
+            <a:off x="9330150" y="3100794"/>
             <a:ext cx="832755" cy="277127"/>
           </a:xfrm>
           <a:prstGeom prst="rect">
@@ -3877,22 +3877,22 @@
       </p:sp>
       <p:cxnSp>
         <p:nvCxnSpPr>
-          <p:cNvPr id="58" name="Straight Arrow Connector 57">
+          <p:cNvPr id="54" name="Straight Arrow Connector 53">
             <a:extLst>
               <a:ext uri="{FF2B5EF4-FFF2-40B4-BE49-F238E27FC236}">
-                <a16:creationId xmlns:a16="http://schemas.microsoft.com/office/drawing/2014/main" id="{BF974F81-A01B-4A14-B5ED-611E46AC83DF}"/>
+                <a16:creationId xmlns:a16="http://schemas.microsoft.com/office/drawing/2014/main" id="{F38ABD77-9E93-4989-B9DF-90ADCBC3F91E}"/>
               </a:ext>
             </a:extLst>
           </p:cNvPr>
           <p:cNvCxnSpPr>
             <a:cxnSpLocks/>
-            <a:stCxn id="57" idx="1"/>
+            <a:stCxn id="52" idx="1"/>
           </p:cNvCxnSpPr>
           <p:nvPr/>
         </p:nvCxnSpPr>
         <p:spPr>
           <a:xfrm flipH="1" flipV="1">
-            <a:off x="8778242" y="3466941"/>
+            <a:off x="8990514" y="3239294"/>
             <a:ext cx="339636" cy="64"/>
           </a:xfrm>
           <a:prstGeom prst="straightConnector1">
@@ -3922,10 +3922,10 @@
       </p:cxnSp>
       <p:sp>
         <p:nvSpPr>
-          <p:cNvPr id="60" name="TextBox 59">
+          <p:cNvPr id="55" name="TextBox 54">
             <a:extLst>
               <a:ext uri="{FF2B5EF4-FFF2-40B4-BE49-F238E27FC236}">
-                <a16:creationId xmlns:a16="http://schemas.microsoft.com/office/drawing/2014/main" id="{F1F18B27-7D17-4079-8264-2CE44C3098EC}"/>
+                <a16:creationId xmlns:a16="http://schemas.microsoft.com/office/drawing/2014/main" id="{62B827FE-8D7F-440C-AB50-07E9C1F5AE54}"/>
               </a:ext>
             </a:extLst>
           </p:cNvPr>
@@ -3934,7 +3934,7 @@
         </p:nvSpPr>
         <p:spPr>
           <a:xfrm>
-            <a:off x="9117878" y="2450927"/>
+            <a:off x="9050387" y="2190709"/>
             <a:ext cx="832755" cy="277127"/>
           </a:xfrm>
           <a:prstGeom prst="rect">
@@ -3997,10 +3997,10 @@
       </p:sp>
       <p:sp>
         <p:nvSpPr>
-          <p:cNvPr id="61" name="TextBox 60">
+          <p:cNvPr id="56" name="TextBox 55">
             <a:extLst>
               <a:ext uri="{FF2B5EF4-FFF2-40B4-BE49-F238E27FC236}">
-                <a16:creationId xmlns:a16="http://schemas.microsoft.com/office/drawing/2014/main" id="{1B86553E-BD89-421D-92F8-E8EF681B9FDA}"/>
+                <a16:creationId xmlns:a16="http://schemas.microsoft.com/office/drawing/2014/main" id="{F4278712-BD0A-4A71-9ABC-324C23E3958C}"/>
               </a:ext>
             </a:extLst>
           </p:cNvPr>
@@ -4009,7 +4009,7 @@
         </p:nvSpPr>
         <p:spPr>
           <a:xfrm>
-            <a:off x="9077231" y="4202908"/>
+            <a:off x="9077231" y="3990632"/>
             <a:ext cx="832755" cy="277127"/>
           </a:xfrm>
           <a:prstGeom prst="rect">
@@ -4072,22 +4072,22 @@
       </p:sp>
       <p:cxnSp>
         <p:nvCxnSpPr>
-          <p:cNvPr id="62" name="Straight Arrow Connector 61">
+          <p:cNvPr id="59" name="Straight Arrow Connector 58">
             <a:extLst>
               <a:ext uri="{FF2B5EF4-FFF2-40B4-BE49-F238E27FC236}">
-                <a16:creationId xmlns:a16="http://schemas.microsoft.com/office/drawing/2014/main" id="{F1A1C5F4-FE8B-4F15-A2BC-2FC615654D90}"/>
+                <a16:creationId xmlns:a16="http://schemas.microsoft.com/office/drawing/2014/main" id="{15916F69-FC79-436E-A074-3287AC2FEDB7}"/>
               </a:ext>
             </a:extLst>
           </p:cNvPr>
           <p:cNvCxnSpPr>
             <a:cxnSpLocks/>
-            <a:stCxn id="60" idx="1"/>
+            <a:stCxn id="55" idx="1"/>
           </p:cNvCxnSpPr>
           <p:nvPr/>
         </p:nvCxnSpPr>
         <p:spPr>
           <a:xfrm flipH="1">
-            <a:off x="8719457" y="2589491"/>
+            <a:off x="8651966" y="2329273"/>
             <a:ext cx="398421" cy="400318"/>
           </a:xfrm>
           <a:prstGeom prst="straightConnector1">
@@ -4117,22 +4117,22 @@
       </p:cxnSp>
       <p:cxnSp>
         <p:nvCxnSpPr>
-          <p:cNvPr id="65" name="Straight Arrow Connector 64">
+          <p:cNvPr id="63" name="Straight Arrow Connector 62">
             <a:extLst>
               <a:ext uri="{FF2B5EF4-FFF2-40B4-BE49-F238E27FC236}">
-                <a16:creationId xmlns:a16="http://schemas.microsoft.com/office/drawing/2014/main" id="{D7BA36F5-F2F9-459C-8B32-D8DB898ECB9D}"/>
+                <a16:creationId xmlns:a16="http://schemas.microsoft.com/office/drawing/2014/main" id="{60DE5EAF-7A45-41BC-A96E-771EB1FAE5E9}"/>
               </a:ext>
             </a:extLst>
           </p:cNvPr>
           <p:cNvCxnSpPr>
             <a:cxnSpLocks/>
-            <a:stCxn id="61" idx="1"/>
+            <a:stCxn id="56" idx="1"/>
           </p:cNvCxnSpPr>
           <p:nvPr/>
         </p:nvCxnSpPr>
         <p:spPr>
           <a:xfrm flipH="1" flipV="1">
-            <a:off x="8665029" y="3944137"/>
+            <a:off x="8665029" y="3731861"/>
             <a:ext cx="412202" cy="397335"/>
           </a:xfrm>
           <a:prstGeom prst="straightConnector1">
@@ -4162,10 +4162,10 @@
       </p:cxnSp>
       <p:sp>
         <p:nvSpPr>
-          <p:cNvPr id="83" name="TextBox 82">
+          <p:cNvPr id="64" name="TextBox 63">
             <a:extLst>
               <a:ext uri="{FF2B5EF4-FFF2-40B4-BE49-F238E27FC236}">
-                <a16:creationId xmlns:a16="http://schemas.microsoft.com/office/drawing/2014/main" id="{E7401456-5654-4573-B895-0E4BCC0E8750}"/>
+                <a16:creationId xmlns:a16="http://schemas.microsoft.com/office/drawing/2014/main" id="{BDB18F4E-39A7-4B91-BA91-EC3853B73CA9}"/>
               </a:ext>
             </a:extLst>
           </p:cNvPr>
@@ -4174,7 +4174,7 @@
         </p:nvSpPr>
         <p:spPr>
           <a:xfrm>
-            <a:off x="2993571" y="4656816"/>
+            <a:off x="2743199" y="4423309"/>
             <a:ext cx="988080" cy="523220"/>
           </a:xfrm>
           <a:prstGeom prst="rect">
@@ -4238,22 +4238,22 @@
       </p:sp>
       <p:cxnSp>
         <p:nvCxnSpPr>
-          <p:cNvPr id="84" name="Straight Arrow Connector 83">
+          <p:cNvPr id="66" name="Straight Arrow Connector 65">
             <a:extLst>
               <a:ext uri="{FF2B5EF4-FFF2-40B4-BE49-F238E27FC236}">
-                <a16:creationId xmlns:a16="http://schemas.microsoft.com/office/drawing/2014/main" id="{C2344E17-461C-4DFF-8581-21AF8675FB39}"/>
+                <a16:creationId xmlns:a16="http://schemas.microsoft.com/office/drawing/2014/main" id="{6F1DBB1A-8BA5-44C8-A06B-8FABBA8A6A80}"/>
               </a:ext>
             </a:extLst>
           </p:cNvPr>
           <p:cNvCxnSpPr>
             <a:cxnSpLocks/>
-            <a:stCxn id="83" idx="0"/>
+            <a:stCxn id="64" idx="0"/>
           </p:cNvCxnSpPr>
           <p:nvPr/>
         </p:nvCxnSpPr>
         <p:spPr>
           <a:xfrm flipV="1">
-            <a:off x="3487611" y="4142016"/>
+            <a:off x="3237239" y="3908509"/>
             <a:ext cx="0" cy="514800"/>
           </a:xfrm>
           <a:prstGeom prst="straightConnector1">

</xml_diff>

<commit_message>
updated screenshot for help guide
Now it shows the more recent menu.
</commit_message>
<xml_diff>
--- a/doc-images/screenshot-initial.pptx
+++ b/doc-images/screenshot-initial.pptx
@@ -243,7 +243,7 @@
           <a:p>
             <a:fld id="{93DF655C-B5A4-4D87-897F-CE3EA9D19754}" type="datetimeFigureOut">
               <a:rPr lang="en-US" smtClean="0"/>
-              <a:t>2/13/2020</a:t>
+              <a:t>4/26/2020</a:t>
             </a:fld>
             <a:endParaRPr lang="en-US"/>
           </a:p>
@@ -413,7 +413,7 @@
           <a:p>
             <a:fld id="{93DF655C-B5A4-4D87-897F-CE3EA9D19754}" type="datetimeFigureOut">
               <a:rPr lang="en-US" smtClean="0"/>
-              <a:t>2/13/2020</a:t>
+              <a:t>4/26/2020</a:t>
             </a:fld>
             <a:endParaRPr lang="en-US"/>
           </a:p>
@@ -593,7 +593,7 @@
           <a:p>
             <a:fld id="{93DF655C-B5A4-4D87-897F-CE3EA9D19754}" type="datetimeFigureOut">
               <a:rPr lang="en-US" smtClean="0"/>
-              <a:t>2/13/2020</a:t>
+              <a:t>4/26/2020</a:t>
             </a:fld>
             <a:endParaRPr lang="en-US"/>
           </a:p>
@@ -763,7 +763,7 @@
           <a:p>
             <a:fld id="{93DF655C-B5A4-4D87-897F-CE3EA9D19754}" type="datetimeFigureOut">
               <a:rPr lang="en-US" smtClean="0"/>
-              <a:t>2/13/2020</a:t>
+              <a:t>4/26/2020</a:t>
             </a:fld>
             <a:endParaRPr lang="en-US"/>
           </a:p>
@@ -1009,7 +1009,7 @@
           <a:p>
             <a:fld id="{93DF655C-B5A4-4D87-897F-CE3EA9D19754}" type="datetimeFigureOut">
               <a:rPr lang="en-US" smtClean="0"/>
-              <a:t>2/13/2020</a:t>
+              <a:t>4/26/2020</a:t>
             </a:fld>
             <a:endParaRPr lang="en-US"/>
           </a:p>
@@ -1241,7 +1241,7 @@
           <a:p>
             <a:fld id="{93DF655C-B5A4-4D87-897F-CE3EA9D19754}" type="datetimeFigureOut">
               <a:rPr lang="en-US" smtClean="0"/>
-              <a:t>2/13/2020</a:t>
+              <a:t>4/26/2020</a:t>
             </a:fld>
             <a:endParaRPr lang="en-US"/>
           </a:p>
@@ -1608,7 +1608,7 @@
           <a:p>
             <a:fld id="{93DF655C-B5A4-4D87-897F-CE3EA9D19754}" type="datetimeFigureOut">
               <a:rPr lang="en-US" smtClean="0"/>
-              <a:t>2/13/2020</a:t>
+              <a:t>4/26/2020</a:t>
             </a:fld>
             <a:endParaRPr lang="en-US"/>
           </a:p>
@@ -1726,7 +1726,7 @@
           <a:p>
             <a:fld id="{93DF655C-B5A4-4D87-897F-CE3EA9D19754}" type="datetimeFigureOut">
               <a:rPr lang="en-US" smtClean="0"/>
-              <a:t>2/13/2020</a:t>
+              <a:t>4/26/2020</a:t>
             </a:fld>
             <a:endParaRPr lang="en-US"/>
           </a:p>
@@ -1821,7 +1821,7 @@
           <a:p>
             <a:fld id="{93DF655C-B5A4-4D87-897F-CE3EA9D19754}" type="datetimeFigureOut">
               <a:rPr lang="en-US" smtClean="0"/>
-              <a:t>2/13/2020</a:t>
+              <a:t>4/26/2020</a:t>
             </a:fld>
             <a:endParaRPr lang="en-US"/>
           </a:p>
@@ -2098,7 +2098,7 @@
           <a:p>
             <a:fld id="{93DF655C-B5A4-4D87-897F-CE3EA9D19754}" type="datetimeFigureOut">
               <a:rPr lang="en-US" smtClean="0"/>
-              <a:t>2/13/2020</a:t>
+              <a:t>4/26/2020</a:t>
             </a:fld>
             <a:endParaRPr lang="en-US"/>
           </a:p>
@@ -2355,7 +2355,7 @@
           <a:p>
             <a:fld id="{93DF655C-B5A4-4D87-897F-CE3EA9D19754}" type="datetimeFigureOut">
               <a:rPr lang="en-US" smtClean="0"/>
-              <a:t>2/13/2020</a:t>
+              <a:t>4/26/2020</a:t>
             </a:fld>
             <a:endParaRPr lang="en-US"/>
           </a:p>
@@ -2568,7 +2568,7 @@
           <a:p>
             <a:fld id="{93DF655C-B5A4-4D87-897F-CE3EA9D19754}" type="datetimeFigureOut">
               <a:rPr lang="en-US" smtClean="0"/>
-              <a:t>2/13/2020</a:t>
+              <a:t>4/26/2020</a:t>
             </a:fld>
             <a:endParaRPr lang="en-US"/>
           </a:p>
@@ -2975,10 +2975,10 @@
       </p:grpSpPr>
       <p:pic>
         <p:nvPicPr>
-          <p:cNvPr id="25" name="Picture 24">
+          <p:cNvPr id="3" name="Picture 2">
             <a:extLst>
               <a:ext uri="{FF2B5EF4-FFF2-40B4-BE49-F238E27FC236}">
-                <a16:creationId xmlns:a16="http://schemas.microsoft.com/office/drawing/2014/main" id="{90EF4958-E693-49CC-B91B-3B619A69F7DB}"/>
+                <a16:creationId xmlns:a16="http://schemas.microsoft.com/office/drawing/2014/main" id="{B30A3A5A-EB03-4E46-9F52-39634B7EFFFB}"/>
               </a:ext>
             </a:extLst>
           </p:cNvPr>
@@ -2995,8 +2995,8 @@
         </p:blipFill>
         <p:spPr>
           <a:xfrm>
-            <a:off x="-1" y="6216"/>
-            <a:ext cx="11293475" cy="5881266"/>
+            <a:off x="15081" y="0"/>
+            <a:ext cx="10868297" cy="5943600"/>
           </a:xfrm>
           <a:prstGeom prst="rect">
             <a:avLst/>
@@ -3167,7 +3167,7 @@
         </p:nvSpPr>
         <p:spPr>
           <a:xfrm>
-            <a:off x="2993571" y="508830"/>
+            <a:off x="3203033" y="320424"/>
             <a:ext cx="615821" cy="307777"/>
           </a:xfrm>
           <a:prstGeom prst="rect">
@@ -3242,7 +3242,7 @@
         </p:nvSpPr>
         <p:spPr>
           <a:xfrm>
-            <a:off x="801537" y="1712104"/>
+            <a:off x="741396" y="1521132"/>
             <a:ext cx="559642" cy="307777"/>
           </a:xfrm>
           <a:prstGeom prst="rect">
@@ -3321,8 +3321,8 @@
         </p:nvCxnSpPr>
         <p:spPr>
           <a:xfrm>
-            <a:off x="1361179" y="1865993"/>
-            <a:ext cx="274941" cy="278636"/>
+            <a:off x="1301038" y="1675021"/>
+            <a:ext cx="166673" cy="254491"/>
           </a:xfrm>
           <a:prstGeom prst="straightConnector1">
             <a:avLst/>
@@ -3366,7 +3366,7 @@
         </p:nvCxnSpPr>
         <p:spPr>
           <a:xfrm flipH="1">
-            <a:off x="476229" y="1865993"/>
+            <a:off x="416088" y="1675021"/>
             <a:ext cx="325308" cy="633731"/>
           </a:xfrm>
           <a:prstGeom prst="straightConnector1">
@@ -3408,7 +3408,7 @@
         </p:nvSpPr>
         <p:spPr>
           <a:xfrm>
-            <a:off x="5413651" y="1675021"/>
+            <a:off x="5341385" y="1397557"/>
             <a:ext cx="884950" cy="277127"/>
           </a:xfrm>
           <a:prstGeom prst="rect">
@@ -3486,8 +3486,8 @@
         </p:nvCxnSpPr>
         <p:spPr>
           <a:xfrm>
-            <a:off x="6298601" y="1813585"/>
-            <a:ext cx="247669" cy="365295"/>
+            <a:off x="6226335" y="1536121"/>
+            <a:ext cx="369026" cy="393231"/>
           </a:xfrm>
           <a:prstGeom prst="straightConnector1">
             <a:avLst/>
@@ -3531,7 +3531,7 @@
         </p:nvCxnSpPr>
         <p:spPr>
           <a:xfrm flipH="1">
-            <a:off x="5044625" y="1813585"/>
+            <a:off x="4972359" y="1536121"/>
             <a:ext cx="369026" cy="393231"/>
           </a:xfrm>
           <a:prstGeom prst="straightConnector1">
@@ -3573,7 +3573,7 @@
         </p:nvSpPr>
         <p:spPr>
           <a:xfrm>
-            <a:off x="5397322" y="4423309"/>
+            <a:off x="5419267" y="4379419"/>
             <a:ext cx="757236" cy="277127"/>
           </a:xfrm>
           <a:prstGeom prst="rect">
@@ -3651,7 +3651,7 @@
         </p:nvCxnSpPr>
         <p:spPr>
           <a:xfrm flipV="1">
-            <a:off x="5775940" y="3946264"/>
+            <a:off x="5797885" y="3902374"/>
             <a:ext cx="0" cy="477045"/>
           </a:xfrm>
           <a:prstGeom prst="straightConnector1">
@@ -3693,7 +3693,7 @@
         </p:nvSpPr>
         <p:spPr>
           <a:xfrm>
-            <a:off x="2743199" y="3071518"/>
+            <a:off x="2542399" y="2962167"/>
             <a:ext cx="902343" cy="277127"/>
           </a:xfrm>
           <a:prstGeom prst="rect">
@@ -3771,7 +3771,7 @@
         </p:nvCxnSpPr>
         <p:spPr>
           <a:xfrm>
-            <a:off x="3645542" y="3210082"/>
+            <a:off x="3444742" y="3100731"/>
             <a:ext cx="330995" cy="0"/>
           </a:xfrm>
           <a:prstGeom prst="straightConnector1">
@@ -3813,7 +3813,7 @@
         </p:nvSpPr>
         <p:spPr>
           <a:xfrm>
-            <a:off x="9330150" y="3100794"/>
+            <a:off x="9466764" y="3226559"/>
             <a:ext cx="832755" cy="277127"/>
           </a:xfrm>
           <a:prstGeom prst="rect">
@@ -3892,7 +3892,7 @@
         </p:nvCxnSpPr>
         <p:spPr>
           <a:xfrm flipH="1" flipV="1">
-            <a:off x="8990514" y="3239294"/>
+            <a:off x="9127128" y="3365059"/>
             <a:ext cx="339636" cy="64"/>
           </a:xfrm>
           <a:prstGeom prst="straightConnector1">
@@ -3934,7 +3934,7 @@
         </p:nvSpPr>
         <p:spPr>
           <a:xfrm>
-            <a:off x="9050387" y="2190709"/>
+            <a:off x="9362938" y="1990723"/>
             <a:ext cx="832755" cy="277127"/>
           </a:xfrm>
           <a:prstGeom prst="rect">
@@ -4009,7 +4009,7 @@
         </p:nvSpPr>
         <p:spPr>
           <a:xfrm>
-            <a:off x="9077231" y="3990632"/>
+            <a:off x="9330150" y="3959362"/>
             <a:ext cx="832755" cy="277127"/>
           </a:xfrm>
           <a:prstGeom prst="rect">
@@ -4087,7 +4087,7 @@
         </p:nvCxnSpPr>
         <p:spPr>
           <a:xfrm flipH="1">
-            <a:off x="8651966" y="2329273"/>
+            <a:off x="8964517" y="2129287"/>
             <a:ext cx="398421" cy="400318"/>
           </a:xfrm>
           <a:prstGeom prst="straightConnector1">
@@ -4132,7 +4132,7 @@
         </p:nvCxnSpPr>
         <p:spPr>
           <a:xfrm flipH="1" flipV="1">
-            <a:off x="8665029" y="3731861"/>
+            <a:off x="8917948" y="3700591"/>
             <a:ext cx="412202" cy="397335"/>
           </a:xfrm>
           <a:prstGeom prst="straightConnector1">
@@ -4174,7 +4174,7 @@
         </p:nvSpPr>
         <p:spPr>
           <a:xfrm>
-            <a:off x="2743199" y="4423309"/>
+            <a:off x="2522864" y="4360155"/>
             <a:ext cx="988080" cy="523220"/>
           </a:xfrm>
           <a:prstGeom prst="rect">
@@ -4253,7 +4253,7 @@
         </p:nvCxnSpPr>
         <p:spPr>
           <a:xfrm flipV="1">
-            <a:off x="3237239" y="3908509"/>
+            <a:off x="3016904" y="3845355"/>
             <a:ext cx="0" cy="514800"/>
           </a:xfrm>
           <a:prstGeom prst="straightConnector1">

</xml_diff>

<commit_message>
added modification to initial screenshot
</commit_message>
<xml_diff>
--- a/doc-images/screenshot-initial.pptx
+++ b/doc-images/screenshot-initial.pptx
@@ -2,12 +2,12 @@
 <file path=ppt/presentation.xml><?xml version="1.0" encoding="utf-8"?>
 <p:presentation xmlns:a="http://schemas.openxmlformats.org/drawingml/2006/main" xmlns:r="http://schemas.openxmlformats.org/officeDocument/2006/relationships" xmlns:p="http://schemas.openxmlformats.org/presentationml/2006/main" saveSubsetFonts="1">
   <p:sldMasterIdLst>
-    <p:sldMasterId id="2147483684" r:id="rId1"/>
+    <p:sldMasterId id="2147483708" r:id="rId1"/>
   </p:sldMasterIdLst>
   <p:sldIdLst>
     <p:sldId id="256" r:id="rId2"/>
   </p:sldIdLst>
-  <p:sldSz cx="11293475" cy="5943600"/>
+  <p:sldSz cx="10880725" cy="5943600"/>
   <p:notesSz cx="6858000" cy="9144000"/>
   <p:defaultTextStyle>
     <a:defPPr>
@@ -141,8 +141,8 @@
         </p:nvSpPr>
         <p:spPr>
           <a:xfrm>
-            <a:off x="1411685" y="972715"/>
-            <a:ext cx="8470106" cy="2069253"/>
+            <a:off x="1360091" y="972715"/>
+            <a:ext cx="8160544" cy="2069253"/>
           </a:xfrm>
         </p:spPr>
         <p:txBody>
@@ -173,8 +173,8 @@
         </p:nvSpPr>
         <p:spPr>
           <a:xfrm>
-            <a:off x="1411685" y="3121766"/>
-            <a:ext cx="8470106" cy="1434994"/>
+            <a:off x="1360091" y="3121766"/>
+            <a:ext cx="8160544" cy="1434994"/>
           </a:xfrm>
         </p:spPr>
         <p:txBody>
@@ -243,7 +243,7 @@
           <a:p>
             <a:fld id="{93DF655C-B5A4-4D87-897F-CE3EA9D19754}" type="datetimeFigureOut">
               <a:rPr lang="en-US" smtClean="0"/>
-              <a:t>4/26/2020</a:t>
+              <a:t>5/20/2020</a:t>
             </a:fld>
             <a:endParaRPr lang="en-US"/>
           </a:p>
@@ -294,7 +294,7 @@
     </p:spTree>
     <p:extLst>
       <p:ext uri="{BB962C8B-B14F-4D97-AF65-F5344CB8AC3E}">
-        <p14:creationId xmlns:p14="http://schemas.microsoft.com/office/powerpoint/2010/main" val="3341022766"/>
+        <p14:creationId xmlns:p14="http://schemas.microsoft.com/office/powerpoint/2010/main" val="2750587090"/>
       </p:ext>
     </p:extLst>
   </p:cSld>
@@ -413,7 +413,7 @@
           <a:p>
             <a:fld id="{93DF655C-B5A4-4D87-897F-CE3EA9D19754}" type="datetimeFigureOut">
               <a:rPr lang="en-US" smtClean="0"/>
-              <a:t>4/26/2020</a:t>
+              <a:t>5/20/2020</a:t>
             </a:fld>
             <a:endParaRPr lang="en-US"/>
           </a:p>
@@ -464,7 +464,7 @@
     </p:spTree>
     <p:extLst>
       <p:ext uri="{BB962C8B-B14F-4D97-AF65-F5344CB8AC3E}">
-        <p14:creationId xmlns:p14="http://schemas.microsoft.com/office/powerpoint/2010/main" val="2450833519"/>
+        <p14:creationId xmlns:p14="http://schemas.microsoft.com/office/powerpoint/2010/main" val="1934345197"/>
       </p:ext>
     </p:extLst>
   </p:cSld>
@@ -503,8 +503,8 @@
         </p:nvSpPr>
         <p:spPr>
           <a:xfrm>
-            <a:off x="8081893" y="316442"/>
-            <a:ext cx="2435156" cy="5036926"/>
+            <a:off x="7786519" y="316442"/>
+            <a:ext cx="2346156" cy="5036926"/>
           </a:xfrm>
         </p:spPr>
         <p:txBody>
@@ -531,8 +531,8 @@
         </p:nvSpPr>
         <p:spPr>
           <a:xfrm>
-            <a:off x="776427" y="316442"/>
-            <a:ext cx="7164298" cy="5036926"/>
+            <a:off x="748050" y="316442"/>
+            <a:ext cx="6902460" cy="5036926"/>
           </a:xfrm>
         </p:spPr>
         <p:txBody>
@@ -593,7 +593,7 @@
           <a:p>
             <a:fld id="{93DF655C-B5A4-4D87-897F-CE3EA9D19754}" type="datetimeFigureOut">
               <a:rPr lang="en-US" smtClean="0"/>
-              <a:t>4/26/2020</a:t>
+              <a:t>5/20/2020</a:t>
             </a:fld>
             <a:endParaRPr lang="en-US"/>
           </a:p>
@@ -644,7 +644,7 @@
     </p:spTree>
     <p:extLst>
       <p:ext uri="{BB962C8B-B14F-4D97-AF65-F5344CB8AC3E}">
-        <p14:creationId xmlns:p14="http://schemas.microsoft.com/office/powerpoint/2010/main" val="3578685471"/>
+        <p14:creationId xmlns:p14="http://schemas.microsoft.com/office/powerpoint/2010/main" val="2046255339"/>
       </p:ext>
     </p:extLst>
   </p:cSld>
@@ -763,7 +763,7 @@
           <a:p>
             <a:fld id="{93DF655C-B5A4-4D87-897F-CE3EA9D19754}" type="datetimeFigureOut">
               <a:rPr lang="en-US" smtClean="0"/>
-              <a:t>4/26/2020</a:t>
+              <a:t>5/20/2020</a:t>
             </a:fld>
             <a:endParaRPr lang="en-US"/>
           </a:p>
@@ -814,7 +814,7 @@
     </p:spTree>
     <p:extLst>
       <p:ext uri="{BB962C8B-B14F-4D97-AF65-F5344CB8AC3E}">
-        <p14:creationId xmlns:p14="http://schemas.microsoft.com/office/powerpoint/2010/main" val="1534250999"/>
+        <p14:creationId xmlns:p14="http://schemas.microsoft.com/office/powerpoint/2010/main" val="3562487219"/>
       </p:ext>
     </p:extLst>
   </p:cSld>
@@ -853,8 +853,8 @@
         </p:nvSpPr>
         <p:spPr>
           <a:xfrm>
-            <a:off x="770544" y="1481773"/>
-            <a:ext cx="9740622" cy="2472372"/>
+            <a:off x="742383" y="1481773"/>
+            <a:ext cx="9384625" cy="2472372"/>
           </a:xfrm>
         </p:spPr>
         <p:txBody>
@@ -885,8 +885,8 @@
         </p:nvSpPr>
         <p:spPr>
           <a:xfrm>
-            <a:off x="770544" y="3977535"/>
-            <a:ext cx="9740622" cy="1300162"/>
+            <a:off x="742383" y="3977535"/>
+            <a:ext cx="9384625" cy="1300162"/>
           </a:xfrm>
         </p:spPr>
         <p:txBody>
@@ -1009,7 +1009,7 @@
           <a:p>
             <a:fld id="{93DF655C-B5A4-4D87-897F-CE3EA9D19754}" type="datetimeFigureOut">
               <a:rPr lang="en-US" smtClean="0"/>
-              <a:t>4/26/2020</a:t>
+              <a:t>5/20/2020</a:t>
             </a:fld>
             <a:endParaRPr lang="en-US"/>
           </a:p>
@@ -1060,7 +1060,7 @@
     </p:spTree>
     <p:extLst>
       <p:ext uri="{BB962C8B-B14F-4D97-AF65-F5344CB8AC3E}">
-        <p14:creationId xmlns:p14="http://schemas.microsoft.com/office/powerpoint/2010/main" val="4052162142"/>
+        <p14:creationId xmlns:p14="http://schemas.microsoft.com/office/powerpoint/2010/main" val="2042756374"/>
       </p:ext>
     </p:extLst>
   </p:cSld>
@@ -1122,8 +1122,8 @@
         </p:nvSpPr>
         <p:spPr>
           <a:xfrm>
-            <a:off x="776426" y="1582208"/>
-            <a:ext cx="4799727" cy="3771160"/>
+            <a:off x="748050" y="1582208"/>
+            <a:ext cx="4624308" cy="3771160"/>
           </a:xfrm>
         </p:spPr>
         <p:txBody>
@@ -1179,8 +1179,8 @@
         </p:nvSpPr>
         <p:spPr>
           <a:xfrm>
-            <a:off x="5717322" y="1582208"/>
-            <a:ext cx="4799727" cy="3771160"/>
+            <a:off x="5508367" y="1582208"/>
+            <a:ext cx="4624308" cy="3771160"/>
           </a:xfrm>
         </p:spPr>
         <p:txBody>
@@ -1241,7 +1241,7 @@
           <a:p>
             <a:fld id="{93DF655C-B5A4-4D87-897F-CE3EA9D19754}" type="datetimeFigureOut">
               <a:rPr lang="en-US" smtClean="0"/>
-              <a:t>4/26/2020</a:t>
+              <a:t>5/20/2020</a:t>
             </a:fld>
             <a:endParaRPr lang="en-US"/>
           </a:p>
@@ -1292,7 +1292,7 @@
     </p:spTree>
     <p:extLst>
       <p:ext uri="{BB962C8B-B14F-4D97-AF65-F5344CB8AC3E}">
-        <p14:creationId xmlns:p14="http://schemas.microsoft.com/office/powerpoint/2010/main" val="400411062"/>
+        <p14:creationId xmlns:p14="http://schemas.microsoft.com/office/powerpoint/2010/main" val="880024464"/>
       </p:ext>
     </p:extLst>
   </p:cSld>
@@ -1331,8 +1331,8 @@
         </p:nvSpPr>
         <p:spPr>
           <a:xfrm>
-            <a:off x="777897" y="316442"/>
-            <a:ext cx="9740622" cy="1148821"/>
+            <a:off x="749467" y="316442"/>
+            <a:ext cx="9384625" cy="1148821"/>
           </a:xfrm>
         </p:spPr>
         <p:txBody>
@@ -1359,8 +1359,8 @@
         </p:nvSpPr>
         <p:spPr>
           <a:xfrm>
-            <a:off x="777898" y="1457008"/>
-            <a:ext cx="4777669" cy="714057"/>
+            <a:off x="749468" y="1457008"/>
+            <a:ext cx="4603056" cy="714057"/>
           </a:xfrm>
         </p:spPr>
         <p:txBody>
@@ -1424,8 +1424,8 @@
         </p:nvSpPr>
         <p:spPr>
           <a:xfrm>
-            <a:off x="777898" y="2171065"/>
-            <a:ext cx="4777669" cy="3193310"/>
+            <a:off x="749468" y="2171065"/>
+            <a:ext cx="4603056" cy="3193310"/>
           </a:xfrm>
         </p:spPr>
         <p:txBody>
@@ -1481,8 +1481,8 @@
         </p:nvSpPr>
         <p:spPr>
           <a:xfrm>
-            <a:off x="5717322" y="1457008"/>
-            <a:ext cx="4801198" cy="714057"/>
+            <a:off x="5508367" y="1457008"/>
+            <a:ext cx="4625725" cy="714057"/>
           </a:xfrm>
         </p:spPr>
         <p:txBody>
@@ -1546,8 +1546,8 @@
         </p:nvSpPr>
         <p:spPr>
           <a:xfrm>
-            <a:off x="5717322" y="2171065"/>
-            <a:ext cx="4801198" cy="3193310"/>
+            <a:off x="5508367" y="2171065"/>
+            <a:ext cx="4625725" cy="3193310"/>
           </a:xfrm>
         </p:spPr>
         <p:txBody>
@@ -1608,7 +1608,7 @@
           <a:p>
             <a:fld id="{93DF655C-B5A4-4D87-897F-CE3EA9D19754}" type="datetimeFigureOut">
               <a:rPr lang="en-US" smtClean="0"/>
-              <a:t>4/26/2020</a:t>
+              <a:t>5/20/2020</a:t>
             </a:fld>
             <a:endParaRPr lang="en-US"/>
           </a:p>
@@ -1659,7 +1659,7 @@
     </p:spTree>
     <p:extLst>
       <p:ext uri="{BB962C8B-B14F-4D97-AF65-F5344CB8AC3E}">
-        <p14:creationId xmlns:p14="http://schemas.microsoft.com/office/powerpoint/2010/main" val="3710866588"/>
+        <p14:creationId xmlns:p14="http://schemas.microsoft.com/office/powerpoint/2010/main" val="2586893731"/>
       </p:ext>
     </p:extLst>
   </p:cSld>
@@ -1726,7 +1726,7 @@
           <a:p>
             <a:fld id="{93DF655C-B5A4-4D87-897F-CE3EA9D19754}" type="datetimeFigureOut">
               <a:rPr lang="en-US" smtClean="0"/>
-              <a:t>4/26/2020</a:t>
+              <a:t>5/20/2020</a:t>
             </a:fld>
             <a:endParaRPr lang="en-US"/>
           </a:p>
@@ -1777,7 +1777,7 @@
     </p:spTree>
     <p:extLst>
       <p:ext uri="{BB962C8B-B14F-4D97-AF65-F5344CB8AC3E}">
-        <p14:creationId xmlns:p14="http://schemas.microsoft.com/office/powerpoint/2010/main" val="3364545500"/>
+        <p14:creationId xmlns:p14="http://schemas.microsoft.com/office/powerpoint/2010/main" val="4271954653"/>
       </p:ext>
     </p:extLst>
   </p:cSld>
@@ -1821,7 +1821,7 @@
           <a:p>
             <a:fld id="{93DF655C-B5A4-4D87-897F-CE3EA9D19754}" type="datetimeFigureOut">
               <a:rPr lang="en-US" smtClean="0"/>
-              <a:t>4/26/2020</a:t>
+              <a:t>5/20/2020</a:t>
             </a:fld>
             <a:endParaRPr lang="en-US"/>
           </a:p>
@@ -1872,7 +1872,7 @@
     </p:spTree>
     <p:extLst>
       <p:ext uri="{BB962C8B-B14F-4D97-AF65-F5344CB8AC3E}">
-        <p14:creationId xmlns:p14="http://schemas.microsoft.com/office/powerpoint/2010/main" val="3020860823"/>
+        <p14:creationId xmlns:p14="http://schemas.microsoft.com/office/powerpoint/2010/main" val="438378907"/>
       </p:ext>
     </p:extLst>
   </p:cSld>
@@ -1911,8 +1911,8 @@
         </p:nvSpPr>
         <p:spPr>
           <a:xfrm>
-            <a:off x="777898" y="396240"/>
-            <a:ext cx="3642439" cy="1386840"/>
+            <a:off x="749467" y="396240"/>
+            <a:ext cx="3509317" cy="1386840"/>
           </a:xfrm>
         </p:spPr>
         <p:txBody>
@@ -1943,8 +1943,8 @@
         </p:nvSpPr>
         <p:spPr>
           <a:xfrm>
-            <a:off x="4801198" y="855769"/>
-            <a:ext cx="5717322" cy="4223808"/>
+            <a:off x="4625725" y="855769"/>
+            <a:ext cx="5508367" cy="4223808"/>
           </a:xfrm>
         </p:spPr>
         <p:txBody>
@@ -2028,8 +2028,8 @@
         </p:nvSpPr>
         <p:spPr>
           <a:xfrm>
-            <a:off x="777898" y="1783080"/>
-            <a:ext cx="3642439" cy="3303376"/>
+            <a:off x="749467" y="1783080"/>
+            <a:ext cx="3509317" cy="3303376"/>
           </a:xfrm>
         </p:spPr>
         <p:txBody>
@@ -2098,7 +2098,7 @@
           <a:p>
             <a:fld id="{93DF655C-B5A4-4D87-897F-CE3EA9D19754}" type="datetimeFigureOut">
               <a:rPr lang="en-US" smtClean="0"/>
-              <a:t>4/26/2020</a:t>
+              <a:t>5/20/2020</a:t>
             </a:fld>
             <a:endParaRPr lang="en-US"/>
           </a:p>
@@ -2149,7 +2149,7 @@
     </p:spTree>
     <p:extLst>
       <p:ext uri="{BB962C8B-B14F-4D97-AF65-F5344CB8AC3E}">
-        <p14:creationId xmlns:p14="http://schemas.microsoft.com/office/powerpoint/2010/main" val="2359293660"/>
+        <p14:creationId xmlns:p14="http://schemas.microsoft.com/office/powerpoint/2010/main" val="1109809135"/>
       </p:ext>
     </p:extLst>
   </p:cSld>
@@ -2188,8 +2188,8 @@
         </p:nvSpPr>
         <p:spPr>
           <a:xfrm>
-            <a:off x="777898" y="396240"/>
-            <a:ext cx="3642439" cy="1386840"/>
+            <a:off x="749467" y="396240"/>
+            <a:ext cx="3509317" cy="1386840"/>
           </a:xfrm>
         </p:spPr>
         <p:txBody>
@@ -2220,8 +2220,8 @@
         </p:nvSpPr>
         <p:spPr>
           <a:xfrm>
-            <a:off x="4801198" y="855769"/>
-            <a:ext cx="5717322" cy="4223808"/>
+            <a:off x="4625725" y="855769"/>
+            <a:ext cx="5508367" cy="4223808"/>
           </a:xfrm>
         </p:spPr>
         <p:txBody>
@@ -2285,8 +2285,8 @@
         </p:nvSpPr>
         <p:spPr>
           <a:xfrm>
-            <a:off x="777898" y="1783080"/>
-            <a:ext cx="3642439" cy="3303376"/>
+            <a:off x="749467" y="1783080"/>
+            <a:ext cx="3509317" cy="3303376"/>
           </a:xfrm>
         </p:spPr>
         <p:txBody>
@@ -2355,7 +2355,7 @@
           <a:p>
             <a:fld id="{93DF655C-B5A4-4D87-897F-CE3EA9D19754}" type="datetimeFigureOut">
               <a:rPr lang="en-US" smtClean="0"/>
-              <a:t>4/26/2020</a:t>
+              <a:t>5/20/2020</a:t>
             </a:fld>
             <a:endParaRPr lang="en-US"/>
           </a:p>
@@ -2406,7 +2406,7 @@
     </p:spTree>
     <p:extLst>
       <p:ext uri="{BB962C8B-B14F-4D97-AF65-F5344CB8AC3E}">
-        <p14:creationId xmlns:p14="http://schemas.microsoft.com/office/powerpoint/2010/main" val="4206664967"/>
+        <p14:creationId xmlns:p14="http://schemas.microsoft.com/office/powerpoint/2010/main" val="4220369791"/>
       </p:ext>
     </p:extLst>
   </p:cSld>
@@ -2450,8 +2450,8 @@
         </p:nvSpPr>
         <p:spPr>
           <a:xfrm>
-            <a:off x="776427" y="316442"/>
-            <a:ext cx="9740622" cy="1148821"/>
+            <a:off x="748050" y="316442"/>
+            <a:ext cx="9384625" cy="1148821"/>
           </a:xfrm>
           <a:prstGeom prst="rect">
             <a:avLst/>
@@ -2483,8 +2483,8 @@
         </p:nvSpPr>
         <p:spPr>
           <a:xfrm>
-            <a:off x="776427" y="1582208"/>
-            <a:ext cx="9740622" cy="3771160"/>
+            <a:off x="748050" y="1582208"/>
+            <a:ext cx="9384625" cy="3771160"/>
           </a:xfrm>
           <a:prstGeom prst="rect">
             <a:avLst/>
@@ -2545,8 +2545,8 @@
         </p:nvSpPr>
         <p:spPr>
           <a:xfrm>
-            <a:off x="776426" y="5508837"/>
-            <a:ext cx="2541032" cy="316442"/>
+            <a:off x="748050" y="5508837"/>
+            <a:ext cx="2448163" cy="316442"/>
           </a:xfrm>
           <a:prstGeom prst="rect">
             <a:avLst/>
@@ -2568,7 +2568,7 @@
           <a:p>
             <a:fld id="{93DF655C-B5A4-4D87-897F-CE3EA9D19754}" type="datetimeFigureOut">
               <a:rPr lang="en-US" smtClean="0"/>
-              <a:t>4/26/2020</a:t>
+              <a:t>5/20/2020</a:t>
             </a:fld>
             <a:endParaRPr lang="en-US"/>
           </a:p>
@@ -2586,8 +2586,8 @@
         </p:nvSpPr>
         <p:spPr>
           <a:xfrm>
-            <a:off x="3740964" y="5508837"/>
-            <a:ext cx="3811548" cy="316442"/>
+            <a:off x="3604240" y="5508837"/>
+            <a:ext cx="3672245" cy="316442"/>
           </a:xfrm>
           <a:prstGeom prst="rect">
             <a:avLst/>
@@ -2623,8 +2623,8 @@
         </p:nvSpPr>
         <p:spPr>
           <a:xfrm>
-            <a:off x="7976017" y="5508837"/>
-            <a:ext cx="2541032" cy="316442"/>
+            <a:off x="7684512" y="5508837"/>
+            <a:ext cx="2448163" cy="316442"/>
           </a:xfrm>
           <a:prstGeom prst="rect">
             <a:avLst/>
@@ -2655,23 +2655,23 @@
     </p:spTree>
     <p:extLst>
       <p:ext uri="{BB962C8B-B14F-4D97-AF65-F5344CB8AC3E}">
-        <p14:creationId xmlns:p14="http://schemas.microsoft.com/office/powerpoint/2010/main" val="3680434759"/>
+        <p14:creationId xmlns:p14="http://schemas.microsoft.com/office/powerpoint/2010/main" val="1274593126"/>
       </p:ext>
     </p:extLst>
   </p:cSld>
   <p:clrMap bg1="lt1" tx1="dk1" bg2="lt2" tx2="dk2" accent1="accent1" accent2="accent2" accent3="accent3" accent4="accent4" accent5="accent5" accent6="accent6" hlink="hlink" folHlink="folHlink"/>
   <p:sldLayoutIdLst>
-    <p:sldLayoutId id="2147483685" r:id="rId1"/>
-    <p:sldLayoutId id="2147483686" r:id="rId2"/>
-    <p:sldLayoutId id="2147483687" r:id="rId3"/>
-    <p:sldLayoutId id="2147483688" r:id="rId4"/>
-    <p:sldLayoutId id="2147483689" r:id="rId5"/>
-    <p:sldLayoutId id="2147483690" r:id="rId6"/>
-    <p:sldLayoutId id="2147483691" r:id="rId7"/>
-    <p:sldLayoutId id="2147483692" r:id="rId8"/>
-    <p:sldLayoutId id="2147483693" r:id="rId9"/>
-    <p:sldLayoutId id="2147483694" r:id="rId10"/>
-    <p:sldLayoutId id="2147483695" r:id="rId11"/>
+    <p:sldLayoutId id="2147483709" r:id="rId1"/>
+    <p:sldLayoutId id="2147483710" r:id="rId2"/>
+    <p:sldLayoutId id="2147483711" r:id="rId3"/>
+    <p:sldLayoutId id="2147483712" r:id="rId4"/>
+    <p:sldLayoutId id="2147483713" r:id="rId5"/>
+    <p:sldLayoutId id="2147483714" r:id="rId6"/>
+    <p:sldLayoutId id="2147483715" r:id="rId7"/>
+    <p:sldLayoutId id="2147483716" r:id="rId8"/>
+    <p:sldLayoutId id="2147483717" r:id="rId9"/>
+    <p:sldLayoutId id="2147483718" r:id="rId10"/>
+    <p:sldLayoutId id="2147483719" r:id="rId11"/>
   </p:sldLayoutIdLst>
   <p:txStyles>
     <p:titleStyle>
@@ -2975,10 +2975,10 @@
       </p:grpSpPr>
       <p:pic>
         <p:nvPicPr>
-          <p:cNvPr id="3" name="Picture 2">
+          <p:cNvPr id="69" name="Picture 68" descr="A picture containing screenshot&#10;&#10;Description automatically generated">
             <a:extLst>
               <a:ext uri="{FF2B5EF4-FFF2-40B4-BE49-F238E27FC236}">
-                <a16:creationId xmlns:a16="http://schemas.microsoft.com/office/drawing/2014/main" id="{B30A3A5A-EB03-4E46-9F52-39634B7EFFFB}"/>
+                <a16:creationId xmlns:a16="http://schemas.microsoft.com/office/drawing/2014/main" id="{EFE9B254-482E-4189-9918-CC14B4B1A642}"/>
               </a:ext>
             </a:extLst>
           </p:cNvPr>
@@ -2988,14 +2988,20 @@
           <p:nvPr/>
         </p:nvPicPr>
         <p:blipFill>
-          <a:blip r:embed="rId2"/>
+          <a:blip r:embed="rId2">
+            <a:extLst>
+              <a:ext uri="{28A0092B-C50C-407E-A947-70E740481C1C}">
+                <a14:useLocalDpi xmlns:a14="http://schemas.microsoft.com/office/drawing/2010/main" val="0"/>
+              </a:ext>
+            </a:extLst>
+          </a:blip>
           <a:stretch>
             <a:fillRect/>
           </a:stretch>
         </p:blipFill>
         <p:spPr>
           <a:xfrm>
-            <a:off x="15081" y="0"/>
+            <a:off x="7763" y="4997"/>
             <a:ext cx="10868297" cy="5943600"/>
           </a:xfrm>
           <a:prstGeom prst="rect">
@@ -3005,10 +3011,10 @@
       </p:pic>
       <p:sp>
         <p:nvSpPr>
-          <p:cNvPr id="26" name="TextBox 25">
+          <p:cNvPr id="70" name="TextBox 69">
             <a:extLst>
               <a:ext uri="{FF2B5EF4-FFF2-40B4-BE49-F238E27FC236}">
-                <a16:creationId xmlns:a16="http://schemas.microsoft.com/office/drawing/2014/main" id="{704C8BA6-32EF-4308-BC07-CE0A12E83308}"/>
+                <a16:creationId xmlns:a16="http://schemas.microsoft.com/office/drawing/2014/main" id="{771D2D88-6C8F-49F6-AB9D-A130E1CB67C9}"/>
               </a:ext>
             </a:extLst>
           </p:cNvPr>
@@ -3017,7 +3023,7 @@
         </p:nvSpPr>
         <p:spPr>
           <a:xfrm>
-            <a:off x="34094" y="4890408"/>
+            <a:off x="-2676" y="4883375"/>
             <a:ext cx="778329" cy="646331"/>
           </a:xfrm>
           <a:prstGeom prst="rect">
@@ -3080,10 +3086,10 @@
       </p:sp>
       <p:sp>
         <p:nvSpPr>
-          <p:cNvPr id="27" name="TextBox 26">
+          <p:cNvPr id="71" name="TextBox 70">
             <a:extLst>
               <a:ext uri="{FF2B5EF4-FFF2-40B4-BE49-F238E27FC236}">
-                <a16:creationId xmlns:a16="http://schemas.microsoft.com/office/drawing/2014/main" id="{307706B6-A064-471A-963C-E66232CE3D7A}"/>
+                <a16:creationId xmlns:a16="http://schemas.microsoft.com/office/drawing/2014/main" id="{0C953931-C23B-4685-9E30-EA35C8F85FF9}"/>
               </a:ext>
             </a:extLst>
           </p:cNvPr>
@@ -3092,7 +3098,7 @@
         </p:nvSpPr>
         <p:spPr>
           <a:xfrm>
-            <a:off x="5388944" y="5161964"/>
+            <a:off x="5417111" y="5292592"/>
             <a:ext cx="1230086" cy="369332"/>
           </a:xfrm>
           <a:prstGeom prst="rect">
@@ -3155,10 +3161,10 @@
       </p:sp>
       <p:sp>
         <p:nvSpPr>
-          <p:cNvPr id="33" name="TextBox 32">
+          <p:cNvPr id="73" name="TextBox 72">
             <a:extLst>
               <a:ext uri="{FF2B5EF4-FFF2-40B4-BE49-F238E27FC236}">
-                <a16:creationId xmlns:a16="http://schemas.microsoft.com/office/drawing/2014/main" id="{C8BED6F8-0EC5-4745-9694-04A3BC016D58}"/>
+                <a16:creationId xmlns:a16="http://schemas.microsoft.com/office/drawing/2014/main" id="{F2C5A1BB-0F63-49C2-B8CF-651A3842E38E}"/>
               </a:ext>
             </a:extLst>
           </p:cNvPr>
@@ -3167,82 +3173,7 @@
         </p:nvSpPr>
         <p:spPr>
           <a:xfrm>
-            <a:off x="3203033" y="320424"/>
-            <a:ext cx="615821" cy="307777"/>
-          </a:xfrm>
-          <a:prstGeom prst="rect">
-            <a:avLst/>
-          </a:prstGeom>
-          <a:gradFill flip="none" rotWithShape="1">
-            <a:gsLst>
-              <a:gs pos="0">
-                <a:schemeClr val="accent2">
-                  <a:lumMod val="67000"/>
-                </a:schemeClr>
-              </a:gs>
-              <a:gs pos="48000">
-                <a:schemeClr val="accent2">
-                  <a:lumMod val="97000"/>
-                  <a:lumOff val="3000"/>
-                </a:schemeClr>
-              </a:gs>
-              <a:gs pos="100000">
-                <a:schemeClr val="accent2">
-                  <a:lumMod val="60000"/>
-                  <a:lumOff val="40000"/>
-                </a:schemeClr>
-              </a:gs>
-            </a:gsLst>
-            <a:lin ang="16200000" scaled="1"/>
-            <a:tileRect/>
-          </a:gradFill>
-          <a:ln>
-            <a:noFill/>
-          </a:ln>
-        </p:spPr>
-        <p:style>
-          <a:lnRef idx="0">
-            <a:scrgbClr r="0" g="0" b="0"/>
-          </a:lnRef>
-          <a:fillRef idx="0">
-            <a:scrgbClr r="0" g="0" b="0"/>
-          </a:fillRef>
-          <a:effectRef idx="0">
-            <a:scrgbClr r="0" g="0" b="0"/>
-          </a:effectRef>
-          <a:fontRef idx="minor">
-            <a:schemeClr val="lt1"/>
-          </a:fontRef>
-        </p:style>
-        <p:txBody>
-          <a:bodyPr wrap="square" rtlCol="0">
-            <a:spAutoFit/>
-          </a:bodyPr>
-          <a:lstStyle/>
-          <a:p>
-            <a:pPr algn="ctr"/>
-            <a:r>
-              <a:rPr lang="en-US" sz="1400" dirty="0"/>
-              <a:t>menu</a:t>
-            </a:r>
-          </a:p>
-        </p:txBody>
-      </p:sp>
-      <p:sp>
-        <p:nvSpPr>
-          <p:cNvPr id="34" name="TextBox 33">
-            <a:extLst>
-              <a:ext uri="{FF2B5EF4-FFF2-40B4-BE49-F238E27FC236}">
-                <a16:creationId xmlns:a16="http://schemas.microsoft.com/office/drawing/2014/main" id="{811F3CFC-CF6C-4FCB-8E84-1D0F6D9AC49F}"/>
-              </a:ext>
-            </a:extLst>
-          </p:cNvPr>
-          <p:cNvSpPr txBox="1"/>
-          <p:nvPr/>
-        </p:nvSpPr>
-        <p:spPr>
-          <a:xfrm>
-            <a:off x="741396" y="1521132"/>
+            <a:off x="630359" y="1621575"/>
             <a:ext cx="559642" cy="307777"/>
           </a:xfrm>
           <a:prstGeom prst="rect">
@@ -3306,23 +3237,23 @@
       </p:sp>
       <p:cxnSp>
         <p:nvCxnSpPr>
-          <p:cNvPr id="35" name="Straight Arrow Connector 34">
+          <p:cNvPr id="74" name="Straight Arrow Connector 73">
             <a:extLst>
               <a:ext uri="{FF2B5EF4-FFF2-40B4-BE49-F238E27FC236}">
-                <a16:creationId xmlns:a16="http://schemas.microsoft.com/office/drawing/2014/main" id="{1E07FE48-16BB-4265-8542-7546E8BA94C6}"/>
+                <a16:creationId xmlns:a16="http://schemas.microsoft.com/office/drawing/2014/main" id="{B1C362FB-EB97-4F7F-9DCC-F0EBC1C262E5}"/>
               </a:ext>
             </a:extLst>
           </p:cNvPr>
           <p:cNvCxnSpPr>
             <a:cxnSpLocks/>
-            <a:stCxn id="34" idx="3"/>
+            <a:stCxn id="73" idx="3"/>
           </p:cNvCxnSpPr>
           <p:nvPr/>
         </p:nvCxnSpPr>
         <p:spPr>
           <a:xfrm>
-            <a:off x="1301038" y="1675021"/>
-            <a:ext cx="166673" cy="254491"/>
+            <a:off x="1190001" y="1775464"/>
+            <a:ext cx="138056" cy="215259"/>
           </a:xfrm>
           <a:prstGeom prst="straightConnector1">
             <a:avLst/>
@@ -3351,23 +3282,23 @@
       </p:cxnSp>
       <p:cxnSp>
         <p:nvCxnSpPr>
-          <p:cNvPr id="40" name="Straight Arrow Connector 39">
+          <p:cNvPr id="75" name="Straight Arrow Connector 74">
             <a:extLst>
               <a:ext uri="{FF2B5EF4-FFF2-40B4-BE49-F238E27FC236}">
-                <a16:creationId xmlns:a16="http://schemas.microsoft.com/office/drawing/2014/main" id="{8D3DEFB5-9EEE-4FE2-A8DA-BFE731F37A17}"/>
+                <a16:creationId xmlns:a16="http://schemas.microsoft.com/office/drawing/2014/main" id="{396EA380-8113-4E58-8A1E-FC373F392759}"/>
               </a:ext>
             </a:extLst>
           </p:cNvPr>
           <p:cNvCxnSpPr>
             <a:cxnSpLocks/>
-            <a:stCxn id="34" idx="1"/>
+            <a:stCxn id="73" idx="1"/>
           </p:cNvCxnSpPr>
           <p:nvPr/>
         </p:nvCxnSpPr>
         <p:spPr>
           <a:xfrm flipH="1">
-            <a:off x="416088" y="1675021"/>
-            <a:ext cx="325308" cy="633731"/>
+            <a:off x="305051" y="1775464"/>
+            <a:ext cx="325308" cy="764536"/>
           </a:xfrm>
           <a:prstGeom prst="straightConnector1">
             <a:avLst/>
@@ -3396,10 +3327,10 @@
       </p:cxnSp>
       <p:sp>
         <p:nvSpPr>
-          <p:cNvPr id="41" name="TextBox 40">
+          <p:cNvPr id="76" name="TextBox 75">
             <a:extLst>
               <a:ext uri="{FF2B5EF4-FFF2-40B4-BE49-F238E27FC236}">
-                <a16:creationId xmlns:a16="http://schemas.microsoft.com/office/drawing/2014/main" id="{D1311B0E-D816-4D06-9969-C0E5886D69BB}"/>
+                <a16:creationId xmlns:a16="http://schemas.microsoft.com/office/drawing/2014/main" id="{2018EB97-5386-4716-ABE2-35022C9FECC0}"/>
               </a:ext>
             </a:extLst>
           </p:cNvPr>
@@ -3408,7 +3339,7 @@
         </p:nvSpPr>
         <p:spPr>
           <a:xfrm>
-            <a:off x="5341385" y="1397557"/>
+            <a:off x="5237602" y="1483011"/>
             <a:ext cx="884950" cy="277127"/>
           </a:xfrm>
           <a:prstGeom prst="rect">
@@ -3471,23 +3402,23 @@
       </p:sp>
       <p:cxnSp>
         <p:nvCxnSpPr>
-          <p:cNvPr id="44" name="Straight Arrow Connector 43">
+          <p:cNvPr id="77" name="Straight Arrow Connector 76">
             <a:extLst>
               <a:ext uri="{FF2B5EF4-FFF2-40B4-BE49-F238E27FC236}">
-                <a16:creationId xmlns:a16="http://schemas.microsoft.com/office/drawing/2014/main" id="{2F44FD36-52C1-479F-B098-12BD65A42572}"/>
+                <a16:creationId xmlns:a16="http://schemas.microsoft.com/office/drawing/2014/main" id="{09FFDC0C-C8C8-4AE8-9698-6EB9A7991098}"/>
               </a:ext>
             </a:extLst>
           </p:cNvPr>
           <p:cNvCxnSpPr>
             <a:cxnSpLocks/>
-            <a:stCxn id="41" idx="3"/>
+            <a:stCxn id="76" idx="3"/>
           </p:cNvCxnSpPr>
           <p:nvPr/>
         </p:nvCxnSpPr>
         <p:spPr>
           <a:xfrm>
-            <a:off x="6226335" y="1536121"/>
-            <a:ext cx="369026" cy="393231"/>
+            <a:off x="6122552" y="1621575"/>
+            <a:ext cx="474018" cy="408380"/>
           </a:xfrm>
           <a:prstGeom prst="straightConnector1">
             <a:avLst/>
@@ -3516,23 +3447,23 @@
       </p:cxnSp>
       <p:cxnSp>
         <p:nvCxnSpPr>
-          <p:cNvPr id="45" name="Straight Arrow Connector 44">
+          <p:cNvPr id="78" name="Straight Arrow Connector 77">
             <a:extLst>
               <a:ext uri="{FF2B5EF4-FFF2-40B4-BE49-F238E27FC236}">
-                <a16:creationId xmlns:a16="http://schemas.microsoft.com/office/drawing/2014/main" id="{80D1042C-06FB-48B8-AB51-3355302628E2}"/>
+                <a16:creationId xmlns:a16="http://schemas.microsoft.com/office/drawing/2014/main" id="{1E5A707B-2F5C-4C4D-9E58-5E182D705D9D}"/>
               </a:ext>
             </a:extLst>
           </p:cNvPr>
           <p:cNvCxnSpPr>
             <a:cxnSpLocks/>
-            <a:stCxn id="41" idx="1"/>
+            <a:stCxn id="76" idx="1"/>
           </p:cNvCxnSpPr>
           <p:nvPr/>
         </p:nvCxnSpPr>
         <p:spPr>
           <a:xfrm flipH="1">
-            <a:off x="4972359" y="1536121"/>
-            <a:ext cx="369026" cy="393231"/>
+            <a:off x="4833257" y="1621575"/>
+            <a:ext cx="404345" cy="408380"/>
           </a:xfrm>
           <a:prstGeom prst="straightConnector1">
             <a:avLst/>
@@ -3561,10 +3492,10 @@
       </p:cxnSp>
       <p:sp>
         <p:nvSpPr>
-          <p:cNvPr id="47" name="TextBox 46">
+          <p:cNvPr id="79" name="TextBox 78">
             <a:extLst>
               <a:ext uri="{FF2B5EF4-FFF2-40B4-BE49-F238E27FC236}">
-                <a16:creationId xmlns:a16="http://schemas.microsoft.com/office/drawing/2014/main" id="{5C8DAD7A-3FFF-440D-A41B-1F95F9A2F89C}"/>
+                <a16:creationId xmlns:a16="http://schemas.microsoft.com/office/drawing/2014/main" id="{D6363ACC-D586-4EFE-95D6-F94E56D6C58D}"/>
               </a:ext>
             </a:extLst>
           </p:cNvPr>
@@ -3573,7 +3504,7 @@
         </p:nvSpPr>
         <p:spPr>
           <a:xfrm>
-            <a:off x="5419267" y="4379419"/>
+            <a:off x="5311063" y="4474793"/>
             <a:ext cx="757236" cy="277127"/>
           </a:xfrm>
           <a:prstGeom prst="rect">
@@ -3636,22 +3567,22 @@
       </p:sp>
       <p:cxnSp>
         <p:nvCxnSpPr>
-          <p:cNvPr id="49" name="Straight Arrow Connector 48">
+          <p:cNvPr id="80" name="Straight Arrow Connector 79">
             <a:extLst>
               <a:ext uri="{FF2B5EF4-FFF2-40B4-BE49-F238E27FC236}">
-                <a16:creationId xmlns:a16="http://schemas.microsoft.com/office/drawing/2014/main" id="{ACBE6FED-6BA9-4C25-AEED-841FCC5AA4A4}"/>
+                <a16:creationId xmlns:a16="http://schemas.microsoft.com/office/drawing/2014/main" id="{F73D6804-2F8B-444F-ACC0-62DCC357CB1F}"/>
               </a:ext>
             </a:extLst>
           </p:cNvPr>
           <p:cNvCxnSpPr>
             <a:cxnSpLocks/>
-            <a:stCxn id="47" idx="0"/>
+            <a:stCxn id="79" idx="0"/>
           </p:cNvCxnSpPr>
           <p:nvPr/>
         </p:nvCxnSpPr>
         <p:spPr>
           <a:xfrm flipV="1">
-            <a:off x="5797885" y="3902374"/>
+            <a:off x="5689681" y="3997748"/>
             <a:ext cx="0" cy="477045"/>
           </a:xfrm>
           <a:prstGeom prst="straightConnector1">
@@ -3681,10 +3612,10 @@
       </p:cxnSp>
       <p:sp>
         <p:nvSpPr>
-          <p:cNvPr id="50" name="TextBox 49">
+          <p:cNvPr id="81" name="TextBox 80">
             <a:extLst>
               <a:ext uri="{FF2B5EF4-FFF2-40B4-BE49-F238E27FC236}">
-                <a16:creationId xmlns:a16="http://schemas.microsoft.com/office/drawing/2014/main" id="{A30C0765-0510-46CD-B44D-E94181F27C14}"/>
+                <a16:creationId xmlns:a16="http://schemas.microsoft.com/office/drawing/2014/main" id="{5407975A-0D66-4411-A23C-F90DE0E767A2}"/>
               </a:ext>
             </a:extLst>
           </p:cNvPr>
@@ -3693,8 +3624,8 @@
         </p:nvSpPr>
         <p:spPr>
           <a:xfrm>
-            <a:off x="2542399" y="2962167"/>
-            <a:ext cx="902343" cy="277127"/>
+            <a:off x="2525486" y="3041994"/>
+            <a:ext cx="839430" cy="277127"/>
           </a:xfrm>
           <a:prstGeom prst="rect">
             <a:avLst/>
@@ -3756,23 +3687,23 @@
       </p:sp>
       <p:cxnSp>
         <p:nvCxnSpPr>
-          <p:cNvPr id="51" name="Straight Arrow Connector 50">
+          <p:cNvPr id="82" name="Straight Arrow Connector 81">
             <a:extLst>
               <a:ext uri="{FF2B5EF4-FFF2-40B4-BE49-F238E27FC236}">
-                <a16:creationId xmlns:a16="http://schemas.microsoft.com/office/drawing/2014/main" id="{936BB162-D1D5-4F09-90CD-2E22ED4AD40C}"/>
+                <a16:creationId xmlns:a16="http://schemas.microsoft.com/office/drawing/2014/main" id="{C8F7E547-393A-4783-87F5-6FE19B39CEC4}"/>
               </a:ext>
             </a:extLst>
           </p:cNvPr>
           <p:cNvCxnSpPr>
             <a:cxnSpLocks/>
-            <a:stCxn id="50" idx="3"/>
+            <a:stCxn id="81" idx="3"/>
           </p:cNvCxnSpPr>
           <p:nvPr/>
         </p:nvCxnSpPr>
         <p:spPr>
           <a:xfrm>
-            <a:off x="3444742" y="3100731"/>
-            <a:ext cx="330995" cy="0"/>
+            <a:off x="3364916" y="3180558"/>
+            <a:ext cx="330994" cy="1"/>
           </a:xfrm>
           <a:prstGeom prst="straightConnector1">
             <a:avLst/>
@@ -3801,10 +3732,10 @@
       </p:cxnSp>
       <p:sp>
         <p:nvSpPr>
-          <p:cNvPr id="52" name="TextBox 51">
+          <p:cNvPr id="83" name="TextBox 82">
             <a:extLst>
               <a:ext uri="{FF2B5EF4-FFF2-40B4-BE49-F238E27FC236}">
-                <a16:creationId xmlns:a16="http://schemas.microsoft.com/office/drawing/2014/main" id="{190034E4-F236-4100-88A6-390D78FFFDBF}"/>
+                <a16:creationId xmlns:a16="http://schemas.microsoft.com/office/drawing/2014/main" id="{C6A2B3A7-8459-4D3F-8017-6FD0CA43FFE6}"/>
               </a:ext>
             </a:extLst>
           </p:cNvPr>
@@ -3813,8 +3744,8 @@
         </p:nvSpPr>
         <p:spPr>
           <a:xfrm>
-            <a:off x="9466764" y="3226559"/>
-            <a:ext cx="832755" cy="277127"/>
+            <a:off x="9444994" y="3335414"/>
+            <a:ext cx="750700" cy="277127"/>
           </a:xfrm>
           <a:prstGeom prst="rect">
             <a:avLst/>
@@ -3877,22 +3808,22 @@
       </p:sp>
       <p:cxnSp>
         <p:nvCxnSpPr>
-          <p:cNvPr id="54" name="Straight Arrow Connector 53">
+          <p:cNvPr id="84" name="Straight Arrow Connector 83">
             <a:extLst>
               <a:ext uri="{FF2B5EF4-FFF2-40B4-BE49-F238E27FC236}">
-                <a16:creationId xmlns:a16="http://schemas.microsoft.com/office/drawing/2014/main" id="{F38ABD77-9E93-4989-B9DF-90ADCBC3F91E}"/>
+                <a16:creationId xmlns:a16="http://schemas.microsoft.com/office/drawing/2014/main" id="{3061914B-0E7A-492F-955A-7FA47ABBB78C}"/>
               </a:ext>
             </a:extLst>
           </p:cNvPr>
           <p:cNvCxnSpPr>
             <a:cxnSpLocks/>
-            <a:stCxn id="52" idx="1"/>
+            <a:stCxn id="83" idx="1"/>
           </p:cNvCxnSpPr>
           <p:nvPr/>
         </p:nvCxnSpPr>
         <p:spPr>
           <a:xfrm flipH="1" flipV="1">
-            <a:off x="9127128" y="3365059"/>
+            <a:off x="9105358" y="3473914"/>
             <a:ext cx="339636" cy="64"/>
           </a:xfrm>
           <a:prstGeom prst="straightConnector1">
@@ -3922,10 +3853,10 @@
       </p:cxnSp>
       <p:sp>
         <p:nvSpPr>
-          <p:cNvPr id="55" name="TextBox 54">
+          <p:cNvPr id="85" name="TextBox 84">
             <a:extLst>
               <a:ext uri="{FF2B5EF4-FFF2-40B4-BE49-F238E27FC236}">
-                <a16:creationId xmlns:a16="http://schemas.microsoft.com/office/drawing/2014/main" id="{62B827FE-8D7F-440C-AB50-07E9C1F5AE54}"/>
+                <a16:creationId xmlns:a16="http://schemas.microsoft.com/office/drawing/2014/main" id="{F6F93F25-2571-4196-9C6E-F161394D7EA9}"/>
               </a:ext>
             </a:extLst>
           </p:cNvPr>
@@ -3935,7 +3866,7 @@
         <p:spPr>
           <a:xfrm>
             <a:off x="9362938" y="1990723"/>
-            <a:ext cx="832755" cy="277127"/>
+            <a:ext cx="651919" cy="277127"/>
           </a:xfrm>
           <a:prstGeom prst="rect">
             <a:avLst/>
@@ -3997,10 +3928,10 @@
       </p:sp>
       <p:sp>
         <p:nvSpPr>
-          <p:cNvPr id="56" name="TextBox 55">
+          <p:cNvPr id="86" name="TextBox 85">
             <a:extLst>
               <a:ext uri="{FF2B5EF4-FFF2-40B4-BE49-F238E27FC236}">
-                <a16:creationId xmlns:a16="http://schemas.microsoft.com/office/drawing/2014/main" id="{F4278712-BD0A-4A71-9ABC-324C23E3958C}"/>
+                <a16:creationId xmlns:a16="http://schemas.microsoft.com/office/drawing/2014/main" id="{6A49165F-E734-47A1-A457-71DDDFC1CE2A}"/>
               </a:ext>
             </a:extLst>
           </p:cNvPr>
@@ -4009,8 +3940,8 @@
         </p:nvSpPr>
         <p:spPr>
           <a:xfrm>
-            <a:off x="9330150" y="3959362"/>
-            <a:ext cx="832755" cy="277127"/>
+            <a:off x="9301122" y="4039189"/>
+            <a:ext cx="648421" cy="277127"/>
           </a:xfrm>
           <a:prstGeom prst="rect">
             <a:avLst/>
@@ -4072,23 +4003,23 @@
       </p:sp>
       <p:cxnSp>
         <p:nvCxnSpPr>
-          <p:cNvPr id="59" name="Straight Arrow Connector 58">
+          <p:cNvPr id="87" name="Straight Arrow Connector 86">
             <a:extLst>
               <a:ext uri="{FF2B5EF4-FFF2-40B4-BE49-F238E27FC236}">
-                <a16:creationId xmlns:a16="http://schemas.microsoft.com/office/drawing/2014/main" id="{15916F69-FC79-436E-A074-3287AC2FEDB7}"/>
+                <a16:creationId xmlns:a16="http://schemas.microsoft.com/office/drawing/2014/main" id="{BB26FBCE-1E03-4ACC-9B15-1782A046DA3E}"/>
               </a:ext>
             </a:extLst>
           </p:cNvPr>
           <p:cNvCxnSpPr>
             <a:cxnSpLocks/>
-            <a:stCxn id="55" idx="1"/>
+            <a:stCxn id="85" idx="1"/>
           </p:cNvCxnSpPr>
           <p:nvPr/>
         </p:nvCxnSpPr>
         <p:spPr>
           <a:xfrm flipH="1">
-            <a:off x="8964517" y="2129287"/>
-            <a:ext cx="398421" cy="400318"/>
+            <a:off x="8888920" y="2129287"/>
+            <a:ext cx="474018" cy="495802"/>
           </a:xfrm>
           <a:prstGeom prst="straightConnector1">
             <a:avLst/>
@@ -4117,23 +4048,23 @@
       </p:cxnSp>
       <p:cxnSp>
         <p:nvCxnSpPr>
-          <p:cNvPr id="63" name="Straight Arrow Connector 62">
+          <p:cNvPr id="88" name="Straight Arrow Connector 87">
             <a:extLst>
               <a:ext uri="{FF2B5EF4-FFF2-40B4-BE49-F238E27FC236}">
-                <a16:creationId xmlns:a16="http://schemas.microsoft.com/office/drawing/2014/main" id="{60DE5EAF-7A45-41BC-A96E-771EB1FAE5E9}"/>
+                <a16:creationId xmlns:a16="http://schemas.microsoft.com/office/drawing/2014/main" id="{493707F3-71F0-40BC-949A-6A33055E5085}"/>
               </a:ext>
             </a:extLst>
           </p:cNvPr>
           <p:cNvCxnSpPr>
             <a:cxnSpLocks/>
-            <a:stCxn id="56" idx="1"/>
+            <a:stCxn id="86" idx="1"/>
           </p:cNvCxnSpPr>
           <p:nvPr/>
         </p:nvCxnSpPr>
         <p:spPr>
           <a:xfrm flipH="1" flipV="1">
-            <a:off x="8917948" y="3700591"/>
-            <a:ext cx="412202" cy="397335"/>
+            <a:off x="8888920" y="3780419"/>
+            <a:ext cx="412202" cy="397334"/>
           </a:xfrm>
           <a:prstGeom prst="straightConnector1">
             <a:avLst/>
@@ -4162,10 +4093,10 @@
       </p:cxnSp>
       <p:sp>
         <p:nvSpPr>
-          <p:cNvPr id="64" name="TextBox 63">
+          <p:cNvPr id="89" name="TextBox 88">
             <a:extLst>
               <a:ext uri="{FF2B5EF4-FFF2-40B4-BE49-F238E27FC236}">
-                <a16:creationId xmlns:a16="http://schemas.microsoft.com/office/drawing/2014/main" id="{BDB18F4E-39A7-4B91-BA91-EC3853B73CA9}"/>
+                <a16:creationId xmlns:a16="http://schemas.microsoft.com/office/drawing/2014/main" id="{1CEF3837-23BF-454E-A7DF-B91A5DA425B2}"/>
               </a:ext>
             </a:extLst>
           </p:cNvPr>
@@ -4174,7 +4105,7 @@
         </p:nvSpPr>
         <p:spPr>
           <a:xfrm>
-            <a:off x="2522864" y="4360155"/>
+            <a:off x="2384978" y="4498041"/>
             <a:ext cx="988080" cy="523220"/>
           </a:xfrm>
           <a:prstGeom prst="rect">
@@ -4238,23 +4169,143 @@
       </p:sp>
       <p:cxnSp>
         <p:nvCxnSpPr>
-          <p:cNvPr id="66" name="Straight Arrow Connector 65">
+          <p:cNvPr id="90" name="Straight Arrow Connector 89">
             <a:extLst>
               <a:ext uri="{FF2B5EF4-FFF2-40B4-BE49-F238E27FC236}">
-                <a16:creationId xmlns:a16="http://schemas.microsoft.com/office/drawing/2014/main" id="{6F1DBB1A-8BA5-44C8-A06B-8FABBA8A6A80}"/>
+                <a16:creationId xmlns:a16="http://schemas.microsoft.com/office/drawing/2014/main" id="{59DE9350-C23C-4AA4-A7FC-E22BB1C0E4FE}"/>
               </a:ext>
             </a:extLst>
           </p:cNvPr>
           <p:cNvCxnSpPr>
             <a:cxnSpLocks/>
-            <a:stCxn id="64" idx="0"/>
+            <a:stCxn id="89" idx="0"/>
           </p:cNvCxnSpPr>
           <p:nvPr/>
         </p:nvCxnSpPr>
         <p:spPr>
           <a:xfrm flipV="1">
-            <a:off x="3016904" y="3845355"/>
+            <a:off x="2879018" y="3983241"/>
             <a:ext cx="0" cy="514800"/>
+          </a:xfrm>
+          <a:prstGeom prst="straightConnector1">
+            <a:avLst/>
+          </a:prstGeom>
+          <a:ln w="38100">
+            <a:solidFill>
+              <a:schemeClr val="tx1"/>
+            </a:solidFill>
+            <a:tailEnd type="triangle"/>
+          </a:ln>
+        </p:spPr>
+        <p:style>
+          <a:lnRef idx="1">
+            <a:schemeClr val="accent1"/>
+          </a:lnRef>
+          <a:fillRef idx="0">
+            <a:schemeClr val="accent1"/>
+          </a:fillRef>
+          <a:effectRef idx="0">
+            <a:schemeClr val="accent1"/>
+          </a:effectRef>
+          <a:fontRef idx="minor">
+            <a:schemeClr val="tx1"/>
+          </a:fontRef>
+        </p:style>
+      </p:cxnSp>
+      <p:sp>
+        <p:nvSpPr>
+          <p:cNvPr id="91" name="TextBox 90">
+            <a:extLst>
+              <a:ext uri="{FF2B5EF4-FFF2-40B4-BE49-F238E27FC236}">
+                <a16:creationId xmlns:a16="http://schemas.microsoft.com/office/drawing/2014/main" id="{26BCF018-C6FC-488F-8721-20AEA25C162F}"/>
+              </a:ext>
+            </a:extLst>
+          </p:cNvPr>
+          <p:cNvSpPr txBox="1"/>
+          <p:nvPr/>
+        </p:nvSpPr>
+        <p:spPr>
+          <a:xfrm>
+            <a:off x="7087326" y="2997163"/>
+            <a:ext cx="1008874" cy="461921"/>
+          </a:xfrm>
+          <a:prstGeom prst="rect">
+            <a:avLst/>
+          </a:prstGeom>
+          <a:gradFill flip="none" rotWithShape="1">
+            <a:gsLst>
+              <a:gs pos="0">
+                <a:schemeClr val="accent2">
+                  <a:lumMod val="67000"/>
+                </a:schemeClr>
+              </a:gs>
+              <a:gs pos="48000">
+                <a:schemeClr val="accent2">
+                  <a:lumMod val="97000"/>
+                  <a:lumOff val="3000"/>
+                </a:schemeClr>
+              </a:gs>
+              <a:gs pos="100000">
+                <a:schemeClr val="accent2">
+                  <a:lumMod val="60000"/>
+                  <a:lumOff val="40000"/>
+                </a:schemeClr>
+              </a:gs>
+            </a:gsLst>
+            <a:lin ang="16200000" scaled="1"/>
+            <a:tileRect/>
+          </a:gradFill>
+          <a:ln>
+            <a:noFill/>
+          </a:ln>
+        </p:spPr>
+        <p:style>
+          <a:lnRef idx="0">
+            <a:scrgbClr r="0" g="0" b="0"/>
+          </a:lnRef>
+          <a:fillRef idx="0">
+            <a:scrgbClr r="0" g="0" b="0"/>
+          </a:fillRef>
+          <a:effectRef idx="0">
+            <a:scrgbClr r="0" g="0" b="0"/>
+          </a:effectRef>
+          <a:fontRef idx="minor">
+            <a:schemeClr val="lt1"/>
+          </a:fontRef>
+        </p:style>
+        <p:txBody>
+          <a:bodyPr wrap="square" rtlCol="0">
+            <a:spAutoFit/>
+          </a:bodyPr>
+          <a:lstStyle/>
+          <a:p>
+            <a:pPr algn="ctr"/>
+            <a:r>
+              <a:rPr lang="en-US" sz="1201" dirty="0"/>
+              <a:t>biotin modification</a:t>
+            </a:r>
+          </a:p>
+        </p:txBody>
+      </p:sp>
+      <p:cxnSp>
+        <p:nvCxnSpPr>
+          <p:cNvPr id="92" name="Straight Arrow Connector 91">
+            <a:extLst>
+              <a:ext uri="{FF2B5EF4-FFF2-40B4-BE49-F238E27FC236}">
+                <a16:creationId xmlns:a16="http://schemas.microsoft.com/office/drawing/2014/main" id="{F50DF6C5-E8AD-40B4-AA7B-D02D8523593C}"/>
+              </a:ext>
+            </a:extLst>
+          </p:cNvPr>
+          <p:cNvCxnSpPr>
+            <a:cxnSpLocks/>
+            <a:stCxn id="91" idx="3"/>
+          </p:cNvCxnSpPr>
+          <p:nvPr/>
+        </p:nvCxnSpPr>
+        <p:spPr>
+          <a:xfrm flipV="1">
+            <a:off x="8096200" y="3065548"/>
+            <a:ext cx="655914" cy="162576"/>
           </a:xfrm>
           <a:prstGeom prst="straightConnector1">
             <a:avLst/>

</xml_diff>